<commit_message>
The report of math
</commit_message>
<xml_diff>
--- a/src/.vuepress/public/data/unisa/AdvancedAnalytic1/project/Kalman Filter.pptx
+++ b/src/.vuepress/public/data/unisa/AdvancedAnalytic1/project/Kalman Filter.pptx
@@ -13,11 +13,14 @@
     <p:sldId id="272" r:id="rId7"/>
     <p:sldId id="267" r:id="rId8"/>
     <p:sldId id="268" r:id="rId9"/>
-    <p:sldId id="269" r:id="rId10"/>
-    <p:sldId id="273" r:id="rId11"/>
-    <p:sldId id="280" r:id="rId12"/>
-    <p:sldId id="274" r:id="rId13"/>
-    <p:sldId id="275" r:id="rId14"/>
+    <p:sldId id="283" r:id="rId10"/>
+    <p:sldId id="269" r:id="rId11"/>
+    <p:sldId id="273" r:id="rId12"/>
+    <p:sldId id="280" r:id="rId13"/>
+    <p:sldId id="281" r:id="rId14"/>
+    <p:sldId id="282" r:id="rId15"/>
+    <p:sldId id="274" r:id="rId16"/>
+    <p:sldId id="275" r:id="rId17"/>
   </p:sldIdLst>
   <p:sldSz cx="12192000" cy="6858000"/>
   <p:notesSz cx="6858000" cy="9144000"/>
@@ -141,7 +144,7 @@
           <p:cNvPr id="2" name="标题 1">
             <a:extLst>
               <a:ext uri="{FF2B5EF4-FFF2-40B4-BE49-F238E27FC236}">
-                <a16:creationId xmlns:a16="http://schemas.microsoft.com/office/drawing/2014/main" id="{10F33BF8-FD8E-786C-E15E-E839FDF28F95}"/>
+                <a16:creationId xmlns:a16="http://schemas.microsoft.com/office/drawing/2014/main" xmlns="" id="{10F33BF8-FD8E-786C-E15E-E839FDF28F95}"/>
               </a:ext>
             </a:extLst>
           </p:cNvPr>
@@ -179,7 +182,7 @@
           <p:cNvPr id="3" name="副标题 2">
             <a:extLst>
               <a:ext uri="{FF2B5EF4-FFF2-40B4-BE49-F238E27FC236}">
-                <a16:creationId xmlns:a16="http://schemas.microsoft.com/office/drawing/2014/main" id="{9AC2F9CB-7901-1897-0622-D26554C82DCD}"/>
+                <a16:creationId xmlns:a16="http://schemas.microsoft.com/office/drawing/2014/main" xmlns="" id="{9AC2F9CB-7901-1897-0622-D26554C82DCD}"/>
               </a:ext>
             </a:extLst>
           </p:cNvPr>
@@ -250,7 +253,7 @@
           <p:cNvPr id="4" name="日期占位符 3">
             <a:extLst>
               <a:ext uri="{FF2B5EF4-FFF2-40B4-BE49-F238E27FC236}">
-                <a16:creationId xmlns:a16="http://schemas.microsoft.com/office/drawing/2014/main" id="{7E582C05-515F-B6CD-BAAD-A85C6E8EE755}"/>
+                <a16:creationId xmlns:a16="http://schemas.microsoft.com/office/drawing/2014/main" xmlns="" id="{7E582C05-515F-B6CD-BAAD-A85C6E8EE755}"/>
               </a:ext>
             </a:extLst>
           </p:cNvPr>
@@ -268,7 +271,7 @@
           <a:p>
             <a:fld id="{233E0F7A-D311-4F49-8534-70D3220B4BB0}" type="datetimeFigureOut">
               <a:rPr lang="en-US" smtClean="0"/>
-              <a:t>10/30/2023</a:t>
+              <a:t>10/31/2023</a:t>
             </a:fld>
             <a:endParaRPr lang="en-US"/>
           </a:p>
@@ -279,7 +282,7 @@
           <p:cNvPr id="5" name="页脚占位符 4">
             <a:extLst>
               <a:ext uri="{FF2B5EF4-FFF2-40B4-BE49-F238E27FC236}">
-                <a16:creationId xmlns:a16="http://schemas.microsoft.com/office/drawing/2014/main" id="{E3C4F145-A780-D801-34B1-952578D06BB7}"/>
+                <a16:creationId xmlns:a16="http://schemas.microsoft.com/office/drawing/2014/main" xmlns="" id="{E3C4F145-A780-D801-34B1-952578D06BB7}"/>
               </a:ext>
             </a:extLst>
           </p:cNvPr>
@@ -304,7 +307,7 @@
           <p:cNvPr id="6" name="灯片编号占位符 5">
             <a:extLst>
               <a:ext uri="{FF2B5EF4-FFF2-40B4-BE49-F238E27FC236}">
-                <a16:creationId xmlns:a16="http://schemas.microsoft.com/office/drawing/2014/main" id="{643C2776-D61B-1BE0-DAD9-9115B8BF85AE}"/>
+                <a16:creationId xmlns:a16="http://schemas.microsoft.com/office/drawing/2014/main" xmlns="" id="{643C2776-D61B-1BE0-DAD9-9115B8BF85AE}"/>
               </a:ext>
             </a:extLst>
           </p:cNvPr>
@@ -363,7 +366,7 @@
           <p:cNvPr id="2" name="标题 1">
             <a:extLst>
               <a:ext uri="{FF2B5EF4-FFF2-40B4-BE49-F238E27FC236}">
-                <a16:creationId xmlns:a16="http://schemas.microsoft.com/office/drawing/2014/main" id="{EA6036EE-75BD-2041-346A-9751132F17EB}"/>
+                <a16:creationId xmlns:a16="http://schemas.microsoft.com/office/drawing/2014/main" xmlns="" id="{EA6036EE-75BD-2041-346A-9751132F17EB}"/>
               </a:ext>
             </a:extLst>
           </p:cNvPr>
@@ -392,7 +395,7 @@
           <p:cNvPr id="3" name="竖排文字占位符 2">
             <a:extLst>
               <a:ext uri="{FF2B5EF4-FFF2-40B4-BE49-F238E27FC236}">
-                <a16:creationId xmlns:a16="http://schemas.microsoft.com/office/drawing/2014/main" id="{35A7DEB4-59FC-F94E-CE1E-1BAE867E1B52}"/>
+                <a16:creationId xmlns:a16="http://schemas.microsoft.com/office/drawing/2014/main" xmlns="" id="{35A7DEB4-59FC-F94E-CE1E-1BAE867E1B52}"/>
               </a:ext>
             </a:extLst>
           </p:cNvPr>
@@ -450,7 +453,7 @@
           <p:cNvPr id="4" name="日期占位符 3">
             <a:extLst>
               <a:ext uri="{FF2B5EF4-FFF2-40B4-BE49-F238E27FC236}">
-                <a16:creationId xmlns:a16="http://schemas.microsoft.com/office/drawing/2014/main" id="{FAF04A84-931B-567B-8BA7-1CFAA44D303E}"/>
+                <a16:creationId xmlns:a16="http://schemas.microsoft.com/office/drawing/2014/main" xmlns="" id="{FAF04A84-931B-567B-8BA7-1CFAA44D303E}"/>
               </a:ext>
             </a:extLst>
           </p:cNvPr>
@@ -468,7 +471,7 @@
           <a:p>
             <a:fld id="{233E0F7A-D311-4F49-8534-70D3220B4BB0}" type="datetimeFigureOut">
               <a:rPr lang="en-US" smtClean="0"/>
-              <a:t>10/30/2023</a:t>
+              <a:t>10/31/2023</a:t>
             </a:fld>
             <a:endParaRPr lang="en-US"/>
           </a:p>
@@ -479,7 +482,7 @@
           <p:cNvPr id="5" name="页脚占位符 4">
             <a:extLst>
               <a:ext uri="{FF2B5EF4-FFF2-40B4-BE49-F238E27FC236}">
-                <a16:creationId xmlns:a16="http://schemas.microsoft.com/office/drawing/2014/main" id="{8C580D2B-CF67-5316-F00F-82BEBDA94534}"/>
+                <a16:creationId xmlns:a16="http://schemas.microsoft.com/office/drawing/2014/main" xmlns="" id="{8C580D2B-CF67-5316-F00F-82BEBDA94534}"/>
               </a:ext>
             </a:extLst>
           </p:cNvPr>
@@ -504,7 +507,7 @@
           <p:cNvPr id="6" name="灯片编号占位符 5">
             <a:extLst>
               <a:ext uri="{FF2B5EF4-FFF2-40B4-BE49-F238E27FC236}">
-                <a16:creationId xmlns:a16="http://schemas.microsoft.com/office/drawing/2014/main" id="{FB3F5507-C9AC-5F2D-6392-B66544928DFA}"/>
+                <a16:creationId xmlns:a16="http://schemas.microsoft.com/office/drawing/2014/main" xmlns="" id="{FB3F5507-C9AC-5F2D-6392-B66544928DFA}"/>
               </a:ext>
             </a:extLst>
           </p:cNvPr>
@@ -563,7 +566,7 @@
           <p:cNvPr id="2" name="竖排标题 1">
             <a:extLst>
               <a:ext uri="{FF2B5EF4-FFF2-40B4-BE49-F238E27FC236}">
-                <a16:creationId xmlns:a16="http://schemas.microsoft.com/office/drawing/2014/main" id="{FF963630-547A-D682-588A-9B3BF4A2BF47}"/>
+                <a16:creationId xmlns:a16="http://schemas.microsoft.com/office/drawing/2014/main" xmlns="" id="{FF963630-547A-D682-588A-9B3BF4A2BF47}"/>
               </a:ext>
             </a:extLst>
           </p:cNvPr>
@@ -597,7 +600,7 @@
           <p:cNvPr id="3" name="竖排文字占位符 2">
             <a:extLst>
               <a:ext uri="{FF2B5EF4-FFF2-40B4-BE49-F238E27FC236}">
-                <a16:creationId xmlns:a16="http://schemas.microsoft.com/office/drawing/2014/main" id="{0441B8FB-15EA-E2DB-E546-0FDFA74E648A}"/>
+                <a16:creationId xmlns:a16="http://schemas.microsoft.com/office/drawing/2014/main" xmlns="" id="{0441B8FB-15EA-E2DB-E546-0FDFA74E648A}"/>
               </a:ext>
             </a:extLst>
           </p:cNvPr>
@@ -660,7 +663,7 @@
           <p:cNvPr id="4" name="日期占位符 3">
             <a:extLst>
               <a:ext uri="{FF2B5EF4-FFF2-40B4-BE49-F238E27FC236}">
-                <a16:creationId xmlns:a16="http://schemas.microsoft.com/office/drawing/2014/main" id="{E7099FBA-3318-F430-9238-CE6D093F7B06}"/>
+                <a16:creationId xmlns:a16="http://schemas.microsoft.com/office/drawing/2014/main" xmlns="" id="{E7099FBA-3318-F430-9238-CE6D093F7B06}"/>
               </a:ext>
             </a:extLst>
           </p:cNvPr>
@@ -678,7 +681,7 @@
           <a:p>
             <a:fld id="{233E0F7A-D311-4F49-8534-70D3220B4BB0}" type="datetimeFigureOut">
               <a:rPr lang="en-US" smtClean="0"/>
-              <a:t>10/30/2023</a:t>
+              <a:t>10/31/2023</a:t>
             </a:fld>
             <a:endParaRPr lang="en-US"/>
           </a:p>
@@ -689,7 +692,7 @@
           <p:cNvPr id="5" name="页脚占位符 4">
             <a:extLst>
               <a:ext uri="{FF2B5EF4-FFF2-40B4-BE49-F238E27FC236}">
-                <a16:creationId xmlns:a16="http://schemas.microsoft.com/office/drawing/2014/main" id="{B3F16089-F829-DD68-5D3F-2175104F0EF8}"/>
+                <a16:creationId xmlns:a16="http://schemas.microsoft.com/office/drawing/2014/main" xmlns="" id="{B3F16089-F829-DD68-5D3F-2175104F0EF8}"/>
               </a:ext>
             </a:extLst>
           </p:cNvPr>
@@ -714,7 +717,7 @@
           <p:cNvPr id="6" name="灯片编号占位符 5">
             <a:extLst>
               <a:ext uri="{FF2B5EF4-FFF2-40B4-BE49-F238E27FC236}">
-                <a16:creationId xmlns:a16="http://schemas.microsoft.com/office/drawing/2014/main" id="{284F7E61-C042-2616-1A4C-8239F8AD939F}"/>
+                <a16:creationId xmlns:a16="http://schemas.microsoft.com/office/drawing/2014/main" xmlns="" id="{284F7E61-C042-2616-1A4C-8239F8AD939F}"/>
               </a:ext>
             </a:extLst>
           </p:cNvPr>
@@ -773,7 +776,7 @@
           <p:cNvPr id="2" name="标题 1">
             <a:extLst>
               <a:ext uri="{FF2B5EF4-FFF2-40B4-BE49-F238E27FC236}">
-                <a16:creationId xmlns:a16="http://schemas.microsoft.com/office/drawing/2014/main" id="{07EA60D0-A96A-7BA3-8151-D2426ABEB894}"/>
+                <a16:creationId xmlns:a16="http://schemas.microsoft.com/office/drawing/2014/main" xmlns="" id="{07EA60D0-A96A-7BA3-8151-D2426ABEB894}"/>
               </a:ext>
             </a:extLst>
           </p:cNvPr>
@@ -802,7 +805,7 @@
           <p:cNvPr id="3" name="内容占位符 2">
             <a:extLst>
               <a:ext uri="{FF2B5EF4-FFF2-40B4-BE49-F238E27FC236}">
-                <a16:creationId xmlns:a16="http://schemas.microsoft.com/office/drawing/2014/main" id="{8995B592-6FF4-F1CF-0AD8-196E556B8A02}"/>
+                <a16:creationId xmlns:a16="http://schemas.microsoft.com/office/drawing/2014/main" xmlns="" id="{8995B592-6FF4-F1CF-0AD8-196E556B8A02}"/>
               </a:ext>
             </a:extLst>
           </p:cNvPr>
@@ -860,7 +863,7 @@
           <p:cNvPr id="4" name="日期占位符 3">
             <a:extLst>
               <a:ext uri="{FF2B5EF4-FFF2-40B4-BE49-F238E27FC236}">
-                <a16:creationId xmlns:a16="http://schemas.microsoft.com/office/drawing/2014/main" id="{F688347B-553B-FB7C-071A-8F8B9CFAAA17}"/>
+                <a16:creationId xmlns:a16="http://schemas.microsoft.com/office/drawing/2014/main" xmlns="" id="{F688347B-553B-FB7C-071A-8F8B9CFAAA17}"/>
               </a:ext>
             </a:extLst>
           </p:cNvPr>
@@ -878,7 +881,7 @@
           <a:p>
             <a:fld id="{233E0F7A-D311-4F49-8534-70D3220B4BB0}" type="datetimeFigureOut">
               <a:rPr lang="en-US" smtClean="0"/>
-              <a:t>10/30/2023</a:t>
+              <a:t>10/31/2023</a:t>
             </a:fld>
             <a:endParaRPr lang="en-US"/>
           </a:p>
@@ -889,7 +892,7 @@
           <p:cNvPr id="5" name="页脚占位符 4">
             <a:extLst>
               <a:ext uri="{FF2B5EF4-FFF2-40B4-BE49-F238E27FC236}">
-                <a16:creationId xmlns:a16="http://schemas.microsoft.com/office/drawing/2014/main" id="{6204CF4E-0B10-2210-EBC6-A8F0445FC0D1}"/>
+                <a16:creationId xmlns:a16="http://schemas.microsoft.com/office/drawing/2014/main" xmlns="" id="{6204CF4E-0B10-2210-EBC6-A8F0445FC0D1}"/>
               </a:ext>
             </a:extLst>
           </p:cNvPr>
@@ -914,7 +917,7 @@
           <p:cNvPr id="6" name="灯片编号占位符 5">
             <a:extLst>
               <a:ext uri="{FF2B5EF4-FFF2-40B4-BE49-F238E27FC236}">
-                <a16:creationId xmlns:a16="http://schemas.microsoft.com/office/drawing/2014/main" id="{CF57CACF-E97F-6DF7-EC7C-9F8F35C17F00}"/>
+                <a16:creationId xmlns:a16="http://schemas.microsoft.com/office/drawing/2014/main" xmlns="" id="{CF57CACF-E97F-6DF7-EC7C-9F8F35C17F00}"/>
               </a:ext>
             </a:extLst>
           </p:cNvPr>
@@ -973,7 +976,7 @@
           <p:cNvPr id="2" name="标题 1">
             <a:extLst>
               <a:ext uri="{FF2B5EF4-FFF2-40B4-BE49-F238E27FC236}">
-                <a16:creationId xmlns:a16="http://schemas.microsoft.com/office/drawing/2014/main" id="{CE67FC3D-1EFA-9088-66D0-E3063BBDFCCF}"/>
+                <a16:creationId xmlns:a16="http://schemas.microsoft.com/office/drawing/2014/main" xmlns="" id="{CE67FC3D-1EFA-9088-66D0-E3063BBDFCCF}"/>
               </a:ext>
             </a:extLst>
           </p:cNvPr>
@@ -1011,7 +1014,7 @@
           <p:cNvPr id="3" name="文本占位符 2">
             <a:extLst>
               <a:ext uri="{FF2B5EF4-FFF2-40B4-BE49-F238E27FC236}">
-                <a16:creationId xmlns:a16="http://schemas.microsoft.com/office/drawing/2014/main" id="{74FDC549-C0B9-87F6-5635-A3153B46A35F}"/>
+                <a16:creationId xmlns:a16="http://schemas.microsoft.com/office/drawing/2014/main" xmlns="" id="{74FDC549-C0B9-87F6-5635-A3153B46A35F}"/>
               </a:ext>
             </a:extLst>
           </p:cNvPr>
@@ -1136,7 +1139,7 @@
           <p:cNvPr id="4" name="日期占位符 3">
             <a:extLst>
               <a:ext uri="{FF2B5EF4-FFF2-40B4-BE49-F238E27FC236}">
-                <a16:creationId xmlns:a16="http://schemas.microsoft.com/office/drawing/2014/main" id="{18304B00-38CB-B596-9C8C-B7949712E01E}"/>
+                <a16:creationId xmlns:a16="http://schemas.microsoft.com/office/drawing/2014/main" xmlns="" id="{18304B00-38CB-B596-9C8C-B7949712E01E}"/>
               </a:ext>
             </a:extLst>
           </p:cNvPr>
@@ -1154,7 +1157,7 @@
           <a:p>
             <a:fld id="{233E0F7A-D311-4F49-8534-70D3220B4BB0}" type="datetimeFigureOut">
               <a:rPr lang="en-US" smtClean="0"/>
-              <a:t>10/30/2023</a:t>
+              <a:t>10/31/2023</a:t>
             </a:fld>
             <a:endParaRPr lang="en-US"/>
           </a:p>
@@ -1165,7 +1168,7 @@
           <p:cNvPr id="5" name="页脚占位符 4">
             <a:extLst>
               <a:ext uri="{FF2B5EF4-FFF2-40B4-BE49-F238E27FC236}">
-                <a16:creationId xmlns:a16="http://schemas.microsoft.com/office/drawing/2014/main" id="{0AECB766-FFA2-24BC-153B-CA2622A7D8B4}"/>
+                <a16:creationId xmlns:a16="http://schemas.microsoft.com/office/drawing/2014/main" xmlns="" id="{0AECB766-FFA2-24BC-153B-CA2622A7D8B4}"/>
               </a:ext>
             </a:extLst>
           </p:cNvPr>
@@ -1190,7 +1193,7 @@
           <p:cNvPr id="6" name="灯片编号占位符 5">
             <a:extLst>
               <a:ext uri="{FF2B5EF4-FFF2-40B4-BE49-F238E27FC236}">
-                <a16:creationId xmlns:a16="http://schemas.microsoft.com/office/drawing/2014/main" id="{C37203E8-005F-F530-D6EC-FFD3FA376590}"/>
+                <a16:creationId xmlns:a16="http://schemas.microsoft.com/office/drawing/2014/main" xmlns="" id="{C37203E8-005F-F530-D6EC-FFD3FA376590}"/>
               </a:ext>
             </a:extLst>
           </p:cNvPr>
@@ -1249,7 +1252,7 @@
           <p:cNvPr id="2" name="标题 1">
             <a:extLst>
               <a:ext uri="{FF2B5EF4-FFF2-40B4-BE49-F238E27FC236}">
-                <a16:creationId xmlns:a16="http://schemas.microsoft.com/office/drawing/2014/main" id="{81BB6436-DABC-EA59-16D2-57D8BEB021D9}"/>
+                <a16:creationId xmlns:a16="http://schemas.microsoft.com/office/drawing/2014/main" xmlns="" id="{81BB6436-DABC-EA59-16D2-57D8BEB021D9}"/>
               </a:ext>
             </a:extLst>
           </p:cNvPr>
@@ -1278,7 +1281,7 @@
           <p:cNvPr id="3" name="内容占位符 2">
             <a:extLst>
               <a:ext uri="{FF2B5EF4-FFF2-40B4-BE49-F238E27FC236}">
-                <a16:creationId xmlns:a16="http://schemas.microsoft.com/office/drawing/2014/main" id="{333F17B2-88DA-F787-56F4-1765242A77DF}"/>
+                <a16:creationId xmlns:a16="http://schemas.microsoft.com/office/drawing/2014/main" xmlns="" id="{333F17B2-88DA-F787-56F4-1765242A77DF}"/>
               </a:ext>
             </a:extLst>
           </p:cNvPr>
@@ -1341,7 +1344,7 @@
           <p:cNvPr id="4" name="内容占位符 3">
             <a:extLst>
               <a:ext uri="{FF2B5EF4-FFF2-40B4-BE49-F238E27FC236}">
-                <a16:creationId xmlns:a16="http://schemas.microsoft.com/office/drawing/2014/main" id="{23BA2EE3-B444-FF67-B4EA-11FDF0E5061D}"/>
+                <a16:creationId xmlns:a16="http://schemas.microsoft.com/office/drawing/2014/main" xmlns="" id="{23BA2EE3-B444-FF67-B4EA-11FDF0E5061D}"/>
               </a:ext>
             </a:extLst>
           </p:cNvPr>
@@ -1404,7 +1407,7 @@
           <p:cNvPr id="5" name="日期占位符 4">
             <a:extLst>
               <a:ext uri="{FF2B5EF4-FFF2-40B4-BE49-F238E27FC236}">
-                <a16:creationId xmlns:a16="http://schemas.microsoft.com/office/drawing/2014/main" id="{FE56265B-DC6C-28F4-81DB-D7F60B054010}"/>
+                <a16:creationId xmlns:a16="http://schemas.microsoft.com/office/drawing/2014/main" xmlns="" id="{FE56265B-DC6C-28F4-81DB-D7F60B054010}"/>
               </a:ext>
             </a:extLst>
           </p:cNvPr>
@@ -1422,7 +1425,7 @@
           <a:p>
             <a:fld id="{233E0F7A-D311-4F49-8534-70D3220B4BB0}" type="datetimeFigureOut">
               <a:rPr lang="en-US" smtClean="0"/>
-              <a:t>10/30/2023</a:t>
+              <a:t>10/31/2023</a:t>
             </a:fld>
             <a:endParaRPr lang="en-US"/>
           </a:p>
@@ -1433,7 +1436,7 @@
           <p:cNvPr id="6" name="页脚占位符 5">
             <a:extLst>
               <a:ext uri="{FF2B5EF4-FFF2-40B4-BE49-F238E27FC236}">
-                <a16:creationId xmlns:a16="http://schemas.microsoft.com/office/drawing/2014/main" id="{83EC8090-BD4F-CDCD-9C61-5123F78AC20A}"/>
+                <a16:creationId xmlns:a16="http://schemas.microsoft.com/office/drawing/2014/main" xmlns="" id="{83EC8090-BD4F-CDCD-9C61-5123F78AC20A}"/>
               </a:ext>
             </a:extLst>
           </p:cNvPr>
@@ -1458,7 +1461,7 @@
           <p:cNvPr id="7" name="灯片编号占位符 6">
             <a:extLst>
               <a:ext uri="{FF2B5EF4-FFF2-40B4-BE49-F238E27FC236}">
-                <a16:creationId xmlns:a16="http://schemas.microsoft.com/office/drawing/2014/main" id="{C226ACE0-F80E-3F73-E8B0-CF76AF97F25E}"/>
+                <a16:creationId xmlns:a16="http://schemas.microsoft.com/office/drawing/2014/main" xmlns="" id="{C226ACE0-F80E-3F73-E8B0-CF76AF97F25E}"/>
               </a:ext>
             </a:extLst>
           </p:cNvPr>
@@ -1517,7 +1520,7 @@
           <p:cNvPr id="2" name="标题 1">
             <a:extLst>
               <a:ext uri="{FF2B5EF4-FFF2-40B4-BE49-F238E27FC236}">
-                <a16:creationId xmlns:a16="http://schemas.microsoft.com/office/drawing/2014/main" id="{50BE3C57-7CD4-B732-EC2A-8DE16644555C}"/>
+                <a16:creationId xmlns:a16="http://schemas.microsoft.com/office/drawing/2014/main" xmlns="" id="{50BE3C57-7CD4-B732-EC2A-8DE16644555C}"/>
               </a:ext>
             </a:extLst>
           </p:cNvPr>
@@ -1551,7 +1554,7 @@
           <p:cNvPr id="3" name="文本占位符 2">
             <a:extLst>
               <a:ext uri="{FF2B5EF4-FFF2-40B4-BE49-F238E27FC236}">
-                <a16:creationId xmlns:a16="http://schemas.microsoft.com/office/drawing/2014/main" id="{B43143F4-2584-0768-FED4-4E3F3A8F20AF}"/>
+                <a16:creationId xmlns:a16="http://schemas.microsoft.com/office/drawing/2014/main" xmlns="" id="{B43143F4-2584-0768-FED4-4E3F3A8F20AF}"/>
               </a:ext>
             </a:extLst>
           </p:cNvPr>
@@ -1622,7 +1625,7 @@
           <p:cNvPr id="4" name="内容占位符 3">
             <a:extLst>
               <a:ext uri="{FF2B5EF4-FFF2-40B4-BE49-F238E27FC236}">
-                <a16:creationId xmlns:a16="http://schemas.microsoft.com/office/drawing/2014/main" id="{2F128599-7522-0440-5350-B3C70CC4A24C}"/>
+                <a16:creationId xmlns:a16="http://schemas.microsoft.com/office/drawing/2014/main" xmlns="" id="{2F128599-7522-0440-5350-B3C70CC4A24C}"/>
               </a:ext>
             </a:extLst>
           </p:cNvPr>
@@ -1685,7 +1688,7 @@
           <p:cNvPr id="5" name="文本占位符 4">
             <a:extLst>
               <a:ext uri="{FF2B5EF4-FFF2-40B4-BE49-F238E27FC236}">
-                <a16:creationId xmlns:a16="http://schemas.microsoft.com/office/drawing/2014/main" id="{9F0B35A0-7A68-0D8C-991E-ADF73C8FBED5}"/>
+                <a16:creationId xmlns:a16="http://schemas.microsoft.com/office/drawing/2014/main" xmlns="" id="{9F0B35A0-7A68-0D8C-991E-ADF73C8FBED5}"/>
               </a:ext>
             </a:extLst>
           </p:cNvPr>
@@ -1756,7 +1759,7 @@
           <p:cNvPr id="6" name="内容占位符 5">
             <a:extLst>
               <a:ext uri="{FF2B5EF4-FFF2-40B4-BE49-F238E27FC236}">
-                <a16:creationId xmlns:a16="http://schemas.microsoft.com/office/drawing/2014/main" id="{F802823B-E595-5F81-D71F-B0305CAA1581}"/>
+                <a16:creationId xmlns:a16="http://schemas.microsoft.com/office/drawing/2014/main" xmlns="" id="{F802823B-E595-5F81-D71F-B0305CAA1581}"/>
               </a:ext>
             </a:extLst>
           </p:cNvPr>
@@ -1819,7 +1822,7 @@
           <p:cNvPr id="7" name="日期占位符 6">
             <a:extLst>
               <a:ext uri="{FF2B5EF4-FFF2-40B4-BE49-F238E27FC236}">
-                <a16:creationId xmlns:a16="http://schemas.microsoft.com/office/drawing/2014/main" id="{9E1EE24D-D1DE-9B3E-4080-6808708C05A8}"/>
+                <a16:creationId xmlns:a16="http://schemas.microsoft.com/office/drawing/2014/main" xmlns="" id="{9E1EE24D-D1DE-9B3E-4080-6808708C05A8}"/>
               </a:ext>
             </a:extLst>
           </p:cNvPr>
@@ -1837,7 +1840,7 @@
           <a:p>
             <a:fld id="{233E0F7A-D311-4F49-8534-70D3220B4BB0}" type="datetimeFigureOut">
               <a:rPr lang="en-US" smtClean="0"/>
-              <a:t>10/30/2023</a:t>
+              <a:t>10/31/2023</a:t>
             </a:fld>
             <a:endParaRPr lang="en-US"/>
           </a:p>
@@ -1848,7 +1851,7 @@
           <p:cNvPr id="8" name="页脚占位符 7">
             <a:extLst>
               <a:ext uri="{FF2B5EF4-FFF2-40B4-BE49-F238E27FC236}">
-                <a16:creationId xmlns:a16="http://schemas.microsoft.com/office/drawing/2014/main" id="{C06C2DEB-A9DD-A722-1495-E6D7A91BC29C}"/>
+                <a16:creationId xmlns:a16="http://schemas.microsoft.com/office/drawing/2014/main" xmlns="" id="{C06C2DEB-A9DD-A722-1495-E6D7A91BC29C}"/>
               </a:ext>
             </a:extLst>
           </p:cNvPr>
@@ -1873,7 +1876,7 @@
           <p:cNvPr id="9" name="灯片编号占位符 8">
             <a:extLst>
               <a:ext uri="{FF2B5EF4-FFF2-40B4-BE49-F238E27FC236}">
-                <a16:creationId xmlns:a16="http://schemas.microsoft.com/office/drawing/2014/main" id="{D8971254-CB67-6345-01AC-7BAF7FD67DFF}"/>
+                <a16:creationId xmlns:a16="http://schemas.microsoft.com/office/drawing/2014/main" xmlns="" id="{D8971254-CB67-6345-01AC-7BAF7FD67DFF}"/>
               </a:ext>
             </a:extLst>
           </p:cNvPr>
@@ -1932,7 +1935,7 @@
           <p:cNvPr id="2" name="标题 1">
             <a:extLst>
               <a:ext uri="{FF2B5EF4-FFF2-40B4-BE49-F238E27FC236}">
-                <a16:creationId xmlns:a16="http://schemas.microsoft.com/office/drawing/2014/main" id="{06648288-2F93-747D-9554-15E36671F261}"/>
+                <a16:creationId xmlns:a16="http://schemas.microsoft.com/office/drawing/2014/main" xmlns="" id="{06648288-2F93-747D-9554-15E36671F261}"/>
               </a:ext>
             </a:extLst>
           </p:cNvPr>
@@ -1961,7 +1964,7 @@
           <p:cNvPr id="3" name="日期占位符 2">
             <a:extLst>
               <a:ext uri="{FF2B5EF4-FFF2-40B4-BE49-F238E27FC236}">
-                <a16:creationId xmlns:a16="http://schemas.microsoft.com/office/drawing/2014/main" id="{35174584-4E29-D26E-0C6F-FD2DB8A038A7}"/>
+                <a16:creationId xmlns:a16="http://schemas.microsoft.com/office/drawing/2014/main" xmlns="" id="{35174584-4E29-D26E-0C6F-FD2DB8A038A7}"/>
               </a:ext>
             </a:extLst>
           </p:cNvPr>
@@ -1979,7 +1982,7 @@
           <a:p>
             <a:fld id="{233E0F7A-D311-4F49-8534-70D3220B4BB0}" type="datetimeFigureOut">
               <a:rPr lang="en-US" smtClean="0"/>
-              <a:t>10/30/2023</a:t>
+              <a:t>10/31/2023</a:t>
             </a:fld>
             <a:endParaRPr lang="en-US"/>
           </a:p>
@@ -1990,7 +1993,7 @@
           <p:cNvPr id="4" name="页脚占位符 3">
             <a:extLst>
               <a:ext uri="{FF2B5EF4-FFF2-40B4-BE49-F238E27FC236}">
-                <a16:creationId xmlns:a16="http://schemas.microsoft.com/office/drawing/2014/main" id="{CADE618B-D099-FF72-1C9A-FF8374FA83E0}"/>
+                <a16:creationId xmlns:a16="http://schemas.microsoft.com/office/drawing/2014/main" xmlns="" id="{CADE618B-D099-FF72-1C9A-FF8374FA83E0}"/>
               </a:ext>
             </a:extLst>
           </p:cNvPr>
@@ -2015,7 +2018,7 @@
           <p:cNvPr id="5" name="灯片编号占位符 4">
             <a:extLst>
               <a:ext uri="{FF2B5EF4-FFF2-40B4-BE49-F238E27FC236}">
-                <a16:creationId xmlns:a16="http://schemas.microsoft.com/office/drawing/2014/main" id="{38451358-EAB2-6BBD-CD23-0286DD1C0A53}"/>
+                <a16:creationId xmlns:a16="http://schemas.microsoft.com/office/drawing/2014/main" xmlns="" id="{38451358-EAB2-6BBD-CD23-0286DD1C0A53}"/>
               </a:ext>
             </a:extLst>
           </p:cNvPr>
@@ -2074,7 +2077,7 @@
           <p:cNvPr id="2" name="日期占位符 1">
             <a:extLst>
               <a:ext uri="{FF2B5EF4-FFF2-40B4-BE49-F238E27FC236}">
-                <a16:creationId xmlns:a16="http://schemas.microsoft.com/office/drawing/2014/main" id="{33190D7B-3496-BB63-17A5-158547EBAFF9}"/>
+                <a16:creationId xmlns:a16="http://schemas.microsoft.com/office/drawing/2014/main" xmlns="" id="{33190D7B-3496-BB63-17A5-158547EBAFF9}"/>
               </a:ext>
             </a:extLst>
           </p:cNvPr>
@@ -2092,7 +2095,7 @@
           <a:p>
             <a:fld id="{233E0F7A-D311-4F49-8534-70D3220B4BB0}" type="datetimeFigureOut">
               <a:rPr lang="en-US" smtClean="0"/>
-              <a:t>10/30/2023</a:t>
+              <a:t>10/31/2023</a:t>
             </a:fld>
             <a:endParaRPr lang="en-US"/>
           </a:p>
@@ -2103,7 +2106,7 @@
           <p:cNvPr id="3" name="页脚占位符 2">
             <a:extLst>
               <a:ext uri="{FF2B5EF4-FFF2-40B4-BE49-F238E27FC236}">
-                <a16:creationId xmlns:a16="http://schemas.microsoft.com/office/drawing/2014/main" id="{1DD90573-7834-709E-2B09-296E30DF435A}"/>
+                <a16:creationId xmlns:a16="http://schemas.microsoft.com/office/drawing/2014/main" xmlns="" id="{1DD90573-7834-709E-2B09-296E30DF435A}"/>
               </a:ext>
             </a:extLst>
           </p:cNvPr>
@@ -2128,7 +2131,7 @@
           <p:cNvPr id="4" name="灯片编号占位符 3">
             <a:extLst>
               <a:ext uri="{FF2B5EF4-FFF2-40B4-BE49-F238E27FC236}">
-                <a16:creationId xmlns:a16="http://schemas.microsoft.com/office/drawing/2014/main" id="{E1379807-BBF2-3092-4B19-368A23A121C4}"/>
+                <a16:creationId xmlns:a16="http://schemas.microsoft.com/office/drawing/2014/main" xmlns="" id="{E1379807-BBF2-3092-4B19-368A23A121C4}"/>
               </a:ext>
             </a:extLst>
           </p:cNvPr>
@@ -2187,7 +2190,7 @@
           <p:cNvPr id="2" name="标题 1">
             <a:extLst>
               <a:ext uri="{FF2B5EF4-FFF2-40B4-BE49-F238E27FC236}">
-                <a16:creationId xmlns:a16="http://schemas.microsoft.com/office/drawing/2014/main" id="{25E85BB5-563D-24A5-F24B-ACA0E5ADABF9}"/>
+                <a16:creationId xmlns:a16="http://schemas.microsoft.com/office/drawing/2014/main" xmlns="" id="{25E85BB5-563D-24A5-F24B-ACA0E5ADABF9}"/>
               </a:ext>
             </a:extLst>
           </p:cNvPr>
@@ -2225,7 +2228,7 @@
           <p:cNvPr id="3" name="内容占位符 2">
             <a:extLst>
               <a:ext uri="{FF2B5EF4-FFF2-40B4-BE49-F238E27FC236}">
-                <a16:creationId xmlns:a16="http://schemas.microsoft.com/office/drawing/2014/main" id="{C1289F38-DB5E-A78A-05ED-CFD3413A93F7}"/>
+                <a16:creationId xmlns:a16="http://schemas.microsoft.com/office/drawing/2014/main" xmlns="" id="{C1289F38-DB5E-A78A-05ED-CFD3413A93F7}"/>
               </a:ext>
             </a:extLst>
           </p:cNvPr>
@@ -2316,7 +2319,7 @@
           <p:cNvPr id="4" name="文本占位符 3">
             <a:extLst>
               <a:ext uri="{FF2B5EF4-FFF2-40B4-BE49-F238E27FC236}">
-                <a16:creationId xmlns:a16="http://schemas.microsoft.com/office/drawing/2014/main" id="{8EB3C4BF-4FF5-8AB9-9C5D-0B2A90D1E8F5}"/>
+                <a16:creationId xmlns:a16="http://schemas.microsoft.com/office/drawing/2014/main" xmlns="" id="{8EB3C4BF-4FF5-8AB9-9C5D-0B2A90D1E8F5}"/>
               </a:ext>
             </a:extLst>
           </p:cNvPr>
@@ -2387,7 +2390,7 @@
           <p:cNvPr id="5" name="日期占位符 4">
             <a:extLst>
               <a:ext uri="{FF2B5EF4-FFF2-40B4-BE49-F238E27FC236}">
-                <a16:creationId xmlns:a16="http://schemas.microsoft.com/office/drawing/2014/main" id="{D2EC3A4D-B75A-4727-24FA-A74947B1AC9D}"/>
+                <a16:creationId xmlns:a16="http://schemas.microsoft.com/office/drawing/2014/main" xmlns="" id="{D2EC3A4D-B75A-4727-24FA-A74947B1AC9D}"/>
               </a:ext>
             </a:extLst>
           </p:cNvPr>
@@ -2405,7 +2408,7 @@
           <a:p>
             <a:fld id="{233E0F7A-D311-4F49-8534-70D3220B4BB0}" type="datetimeFigureOut">
               <a:rPr lang="en-US" smtClean="0"/>
-              <a:t>10/30/2023</a:t>
+              <a:t>10/31/2023</a:t>
             </a:fld>
             <a:endParaRPr lang="en-US"/>
           </a:p>
@@ -2416,7 +2419,7 @@
           <p:cNvPr id="6" name="页脚占位符 5">
             <a:extLst>
               <a:ext uri="{FF2B5EF4-FFF2-40B4-BE49-F238E27FC236}">
-                <a16:creationId xmlns:a16="http://schemas.microsoft.com/office/drawing/2014/main" id="{3082729F-7372-D5A4-CE10-418BC38154B3}"/>
+                <a16:creationId xmlns:a16="http://schemas.microsoft.com/office/drawing/2014/main" xmlns="" id="{3082729F-7372-D5A4-CE10-418BC38154B3}"/>
               </a:ext>
             </a:extLst>
           </p:cNvPr>
@@ -2441,7 +2444,7 @@
           <p:cNvPr id="7" name="灯片编号占位符 6">
             <a:extLst>
               <a:ext uri="{FF2B5EF4-FFF2-40B4-BE49-F238E27FC236}">
-                <a16:creationId xmlns:a16="http://schemas.microsoft.com/office/drawing/2014/main" id="{7F7D7F14-8019-48F4-B05F-BFE11B73B7A7}"/>
+                <a16:creationId xmlns:a16="http://schemas.microsoft.com/office/drawing/2014/main" xmlns="" id="{7F7D7F14-8019-48F4-B05F-BFE11B73B7A7}"/>
               </a:ext>
             </a:extLst>
           </p:cNvPr>
@@ -2500,7 +2503,7 @@
           <p:cNvPr id="2" name="标题 1">
             <a:extLst>
               <a:ext uri="{FF2B5EF4-FFF2-40B4-BE49-F238E27FC236}">
-                <a16:creationId xmlns:a16="http://schemas.microsoft.com/office/drawing/2014/main" id="{59FE2280-6670-C94E-0DF5-91978AFA7056}"/>
+                <a16:creationId xmlns:a16="http://schemas.microsoft.com/office/drawing/2014/main" xmlns="" id="{59FE2280-6670-C94E-0DF5-91978AFA7056}"/>
               </a:ext>
             </a:extLst>
           </p:cNvPr>
@@ -2538,7 +2541,7 @@
           <p:cNvPr id="3" name="图片占位符 2">
             <a:extLst>
               <a:ext uri="{FF2B5EF4-FFF2-40B4-BE49-F238E27FC236}">
-                <a16:creationId xmlns:a16="http://schemas.microsoft.com/office/drawing/2014/main" id="{0041BED5-92ED-AC74-6807-2113BAFCA812}"/>
+                <a16:creationId xmlns:a16="http://schemas.microsoft.com/office/drawing/2014/main" xmlns="" id="{0041BED5-92ED-AC74-6807-2113BAFCA812}"/>
               </a:ext>
             </a:extLst>
           </p:cNvPr>
@@ -2605,7 +2608,7 @@
           <p:cNvPr id="4" name="文本占位符 3">
             <a:extLst>
               <a:ext uri="{FF2B5EF4-FFF2-40B4-BE49-F238E27FC236}">
-                <a16:creationId xmlns:a16="http://schemas.microsoft.com/office/drawing/2014/main" id="{67BDB5BB-A36C-979E-585C-FE2BC429D7F6}"/>
+                <a16:creationId xmlns:a16="http://schemas.microsoft.com/office/drawing/2014/main" xmlns="" id="{67BDB5BB-A36C-979E-585C-FE2BC429D7F6}"/>
               </a:ext>
             </a:extLst>
           </p:cNvPr>
@@ -2676,7 +2679,7 @@
           <p:cNvPr id="5" name="日期占位符 4">
             <a:extLst>
               <a:ext uri="{FF2B5EF4-FFF2-40B4-BE49-F238E27FC236}">
-                <a16:creationId xmlns:a16="http://schemas.microsoft.com/office/drawing/2014/main" id="{8F192718-E975-55E0-B895-63A124910067}"/>
+                <a16:creationId xmlns:a16="http://schemas.microsoft.com/office/drawing/2014/main" xmlns="" id="{8F192718-E975-55E0-B895-63A124910067}"/>
               </a:ext>
             </a:extLst>
           </p:cNvPr>
@@ -2694,7 +2697,7 @@
           <a:p>
             <a:fld id="{233E0F7A-D311-4F49-8534-70D3220B4BB0}" type="datetimeFigureOut">
               <a:rPr lang="en-US" smtClean="0"/>
-              <a:t>10/30/2023</a:t>
+              <a:t>10/31/2023</a:t>
             </a:fld>
             <a:endParaRPr lang="en-US"/>
           </a:p>
@@ -2705,7 +2708,7 @@
           <p:cNvPr id="6" name="页脚占位符 5">
             <a:extLst>
               <a:ext uri="{FF2B5EF4-FFF2-40B4-BE49-F238E27FC236}">
-                <a16:creationId xmlns:a16="http://schemas.microsoft.com/office/drawing/2014/main" id="{20EB14A0-932E-D2B9-9ED9-B80E2859AB1C}"/>
+                <a16:creationId xmlns:a16="http://schemas.microsoft.com/office/drawing/2014/main" xmlns="" id="{20EB14A0-932E-D2B9-9ED9-B80E2859AB1C}"/>
               </a:ext>
             </a:extLst>
           </p:cNvPr>
@@ -2730,7 +2733,7 @@
           <p:cNvPr id="7" name="灯片编号占位符 6">
             <a:extLst>
               <a:ext uri="{FF2B5EF4-FFF2-40B4-BE49-F238E27FC236}">
-                <a16:creationId xmlns:a16="http://schemas.microsoft.com/office/drawing/2014/main" id="{BC421619-2C72-C208-D14C-AF0CB76DDF08}"/>
+                <a16:creationId xmlns:a16="http://schemas.microsoft.com/office/drawing/2014/main" xmlns="" id="{BC421619-2C72-C208-D14C-AF0CB76DDF08}"/>
               </a:ext>
             </a:extLst>
           </p:cNvPr>
@@ -2794,7 +2797,7 @@
           <p:cNvPr id="2" name="标题占位符 1">
             <a:extLst>
               <a:ext uri="{FF2B5EF4-FFF2-40B4-BE49-F238E27FC236}">
-                <a16:creationId xmlns:a16="http://schemas.microsoft.com/office/drawing/2014/main" id="{2FDE79DA-3549-F3A3-FCB4-F0D88BDB80FE}"/>
+                <a16:creationId xmlns:a16="http://schemas.microsoft.com/office/drawing/2014/main" xmlns="" id="{2FDE79DA-3549-F3A3-FCB4-F0D88BDB80FE}"/>
               </a:ext>
             </a:extLst>
           </p:cNvPr>
@@ -2833,7 +2836,7 @@
           <p:cNvPr id="3" name="文本占位符 2">
             <a:extLst>
               <a:ext uri="{FF2B5EF4-FFF2-40B4-BE49-F238E27FC236}">
-                <a16:creationId xmlns:a16="http://schemas.microsoft.com/office/drawing/2014/main" id="{738A3F15-CA53-DA31-8BB4-5AEC4A2B8105}"/>
+                <a16:creationId xmlns:a16="http://schemas.microsoft.com/office/drawing/2014/main" xmlns="" id="{738A3F15-CA53-DA31-8BB4-5AEC4A2B8105}"/>
               </a:ext>
             </a:extLst>
           </p:cNvPr>
@@ -2901,7 +2904,7 @@
           <p:cNvPr id="4" name="日期占位符 3">
             <a:extLst>
               <a:ext uri="{FF2B5EF4-FFF2-40B4-BE49-F238E27FC236}">
-                <a16:creationId xmlns:a16="http://schemas.microsoft.com/office/drawing/2014/main" id="{904A0621-10A1-9453-405A-725CA9DD73DA}"/>
+                <a16:creationId xmlns:a16="http://schemas.microsoft.com/office/drawing/2014/main" xmlns="" id="{904A0621-10A1-9453-405A-725CA9DD73DA}"/>
               </a:ext>
             </a:extLst>
           </p:cNvPr>
@@ -2937,7 +2940,7 @@
           <a:p>
             <a:fld id="{233E0F7A-D311-4F49-8534-70D3220B4BB0}" type="datetimeFigureOut">
               <a:rPr lang="en-US" smtClean="0"/>
-              <a:t>10/30/2023</a:t>
+              <a:t>10/31/2023</a:t>
             </a:fld>
             <a:endParaRPr lang="en-US"/>
           </a:p>
@@ -2948,7 +2951,7 @@
           <p:cNvPr id="5" name="页脚占位符 4">
             <a:extLst>
               <a:ext uri="{FF2B5EF4-FFF2-40B4-BE49-F238E27FC236}">
-                <a16:creationId xmlns:a16="http://schemas.microsoft.com/office/drawing/2014/main" id="{87C79395-795F-E2AE-BE57-7368ECF212C8}"/>
+                <a16:creationId xmlns:a16="http://schemas.microsoft.com/office/drawing/2014/main" xmlns="" id="{87C79395-795F-E2AE-BE57-7368ECF212C8}"/>
               </a:ext>
             </a:extLst>
           </p:cNvPr>
@@ -2991,7 +2994,7 @@
           <p:cNvPr id="6" name="灯片编号占位符 5">
             <a:extLst>
               <a:ext uri="{FF2B5EF4-FFF2-40B4-BE49-F238E27FC236}">
-                <a16:creationId xmlns:a16="http://schemas.microsoft.com/office/drawing/2014/main" id="{3430DED2-C8D2-D377-6F2B-ABAC2F7F5DF3}"/>
+                <a16:creationId xmlns:a16="http://schemas.microsoft.com/office/drawing/2014/main" xmlns="" id="{3430DED2-C8D2-D377-6F2B-ABAC2F7F5DF3}"/>
               </a:ext>
             </a:extLst>
           </p:cNvPr>
@@ -3359,7 +3362,7 @@
           <p:cNvPr id="2" name="标题 1">
             <a:extLst>
               <a:ext uri="{FF2B5EF4-FFF2-40B4-BE49-F238E27FC236}">
-                <a16:creationId xmlns:a16="http://schemas.microsoft.com/office/drawing/2014/main" id="{8F71CC32-FF3D-7C37-2552-16EA87FD3FCD}"/>
+                <a16:creationId xmlns:a16="http://schemas.microsoft.com/office/drawing/2014/main" xmlns="" id="{8F71CC32-FF3D-7C37-2552-16EA87FD3FCD}"/>
               </a:ext>
             </a:extLst>
           </p:cNvPr>
@@ -3388,7 +3391,7 @@
           <p:cNvPr id="3" name="副标题 2">
             <a:extLst>
               <a:ext uri="{FF2B5EF4-FFF2-40B4-BE49-F238E27FC236}">
-                <a16:creationId xmlns:a16="http://schemas.microsoft.com/office/drawing/2014/main" id="{0B796731-8234-25E1-8D71-3F1CC8A90185}"/>
+                <a16:creationId xmlns:a16="http://schemas.microsoft.com/office/drawing/2014/main" xmlns="" id="{0B796731-8234-25E1-8D71-3F1CC8A90185}"/>
               </a:ext>
             </a:extLst>
           </p:cNvPr>
@@ -3446,7 +3449,7 @@
           <p:cNvPr id="2" name="标题 1">
             <a:extLst>
               <a:ext uri="{FF2B5EF4-FFF2-40B4-BE49-F238E27FC236}">
-                <a16:creationId xmlns:a16="http://schemas.microsoft.com/office/drawing/2014/main" id="{887EC568-F726-48DA-C182-951B1E028ECC}"/>
+                <a16:creationId xmlns:a16="http://schemas.microsoft.com/office/drawing/2014/main" xmlns="" id="{887EC568-F726-48DA-C182-951B1E028ECC}"/>
               </a:ext>
             </a:extLst>
           </p:cNvPr>
@@ -3466,6 +3469,31 @@
               <a:rPr lang="en-US" dirty="0"/>
               <a:t>Example – Track a Car</a:t>
             </a:r>
+          </a:p>
+        </p:txBody>
+      </p:sp>
+      <p:sp>
+        <p:nvSpPr>
+          <p:cNvPr id="3" name="内容占位符 2">
+            <a:extLst>
+              <a:ext uri="{FF2B5EF4-FFF2-40B4-BE49-F238E27FC236}">
+                <a16:creationId xmlns:a16="http://schemas.microsoft.com/office/drawing/2014/main" xmlns="" id="{B2FE7A0C-1F7E-AAD3-040B-A76C36D5CAD8}"/>
+              </a:ext>
+            </a:extLst>
+          </p:cNvPr>
+          <p:cNvSpPr>
+            <a:spLocks noGrp="1"/>
+          </p:cNvSpPr>
+          <p:nvPr>
+            <p:ph idx="1"/>
+          </p:nvPr>
+        </p:nvSpPr>
+        <p:spPr/>
+        <p:txBody>
+          <a:bodyPr/>
+          <a:lstStyle/>
+          <a:p>
+            <a:endParaRPr lang="en-US"/>
           </a:p>
         </p:txBody>
       </p:sp>
@@ -3474,7 +3502,112 @@
           <p:cNvPr id="2050" name="Picture 2" descr="Alt text">
             <a:extLst>
               <a:ext uri="{FF2B5EF4-FFF2-40B4-BE49-F238E27FC236}">
-                <a16:creationId xmlns:a16="http://schemas.microsoft.com/office/drawing/2014/main" id="{7CC6E176-6B19-029A-688A-F02FEBA64EBE}"/>
+                <a16:creationId xmlns:a16="http://schemas.microsoft.com/office/drawing/2014/main" xmlns="" id="{7CC6E176-6B19-029A-688A-F02FEBA64EBE}"/>
+              </a:ext>
+            </a:extLst>
+          </p:cNvPr>
+          <p:cNvPicPr>
+            <a:picLocks noChangeAspect="1" noChangeArrowheads="1"/>
+          </p:cNvPicPr>
+          <p:nvPr/>
+        </p:nvPicPr>
+        <p:blipFill>
+          <a:blip r:embed="rId2">
+            <a:extLst>
+              <a:ext uri="{28A0092B-C50C-407E-A947-70E740481C1C}">
+                <a14:useLocalDpi xmlns:a14="http://schemas.microsoft.com/office/drawing/2010/main" val="0"/>
+              </a:ext>
+            </a:extLst>
+          </a:blip>
+          <a:srcRect/>
+          <a:stretch>
+            <a:fillRect/>
+          </a:stretch>
+        </p:blipFill>
+        <p:spPr bwMode="auto">
+          <a:xfrm>
+            <a:off x="838200" y="1825625"/>
+            <a:ext cx="6814886" cy="2358200"/>
+          </a:xfrm>
+          <a:prstGeom prst="rect">
+            <a:avLst/>
+          </a:prstGeom>
+          <a:noFill/>
+          <a:extLst>
+            <a:ext uri="{909E8E84-426E-40DD-AFC4-6F175D3DCCD1}">
+              <a14:hiddenFill xmlns:a14="http://schemas.microsoft.com/office/drawing/2010/main">
+                <a:solidFill>
+                  <a:srgbClr val="FFFFFF"/>
+                </a:solidFill>
+              </a14:hiddenFill>
+            </a:ext>
+          </a:extLst>
+        </p:spPr>
+      </p:pic>
+    </p:spTree>
+    <p:extLst>
+      <p:ext uri="{BB962C8B-B14F-4D97-AF65-F5344CB8AC3E}">
+        <p14:creationId xmlns:p14="http://schemas.microsoft.com/office/powerpoint/2010/main" val="3052349854"/>
+      </p:ext>
+    </p:extLst>
+  </p:cSld>
+  <p:clrMapOvr>
+    <a:masterClrMapping/>
+  </p:clrMapOvr>
+</p:sld>
+</file>
+
+<file path=ppt/slides/slide11.xml><?xml version="1.0" encoding="utf-8"?>
+<p:sld xmlns:a="http://schemas.openxmlformats.org/drawingml/2006/main" xmlns:r="http://schemas.openxmlformats.org/officeDocument/2006/relationships" xmlns:p="http://schemas.openxmlformats.org/presentationml/2006/main">
+  <p:cSld>
+    <p:spTree>
+      <p:nvGrpSpPr>
+        <p:cNvPr id="1" name=""/>
+        <p:cNvGrpSpPr/>
+        <p:nvPr/>
+      </p:nvGrpSpPr>
+      <p:grpSpPr>
+        <a:xfrm>
+          <a:off x="0" y="0"/>
+          <a:ext cx="0" cy="0"/>
+          <a:chOff x="0" y="0"/>
+          <a:chExt cx="0" cy="0"/>
+        </a:xfrm>
+      </p:grpSpPr>
+      <p:sp>
+        <p:nvSpPr>
+          <p:cNvPr id="2" name="标题 1">
+            <a:extLst>
+              <a:ext uri="{FF2B5EF4-FFF2-40B4-BE49-F238E27FC236}">
+                <a16:creationId xmlns:a16="http://schemas.microsoft.com/office/drawing/2014/main" xmlns="" id="{887EC568-F726-48DA-C182-951B1E028ECC}"/>
+              </a:ext>
+            </a:extLst>
+          </p:cNvPr>
+          <p:cNvSpPr>
+            <a:spLocks noGrp="1"/>
+          </p:cNvSpPr>
+          <p:nvPr>
+            <p:ph type="title"/>
+          </p:nvPr>
+        </p:nvSpPr>
+        <p:spPr/>
+        <p:txBody>
+          <a:bodyPr/>
+          <a:lstStyle/>
+          <a:p>
+            <a:r>
+              <a:rPr lang="en-US" dirty="0"/>
+              <a:t>Example – Track a Car</a:t>
+            </a:r>
+          </a:p>
+        </p:txBody>
+      </p:sp>
+      <p:pic>
+        <p:nvPicPr>
+          <p:cNvPr id="2050" name="Picture 2" descr="Alt text">
+            <a:extLst>
+              <a:ext uri="{FF2B5EF4-FFF2-40B4-BE49-F238E27FC236}">
+                <a16:creationId xmlns:a16="http://schemas.microsoft.com/office/drawing/2014/main" xmlns="" id="{7CC6E176-6B19-029A-688A-F02FEBA64EBE}"/>
               </a:ext>
             </a:extLst>
           </p:cNvPr>
@@ -3521,7 +3654,7 @@
           <p:cNvPr id="5" name="图片 4">
             <a:extLst>
               <a:ext uri="{FF2B5EF4-FFF2-40B4-BE49-F238E27FC236}">
-                <a16:creationId xmlns:a16="http://schemas.microsoft.com/office/drawing/2014/main" id="{22401DF9-F90B-54F6-285B-57CB4DE59A81}"/>
+                <a16:creationId xmlns:a16="http://schemas.microsoft.com/office/drawing/2014/main" xmlns="" id="{22401DF9-F90B-54F6-285B-57CB4DE59A81}"/>
               </a:ext>
             </a:extLst>
           </p:cNvPr>
@@ -3559,7 +3692,7 @@
 </p:sld>
 </file>
 
-<file path=ppt/slides/slide11.xml><?xml version="1.0" encoding="utf-8"?>
+<file path=ppt/slides/slide12.xml><?xml version="1.0" encoding="utf-8"?>
 <p:sld xmlns:a="http://schemas.openxmlformats.org/drawingml/2006/main" xmlns:r="http://schemas.openxmlformats.org/officeDocument/2006/relationships" xmlns:p="http://schemas.openxmlformats.org/presentationml/2006/main">
   <p:cSld>
     <p:spTree>
@@ -3581,7 +3714,7 @@
           <p:cNvPr id="2" name="标题 1">
             <a:extLst>
               <a:ext uri="{FF2B5EF4-FFF2-40B4-BE49-F238E27FC236}">
-                <a16:creationId xmlns:a16="http://schemas.microsoft.com/office/drawing/2014/main" id="{887EC568-F726-48DA-C182-951B1E028ECC}"/>
+                <a16:creationId xmlns:a16="http://schemas.microsoft.com/office/drawing/2014/main" xmlns="" id="{887EC568-F726-48DA-C182-951B1E028ECC}"/>
               </a:ext>
             </a:extLst>
           </p:cNvPr>
@@ -3609,7 +3742,7 @@
           <p:cNvPr id="5" name="图片 4">
             <a:extLst>
               <a:ext uri="{FF2B5EF4-FFF2-40B4-BE49-F238E27FC236}">
-                <a16:creationId xmlns:a16="http://schemas.microsoft.com/office/drawing/2014/main" id="{22401DF9-F90B-54F6-285B-57CB4DE59A81}"/>
+                <a16:creationId xmlns:a16="http://schemas.microsoft.com/office/drawing/2014/main" xmlns="" id="{22401DF9-F90B-54F6-285B-57CB4DE59A81}"/>
               </a:ext>
             </a:extLst>
           </p:cNvPr>
@@ -3639,7 +3772,7 @@
           <p:cNvPr id="6" name="图片 5">
             <a:extLst>
               <a:ext uri="{FF2B5EF4-FFF2-40B4-BE49-F238E27FC236}">
-                <a16:creationId xmlns:a16="http://schemas.microsoft.com/office/drawing/2014/main" id="{262AF52F-D744-C56B-DD2F-5A039117BDE3}"/>
+                <a16:creationId xmlns:a16="http://schemas.microsoft.com/office/drawing/2014/main" xmlns="" id="{262AF52F-D744-C56B-DD2F-5A039117BDE3}"/>
               </a:ext>
             </a:extLst>
           </p:cNvPr>
@@ -3669,7 +3802,7 @@
           <p:cNvPr id="7" name="箭头: 下 6">
             <a:extLst>
               <a:ext uri="{FF2B5EF4-FFF2-40B4-BE49-F238E27FC236}">
-                <a16:creationId xmlns:a16="http://schemas.microsoft.com/office/drawing/2014/main" id="{BEE142A4-1CD6-D216-26AA-C6D105709863}"/>
+                <a16:creationId xmlns:a16="http://schemas.microsoft.com/office/drawing/2014/main" xmlns="" id="{BEE142A4-1CD6-D216-26AA-C6D105709863}"/>
               </a:ext>
             </a:extLst>
           </p:cNvPr>
@@ -3715,7 +3848,7 @@
           <p:cNvPr id="9" name="图片 8">
             <a:extLst>
               <a:ext uri="{FF2B5EF4-FFF2-40B4-BE49-F238E27FC236}">
-                <a16:creationId xmlns:a16="http://schemas.microsoft.com/office/drawing/2014/main" id="{AB6309C6-4438-FD9C-0E40-43FEADE06FB4}"/>
+                <a16:creationId xmlns:a16="http://schemas.microsoft.com/office/drawing/2014/main" xmlns="" id="{AB6309C6-4438-FD9C-0E40-43FEADE06FB4}"/>
               </a:ext>
             </a:extLst>
           </p:cNvPr>
@@ -3745,7 +3878,7 @@
           <p:cNvPr id="10" name="箭头: 下 9">
             <a:extLst>
               <a:ext uri="{FF2B5EF4-FFF2-40B4-BE49-F238E27FC236}">
-                <a16:creationId xmlns:a16="http://schemas.microsoft.com/office/drawing/2014/main" id="{8B1E5912-7870-3A7A-285C-7F220C8E8269}"/>
+                <a16:creationId xmlns:a16="http://schemas.microsoft.com/office/drawing/2014/main" xmlns="" id="{8B1E5912-7870-3A7A-285C-7F220C8E8269}"/>
               </a:ext>
             </a:extLst>
           </p:cNvPr>
@@ -3790,143 +3923,6 @@
     <p:extLst>
       <p:ext uri="{BB962C8B-B14F-4D97-AF65-F5344CB8AC3E}">
         <p14:creationId xmlns:p14="http://schemas.microsoft.com/office/powerpoint/2010/main" val="409961389"/>
-      </p:ext>
-    </p:extLst>
-  </p:cSld>
-  <p:clrMapOvr>
-    <a:masterClrMapping/>
-  </p:clrMapOvr>
-</p:sld>
-</file>
-
-<file path=ppt/slides/slide12.xml><?xml version="1.0" encoding="utf-8"?>
-<p:sld xmlns:a="http://schemas.openxmlformats.org/drawingml/2006/main" xmlns:r="http://schemas.openxmlformats.org/officeDocument/2006/relationships" xmlns:p="http://schemas.openxmlformats.org/presentationml/2006/main">
-  <p:cSld>
-    <p:spTree>
-      <p:nvGrpSpPr>
-        <p:cNvPr id="1" name=""/>
-        <p:cNvGrpSpPr/>
-        <p:nvPr/>
-      </p:nvGrpSpPr>
-      <p:grpSpPr>
-        <a:xfrm>
-          <a:off x="0" y="0"/>
-          <a:ext cx="0" cy="0"/>
-          <a:chOff x="0" y="0"/>
-          <a:chExt cx="0" cy="0"/>
-        </a:xfrm>
-      </p:grpSpPr>
-      <p:sp>
-        <p:nvSpPr>
-          <p:cNvPr id="2" name="标题 1">
-            <a:extLst>
-              <a:ext uri="{FF2B5EF4-FFF2-40B4-BE49-F238E27FC236}">
-                <a16:creationId xmlns:a16="http://schemas.microsoft.com/office/drawing/2014/main" id="{38FB9F3A-0389-1798-E65F-493B28D68275}"/>
-              </a:ext>
-            </a:extLst>
-          </p:cNvPr>
-          <p:cNvSpPr>
-            <a:spLocks noGrp="1"/>
-          </p:cNvSpPr>
-          <p:nvPr>
-            <p:ph type="title"/>
-          </p:nvPr>
-        </p:nvSpPr>
-        <p:spPr/>
-        <p:txBody>
-          <a:bodyPr/>
-          <a:lstStyle/>
-          <a:p>
-            <a:r>
-              <a:rPr lang="en-US" dirty="0"/>
-              <a:t>Conclusion</a:t>
-            </a:r>
-          </a:p>
-        </p:txBody>
-      </p:sp>
-      <p:sp>
-        <p:nvSpPr>
-          <p:cNvPr id="3" name="内容占位符 2">
-            <a:extLst>
-              <a:ext uri="{FF2B5EF4-FFF2-40B4-BE49-F238E27FC236}">
-                <a16:creationId xmlns:a16="http://schemas.microsoft.com/office/drawing/2014/main" id="{17A5B292-3C99-3224-014C-93DC00A3D5E4}"/>
-              </a:ext>
-            </a:extLst>
-          </p:cNvPr>
-          <p:cNvSpPr>
-            <a:spLocks noGrp="1"/>
-          </p:cNvSpPr>
-          <p:nvPr>
-            <p:ph idx="1"/>
-          </p:nvPr>
-        </p:nvSpPr>
-        <p:spPr/>
-        <p:txBody>
-          <a:bodyPr>
-            <a:normAutofit fontScale="92500" lnSpcReduction="20000"/>
-          </a:bodyPr>
-          <a:lstStyle/>
-          <a:p>
-            <a:pPr marL="0" indent="0" algn="just">
-              <a:buNone/>
-            </a:pPr>
-            <a:r>
-              <a:rPr lang="en-US" sz="3200" b="1" dirty="0"/>
-              <a:t>Kalman filtering is an idea, and the specific implementation depends on the specific state of the problem that needs to be described.</a:t>
-            </a:r>
-          </a:p>
-          <a:p>
-            <a:pPr marL="0" indent="0" algn="just">
-              <a:buNone/>
-            </a:pPr>
-            <a:endParaRPr lang="en-US" sz="3200" b="1" dirty="0"/>
-          </a:p>
-          <a:p>
-            <a:pPr marL="0" indent="0" algn="just">
-              <a:buNone/>
-            </a:pPr>
-            <a:endParaRPr lang="en-US" sz="3200" b="1" dirty="0"/>
-          </a:p>
-          <a:p>
-            <a:pPr marL="0" indent="0" algn="just">
-              <a:buNone/>
-            </a:pPr>
-            <a:endParaRPr lang="en-US" sz="3200" b="1" dirty="0"/>
-          </a:p>
-          <a:p>
-            <a:pPr marL="0" indent="0" algn="just">
-              <a:buNone/>
-            </a:pPr>
-            <a:endParaRPr lang="en-US" sz="3200" b="1" dirty="0"/>
-          </a:p>
-          <a:p>
-            <a:pPr marL="0" indent="0" algn="just">
-              <a:buNone/>
-            </a:pPr>
-            <a:r>
-              <a:rPr lang="en-US" sz="3200" b="1" dirty="0"/>
-              <a:t>All the content could view on my blog: </a:t>
-            </a:r>
-            <a:r>
-              <a:rPr lang="en-US" sz="3200" b="1" dirty="0">
-                <a:hlinkClick r:id="rId2"/>
-              </a:rPr>
-              <a:t>https://jet-w.github.io/unisa/2023SP5/AdvancedAnalyticTechniques1/project.html</a:t>
-            </a:r>
-            <a:endParaRPr lang="en-US" sz="3200" b="1" dirty="0"/>
-          </a:p>
-          <a:p>
-            <a:pPr marL="0" indent="0" algn="just">
-              <a:buNone/>
-            </a:pPr>
-            <a:endParaRPr lang="en-US" sz="3200" b="1" dirty="0"/>
-          </a:p>
-        </p:txBody>
-      </p:sp>
-    </p:spTree>
-    <p:extLst>
-      <p:ext uri="{BB962C8B-B14F-4D97-AF65-F5344CB8AC3E}">
-        <p14:creationId xmlns:p14="http://schemas.microsoft.com/office/powerpoint/2010/main" val="3234989703"/>
       </p:ext>
     </p:extLst>
   </p:cSld>
@@ -3955,10 +3951,504 @@
       </p:grpSpPr>
       <p:sp>
         <p:nvSpPr>
+          <p:cNvPr id="2" name="标题 1"/>
+          <p:cNvSpPr>
+            <a:spLocks noGrp="1"/>
+          </p:cNvSpPr>
+          <p:nvPr>
+            <p:ph type="title"/>
+          </p:nvPr>
+        </p:nvSpPr>
+        <p:spPr/>
+        <p:txBody>
+          <a:bodyPr/>
+          <a:lstStyle/>
+          <a:p>
+            <a:r>
+              <a:rPr lang="en-US" altLang="zh-CN" dirty="0"/>
+              <a:t>Example – Track a Car</a:t>
+            </a:r>
+            <a:endParaRPr lang="zh-CN" altLang="en-US" dirty="0"/>
+          </a:p>
+        </p:txBody>
+      </p:sp>
+      <p:sp>
+        <p:nvSpPr>
+          <p:cNvPr id="3" name="内容占位符 2"/>
+          <p:cNvSpPr>
+            <a:spLocks noGrp="1"/>
+          </p:cNvSpPr>
+          <p:nvPr>
+            <p:ph idx="1"/>
+          </p:nvPr>
+        </p:nvSpPr>
+        <p:spPr/>
+        <p:txBody>
+          <a:bodyPr/>
+          <a:lstStyle/>
+          <a:p>
+            <a:r>
+              <a:rPr lang="en-US" altLang="zh-CN" dirty="0" smtClean="0"/>
+              <a:t>How could we track a plan in 3 D world</a:t>
+            </a:r>
+          </a:p>
+          <a:p>
+            <a:endParaRPr lang="en-US" altLang="zh-CN" dirty="0"/>
+          </a:p>
+          <a:p>
+            <a:pPr marL="0" indent="0">
+              <a:buNone/>
+            </a:pPr>
+            <a:endParaRPr lang="zh-CN" altLang="en-US" dirty="0"/>
+          </a:p>
+        </p:txBody>
+      </p:sp>
+      <p:pic>
+        <p:nvPicPr>
+          <p:cNvPr id="1026" name="Picture 2"/>
+          <p:cNvPicPr>
+            <a:picLocks noChangeAspect="1" noChangeArrowheads="1"/>
+          </p:cNvPicPr>
+          <p:nvPr/>
+        </p:nvPicPr>
+        <p:blipFill>
+          <a:blip r:embed="rId2">
+            <a:extLst>
+              <a:ext uri="{28A0092B-C50C-407E-A947-70E740481C1C}">
+                <a14:useLocalDpi xmlns:a14="http://schemas.microsoft.com/office/drawing/2010/main" val="0"/>
+              </a:ext>
+            </a:extLst>
+          </a:blip>
+          <a:srcRect/>
+          <a:stretch>
+            <a:fillRect/>
+          </a:stretch>
+        </p:blipFill>
+        <p:spPr bwMode="auto">
+          <a:xfrm>
+            <a:off x="3557352" y="2595704"/>
+            <a:ext cx="4025114" cy="654490"/>
+          </a:xfrm>
+          <a:prstGeom prst="rect">
+            <a:avLst/>
+          </a:prstGeom>
+          <a:noFill/>
+          <a:ln>
+            <a:noFill/>
+          </a:ln>
+          <a:effectLst/>
+          <a:extLst>
+            <a:ext uri="{909E8E84-426E-40DD-AFC4-6F175D3DCCD1}">
+              <a14:hiddenFill xmlns:a14="http://schemas.microsoft.com/office/drawing/2010/main">
+                <a:solidFill>
+                  <a:schemeClr val="accent1"/>
+                </a:solidFill>
+              </a14:hiddenFill>
+            </a:ext>
+            <a:ext uri="{91240B29-F687-4F45-9708-019B960494DF}">
+              <a14:hiddenLine xmlns:a14="http://schemas.microsoft.com/office/drawing/2010/main" w="9525">
+                <a:solidFill>
+                  <a:schemeClr val="tx1"/>
+                </a:solidFill>
+                <a:miter lim="800000"/>
+                <a:headEnd/>
+                <a:tailEnd/>
+              </a14:hiddenLine>
+            </a:ext>
+            <a:ext uri="{AF507438-7753-43E0-B8FC-AC1667EBCBE1}">
+              <a14:hiddenEffects xmlns:a14="http://schemas.microsoft.com/office/drawing/2010/main">
+                <a:effectLst>
+                  <a:outerShdw dist="35921" dir="2700000" algn="ctr" rotWithShape="0">
+                    <a:schemeClr val="bg2"/>
+                  </a:outerShdw>
+                </a:effectLst>
+              </a14:hiddenEffects>
+            </a:ext>
+          </a:extLst>
+        </p:spPr>
+      </p:pic>
+      <p:pic>
+        <p:nvPicPr>
+          <p:cNvPr id="1027" name="Picture 3"/>
+          <p:cNvPicPr>
+            <a:picLocks noChangeAspect="1" noChangeArrowheads="1"/>
+          </p:cNvPicPr>
+          <p:nvPr/>
+        </p:nvPicPr>
+        <p:blipFill>
+          <a:blip r:embed="rId3">
+            <a:extLst>
+              <a:ext uri="{28A0092B-C50C-407E-A947-70E740481C1C}">
+                <a14:useLocalDpi xmlns:a14="http://schemas.microsoft.com/office/drawing/2010/main" val="0"/>
+              </a:ext>
+            </a:extLst>
+          </a:blip>
+          <a:srcRect/>
+          <a:stretch>
+            <a:fillRect/>
+          </a:stretch>
+        </p:blipFill>
+        <p:spPr bwMode="auto">
+          <a:xfrm>
+            <a:off x="1161295" y="3563058"/>
+            <a:ext cx="5286375" cy="2447925"/>
+          </a:xfrm>
+          <a:prstGeom prst="rect">
+            <a:avLst/>
+          </a:prstGeom>
+          <a:noFill/>
+          <a:ln>
+            <a:noFill/>
+          </a:ln>
+          <a:effectLst/>
+          <a:extLst>
+            <a:ext uri="{909E8E84-426E-40DD-AFC4-6F175D3DCCD1}">
+              <a14:hiddenFill xmlns:a14="http://schemas.microsoft.com/office/drawing/2010/main">
+                <a:solidFill>
+                  <a:schemeClr val="accent1"/>
+                </a:solidFill>
+              </a14:hiddenFill>
+            </a:ext>
+            <a:ext uri="{91240B29-F687-4F45-9708-019B960494DF}">
+              <a14:hiddenLine xmlns:a14="http://schemas.microsoft.com/office/drawing/2010/main" w="9525">
+                <a:solidFill>
+                  <a:schemeClr val="tx1"/>
+                </a:solidFill>
+                <a:miter lim="800000"/>
+                <a:headEnd/>
+                <a:tailEnd/>
+              </a14:hiddenLine>
+            </a:ext>
+            <a:ext uri="{AF507438-7753-43E0-B8FC-AC1667EBCBE1}">
+              <a14:hiddenEffects xmlns:a14="http://schemas.microsoft.com/office/drawing/2010/main">
+                <a:effectLst>
+                  <a:outerShdw dist="35921" dir="2700000" algn="ctr" rotWithShape="0">
+                    <a:schemeClr val="bg2"/>
+                  </a:outerShdw>
+                </a:effectLst>
+              </a14:hiddenEffects>
+            </a:ext>
+          </a:extLst>
+        </p:spPr>
+      </p:pic>
+    </p:spTree>
+    <p:extLst>
+      <p:ext uri="{BB962C8B-B14F-4D97-AF65-F5344CB8AC3E}">
+        <p14:creationId xmlns:p14="http://schemas.microsoft.com/office/powerpoint/2010/main" val="650423379"/>
+      </p:ext>
+    </p:extLst>
+  </p:cSld>
+  <p:clrMapOvr>
+    <a:masterClrMapping/>
+  </p:clrMapOvr>
+</p:sld>
+</file>
+
+<file path=ppt/slides/slide14.xml><?xml version="1.0" encoding="utf-8"?>
+<p:sld xmlns:a="http://schemas.openxmlformats.org/drawingml/2006/main" xmlns:r="http://schemas.openxmlformats.org/officeDocument/2006/relationships" xmlns:p="http://schemas.openxmlformats.org/presentationml/2006/main">
+  <p:cSld>
+    <p:spTree>
+      <p:nvGrpSpPr>
+        <p:cNvPr id="1" name=""/>
+        <p:cNvGrpSpPr/>
+        <p:nvPr/>
+      </p:nvGrpSpPr>
+      <p:grpSpPr>
+        <a:xfrm>
+          <a:off x="0" y="0"/>
+          <a:ext cx="0" cy="0"/>
+          <a:chOff x="0" y="0"/>
+          <a:chExt cx="0" cy="0"/>
+        </a:xfrm>
+      </p:grpSpPr>
+      <p:sp>
+        <p:nvSpPr>
+          <p:cNvPr id="2" name="标题 1"/>
+          <p:cNvSpPr>
+            <a:spLocks noGrp="1"/>
+          </p:cNvSpPr>
+          <p:nvPr>
+            <p:ph type="title"/>
+          </p:nvPr>
+        </p:nvSpPr>
+        <p:spPr/>
+        <p:txBody>
+          <a:bodyPr/>
+          <a:lstStyle/>
+          <a:p>
+            <a:r>
+              <a:rPr lang="en-US" altLang="zh-CN" dirty="0"/>
+              <a:t>Example – Track a Car</a:t>
+            </a:r>
+            <a:endParaRPr lang="zh-CN" altLang="en-US" dirty="0"/>
+          </a:p>
+        </p:txBody>
+      </p:sp>
+      <p:sp>
+        <p:nvSpPr>
+          <p:cNvPr id="3" name="内容占位符 2"/>
+          <p:cNvSpPr>
+            <a:spLocks noGrp="1"/>
+          </p:cNvSpPr>
+          <p:nvPr>
+            <p:ph idx="1"/>
+          </p:nvPr>
+        </p:nvSpPr>
+        <p:spPr/>
+        <p:txBody>
+          <a:bodyPr/>
+          <a:lstStyle/>
+          <a:p>
+            <a:pPr marL="0" indent="0">
+              <a:buNone/>
+            </a:pPr>
+            <a:endParaRPr lang="en-US" altLang="zh-CN" dirty="0"/>
+          </a:p>
+          <a:p>
+            <a:pPr marL="0" indent="0">
+              <a:buNone/>
+            </a:pPr>
+            <a:endParaRPr lang="zh-CN" altLang="en-US" dirty="0"/>
+          </a:p>
+        </p:txBody>
+      </p:sp>
+      <p:pic>
+        <p:nvPicPr>
+          <p:cNvPr id="2050" name="Picture 2"/>
+          <p:cNvPicPr>
+            <a:picLocks noChangeAspect="1" noChangeArrowheads="1"/>
+          </p:cNvPicPr>
+          <p:nvPr/>
+        </p:nvPicPr>
+        <p:blipFill>
+          <a:blip r:embed="rId2">
+            <a:extLst>
+              <a:ext uri="{28A0092B-C50C-407E-A947-70E740481C1C}">
+                <a14:useLocalDpi xmlns:a14="http://schemas.microsoft.com/office/drawing/2010/main" val="0"/>
+              </a:ext>
+            </a:extLst>
+          </a:blip>
+          <a:srcRect/>
+          <a:stretch>
+            <a:fillRect/>
+          </a:stretch>
+        </p:blipFill>
+        <p:spPr bwMode="auto">
+          <a:xfrm>
+            <a:off x="833013" y="1652352"/>
+            <a:ext cx="8896350" cy="4476750"/>
+          </a:xfrm>
+          <a:prstGeom prst="rect">
+            <a:avLst/>
+          </a:prstGeom>
+          <a:noFill/>
+          <a:ln>
+            <a:noFill/>
+          </a:ln>
+          <a:effectLst/>
+          <a:extLst>
+            <a:ext uri="{909E8E84-426E-40DD-AFC4-6F175D3DCCD1}">
+              <a14:hiddenFill xmlns:a14="http://schemas.microsoft.com/office/drawing/2010/main">
+                <a:solidFill>
+                  <a:schemeClr val="accent1"/>
+                </a:solidFill>
+              </a14:hiddenFill>
+            </a:ext>
+            <a:ext uri="{91240B29-F687-4F45-9708-019B960494DF}">
+              <a14:hiddenLine xmlns:a14="http://schemas.microsoft.com/office/drawing/2010/main" w="9525">
+                <a:solidFill>
+                  <a:schemeClr val="tx1"/>
+                </a:solidFill>
+                <a:miter lim="800000"/>
+                <a:headEnd/>
+                <a:tailEnd/>
+              </a14:hiddenLine>
+            </a:ext>
+            <a:ext uri="{AF507438-7753-43E0-B8FC-AC1667EBCBE1}">
+              <a14:hiddenEffects xmlns:a14="http://schemas.microsoft.com/office/drawing/2010/main">
+                <a:effectLst>
+                  <a:outerShdw dist="35921" dir="2700000" algn="ctr" rotWithShape="0">
+                    <a:schemeClr val="bg2"/>
+                  </a:outerShdw>
+                </a:effectLst>
+              </a14:hiddenEffects>
+            </a:ext>
+          </a:extLst>
+        </p:spPr>
+      </p:pic>
+    </p:spTree>
+    <p:extLst>
+      <p:ext uri="{BB962C8B-B14F-4D97-AF65-F5344CB8AC3E}">
+        <p14:creationId xmlns:p14="http://schemas.microsoft.com/office/powerpoint/2010/main" val="2576877067"/>
+      </p:ext>
+    </p:extLst>
+  </p:cSld>
+  <p:clrMapOvr>
+    <a:masterClrMapping/>
+  </p:clrMapOvr>
+</p:sld>
+</file>
+
+<file path=ppt/slides/slide15.xml><?xml version="1.0" encoding="utf-8"?>
+<p:sld xmlns:a="http://schemas.openxmlformats.org/drawingml/2006/main" xmlns:r="http://schemas.openxmlformats.org/officeDocument/2006/relationships" xmlns:p="http://schemas.openxmlformats.org/presentationml/2006/main">
+  <p:cSld>
+    <p:spTree>
+      <p:nvGrpSpPr>
+        <p:cNvPr id="1" name=""/>
+        <p:cNvGrpSpPr/>
+        <p:nvPr/>
+      </p:nvGrpSpPr>
+      <p:grpSpPr>
+        <a:xfrm>
+          <a:off x="0" y="0"/>
+          <a:ext cx="0" cy="0"/>
+          <a:chOff x="0" y="0"/>
+          <a:chExt cx="0" cy="0"/>
+        </a:xfrm>
+      </p:grpSpPr>
+      <p:sp>
+        <p:nvSpPr>
           <p:cNvPr id="2" name="标题 1">
             <a:extLst>
               <a:ext uri="{FF2B5EF4-FFF2-40B4-BE49-F238E27FC236}">
-                <a16:creationId xmlns:a16="http://schemas.microsoft.com/office/drawing/2014/main" id="{BFED13D0-1777-7362-78DA-C791BAE10491}"/>
+                <a16:creationId xmlns:a16="http://schemas.microsoft.com/office/drawing/2014/main" xmlns="" id="{38FB9F3A-0389-1798-E65F-493B28D68275}"/>
+              </a:ext>
+            </a:extLst>
+          </p:cNvPr>
+          <p:cNvSpPr>
+            <a:spLocks noGrp="1"/>
+          </p:cNvSpPr>
+          <p:nvPr>
+            <p:ph type="title"/>
+          </p:nvPr>
+        </p:nvSpPr>
+        <p:spPr/>
+        <p:txBody>
+          <a:bodyPr/>
+          <a:lstStyle/>
+          <a:p>
+            <a:r>
+              <a:rPr lang="en-US" dirty="0"/>
+              <a:t>Conclusion</a:t>
+            </a:r>
+          </a:p>
+        </p:txBody>
+      </p:sp>
+      <p:sp>
+        <p:nvSpPr>
+          <p:cNvPr id="3" name="内容占位符 2">
+            <a:extLst>
+              <a:ext uri="{FF2B5EF4-FFF2-40B4-BE49-F238E27FC236}">
+                <a16:creationId xmlns:a16="http://schemas.microsoft.com/office/drawing/2014/main" xmlns="" id="{17A5B292-3C99-3224-014C-93DC00A3D5E4}"/>
+              </a:ext>
+            </a:extLst>
+          </p:cNvPr>
+          <p:cNvSpPr>
+            <a:spLocks noGrp="1"/>
+          </p:cNvSpPr>
+          <p:nvPr>
+            <p:ph idx="1"/>
+          </p:nvPr>
+        </p:nvSpPr>
+        <p:spPr/>
+        <p:txBody>
+          <a:bodyPr>
+            <a:normAutofit/>
+          </a:bodyPr>
+          <a:lstStyle/>
+          <a:p>
+            <a:pPr marL="0" indent="0" algn="just">
+              <a:buNone/>
+            </a:pPr>
+            <a:r>
+              <a:rPr lang="en-US" sz="3200" b="1" dirty="0"/>
+              <a:t>Kalman filtering is an idea, and the specific implementation depends on the specific state of the problem that needs to be described.</a:t>
+            </a:r>
+          </a:p>
+          <a:p>
+            <a:pPr marL="0" indent="0" algn="just">
+              <a:buNone/>
+            </a:pPr>
+            <a:endParaRPr lang="en-US" sz="3200" b="1" dirty="0"/>
+          </a:p>
+          <a:p>
+            <a:pPr marL="0" indent="0" algn="just">
+              <a:buNone/>
+            </a:pPr>
+            <a:endParaRPr lang="en-US" sz="3200" b="1" dirty="0"/>
+          </a:p>
+          <a:p>
+            <a:pPr marL="0" indent="0" algn="just">
+              <a:buNone/>
+            </a:pPr>
+            <a:endParaRPr lang="en-US" sz="3200" b="1" dirty="0"/>
+          </a:p>
+          <a:p>
+            <a:pPr marL="0" indent="0" algn="just">
+              <a:buNone/>
+            </a:pPr>
+            <a:endParaRPr lang="en-US" sz="3200" b="1" dirty="0"/>
+          </a:p>
+          <a:p>
+            <a:pPr marL="0" indent="0" algn="just">
+              <a:buNone/>
+            </a:pPr>
+            <a:r>
+              <a:rPr lang="en-US" sz="1400" b="1" dirty="0"/>
+              <a:t>All the content could view on my blog: </a:t>
+            </a:r>
+            <a:r>
+              <a:rPr lang="en-US" sz="1400" b="1" dirty="0">
+                <a:hlinkClick r:id="rId2"/>
+              </a:rPr>
+              <a:t>https://jet-w.github.io/unisa/2023SP5/AdvancedAnalyticTechniques1/project.html</a:t>
+            </a:r>
+            <a:endParaRPr lang="en-US" sz="1400" b="1" dirty="0"/>
+          </a:p>
+          <a:p>
+            <a:pPr marL="0" indent="0" algn="just">
+              <a:buNone/>
+            </a:pPr>
+            <a:endParaRPr lang="en-US" sz="3200" b="1" dirty="0"/>
+          </a:p>
+        </p:txBody>
+      </p:sp>
+    </p:spTree>
+    <p:extLst>
+      <p:ext uri="{BB962C8B-B14F-4D97-AF65-F5344CB8AC3E}">
+        <p14:creationId xmlns:p14="http://schemas.microsoft.com/office/powerpoint/2010/main" val="3234989703"/>
+      </p:ext>
+    </p:extLst>
+  </p:cSld>
+  <p:clrMapOvr>
+    <a:masterClrMapping/>
+  </p:clrMapOvr>
+</p:sld>
+</file>
+
+<file path=ppt/slides/slide16.xml><?xml version="1.0" encoding="utf-8"?>
+<p:sld xmlns:a="http://schemas.openxmlformats.org/drawingml/2006/main" xmlns:r="http://schemas.openxmlformats.org/officeDocument/2006/relationships" xmlns:p="http://schemas.openxmlformats.org/presentationml/2006/main">
+  <p:cSld>
+    <p:spTree>
+      <p:nvGrpSpPr>
+        <p:cNvPr id="1" name=""/>
+        <p:cNvGrpSpPr/>
+        <p:nvPr/>
+      </p:nvGrpSpPr>
+      <p:grpSpPr>
+        <a:xfrm>
+          <a:off x="0" y="0"/>
+          <a:ext cx="0" cy="0"/>
+          <a:chOff x="0" y="0"/>
+          <a:chExt cx="0" cy="0"/>
+        </a:xfrm>
+      </p:grpSpPr>
+      <p:sp>
+        <p:nvSpPr>
+          <p:cNvPr id="2" name="标题 1">
+            <a:extLst>
+              <a:ext uri="{FF2B5EF4-FFF2-40B4-BE49-F238E27FC236}">
+                <a16:creationId xmlns:a16="http://schemas.microsoft.com/office/drawing/2014/main" xmlns="" id="{BFED13D0-1777-7362-78DA-C791BAE10491}"/>
               </a:ext>
             </a:extLst>
           </p:cNvPr>
@@ -3986,7 +4476,7 @@
           <p:cNvPr id="3" name="内容占位符 2">
             <a:extLst>
               <a:ext uri="{FF2B5EF4-FFF2-40B4-BE49-F238E27FC236}">
-                <a16:creationId xmlns:a16="http://schemas.microsoft.com/office/drawing/2014/main" id="{780350DE-192C-DC5E-C6D5-B1C97C4347AB}"/>
+                <a16:creationId xmlns:a16="http://schemas.microsoft.com/office/drawing/2014/main" xmlns="" id="{780350DE-192C-DC5E-C6D5-B1C97C4347AB}"/>
               </a:ext>
             </a:extLst>
           </p:cNvPr>
@@ -4004,96 +4494,76 @@
           <a:p>
             <a:r>
               <a:rPr lang="en-US" b="0" u="sng" dirty="0">
-                <a:solidFill>
-                  <a:srgbClr val="D4D4D4"/>
-                </a:solidFill>
                 <a:effectLst/>
-                <a:latin typeface="Consolas" panose="020B0609020204030204" pitchFamily="49" charset="0"/>
+                <a:latin typeface="Calibri" pitchFamily="34" charset="0"/>
+                <a:cs typeface="Calibri" pitchFamily="34" charset="0"/>
               </a:rPr>
               <a:t>https://www.kalmanfilter.net/CN/default_cn.aspx</a:t>
             </a:r>
             <a:endParaRPr lang="en-US" b="0" dirty="0">
-              <a:solidFill>
-                <a:srgbClr val="D4D4D4"/>
-              </a:solidFill>
               <a:effectLst/>
-              <a:latin typeface="Consolas" panose="020B0609020204030204" pitchFamily="49" charset="0"/>
+              <a:latin typeface="Calibri" pitchFamily="34" charset="0"/>
+              <a:cs typeface="Calibri" pitchFamily="34" charset="0"/>
             </a:endParaRPr>
           </a:p>
           <a:p>
             <a:r>
               <a:rPr lang="en-US" b="0" u="sng" dirty="0">
-                <a:solidFill>
-                  <a:srgbClr val="D4D4D4"/>
-                </a:solidFill>
                 <a:effectLst/>
-                <a:latin typeface="Consolas" panose="020B0609020204030204" pitchFamily="49" charset="0"/>
+                <a:latin typeface="Calibri" pitchFamily="34" charset="0"/>
+                <a:cs typeface="Calibri" pitchFamily="34" charset="0"/>
               </a:rPr>
               <a:t>https://longaspire.github.io/blog/%E5%8D%A1%E5%B0%94%E6%9B%BC%E6%BB%A4%E6%B3%A2/</a:t>
             </a:r>
             <a:endParaRPr lang="en-US" b="0" dirty="0">
-              <a:solidFill>
-                <a:srgbClr val="D4D4D4"/>
-              </a:solidFill>
               <a:effectLst/>
-              <a:latin typeface="Consolas" panose="020B0609020204030204" pitchFamily="49" charset="0"/>
+              <a:latin typeface="Calibri" pitchFamily="34" charset="0"/>
+              <a:cs typeface="Calibri" pitchFamily="34" charset="0"/>
             </a:endParaRPr>
           </a:p>
           <a:p>
             <a:r>
               <a:rPr lang="en-US" b="0" u="sng" dirty="0">
-                <a:solidFill>
-                  <a:srgbClr val="D4D4D4"/>
-                </a:solidFill>
                 <a:effectLst/>
-                <a:latin typeface="Consolas" panose="020B0609020204030204" pitchFamily="49" charset="0"/>
+                <a:latin typeface="Calibri" pitchFamily="34" charset="0"/>
+                <a:cs typeface="Calibri" pitchFamily="34" charset="0"/>
               </a:rPr>
               <a:t>https://en.wikipedia.org/wiki/Kalman_filter</a:t>
             </a:r>
             <a:endParaRPr lang="en-US" b="0" dirty="0">
-              <a:solidFill>
-                <a:srgbClr val="D4D4D4"/>
-              </a:solidFill>
               <a:effectLst/>
-              <a:latin typeface="Consolas" panose="020B0609020204030204" pitchFamily="49" charset="0"/>
+              <a:latin typeface="Calibri" pitchFamily="34" charset="0"/>
+              <a:cs typeface="Calibri" pitchFamily="34" charset="0"/>
             </a:endParaRPr>
           </a:p>
           <a:p>
             <a:r>
               <a:rPr lang="en-US" b="0" u="sng" dirty="0">
-                <a:solidFill>
-                  <a:srgbClr val="D4D4D4"/>
-                </a:solidFill>
                 <a:effectLst/>
-                <a:latin typeface="Consolas" panose="020B0609020204030204" pitchFamily="49" charset="0"/>
+                <a:latin typeface="Calibri" pitchFamily="34" charset="0"/>
+                <a:cs typeface="Calibri" pitchFamily="34" charset="0"/>
               </a:rPr>
               <a:t>https://segmentfault.com/a/1190000000514987#item-1</a:t>
             </a:r>
             <a:endParaRPr lang="en-US" b="0" dirty="0">
-              <a:solidFill>
-                <a:srgbClr val="D4D4D4"/>
-              </a:solidFill>
               <a:effectLst/>
-              <a:latin typeface="Consolas" panose="020B0609020204030204" pitchFamily="49" charset="0"/>
+              <a:latin typeface="Calibri" pitchFamily="34" charset="0"/>
+              <a:cs typeface="Calibri" pitchFamily="34" charset="0"/>
             </a:endParaRPr>
           </a:p>
           <a:p>
             <a:r>
               <a:rPr lang="en-US" b="0" u="sng" dirty="0">
-                <a:solidFill>
-                  <a:srgbClr val="D4D4D4"/>
-                </a:solidFill>
                 <a:effectLst/>
-                <a:latin typeface="Consolas" panose="020B0609020204030204" pitchFamily="49" charset="0"/>
+                <a:latin typeface="Calibri" pitchFamily="34" charset="0"/>
+                <a:cs typeface="Calibri" pitchFamily="34" charset="0"/>
               </a:rPr>
               <a:t>https://www.youtube.com/watch?v=2-lu3GNbXM8</a:t>
             </a:r>
             <a:endParaRPr lang="en-US" b="0" dirty="0">
-              <a:solidFill>
-                <a:srgbClr val="D4D4D4"/>
-              </a:solidFill>
               <a:effectLst/>
-              <a:latin typeface="Consolas" panose="020B0609020204030204" pitchFamily="49" charset="0"/>
+              <a:latin typeface="Calibri" pitchFamily="34" charset="0"/>
+              <a:cs typeface="Calibri" pitchFamily="34" charset="0"/>
             </a:endParaRPr>
           </a:p>
           <a:p>
@@ -4136,7 +4606,7 @@
           <p:cNvPr id="2" name="标题 1">
             <a:extLst>
               <a:ext uri="{FF2B5EF4-FFF2-40B4-BE49-F238E27FC236}">
-                <a16:creationId xmlns:a16="http://schemas.microsoft.com/office/drawing/2014/main" id="{D86D4608-98F4-4324-A054-81A0D333A46B}"/>
+                <a16:creationId xmlns:a16="http://schemas.microsoft.com/office/drawing/2014/main" xmlns="" id="{D86D4608-98F4-4324-A054-81A0D333A46B}"/>
               </a:ext>
             </a:extLst>
           </p:cNvPr>
@@ -4164,7 +4634,7 @@
           <p:cNvPr id="3" name="内容占位符 2">
             <a:extLst>
               <a:ext uri="{FF2B5EF4-FFF2-40B4-BE49-F238E27FC236}">
-                <a16:creationId xmlns:a16="http://schemas.microsoft.com/office/drawing/2014/main" id="{BD98E641-3408-FBD2-97F5-5CD1CF1DB7BF}"/>
+                <a16:creationId xmlns:a16="http://schemas.microsoft.com/office/drawing/2014/main" xmlns="" id="{BD98E641-3408-FBD2-97F5-5CD1CF1DB7BF}"/>
               </a:ext>
             </a:extLst>
           </p:cNvPr>
@@ -4240,7 +4710,7 @@
           <p:cNvPr id="2" name="标题 1">
             <a:extLst>
               <a:ext uri="{FF2B5EF4-FFF2-40B4-BE49-F238E27FC236}">
-                <a16:creationId xmlns:a16="http://schemas.microsoft.com/office/drawing/2014/main" id="{93244E1B-52FB-177A-9CDA-F863A850CFAD}"/>
+                <a16:creationId xmlns:a16="http://schemas.microsoft.com/office/drawing/2014/main" xmlns="" id="{93244E1B-52FB-177A-9CDA-F863A850CFAD}"/>
               </a:ext>
             </a:extLst>
           </p:cNvPr>
@@ -4268,7 +4738,7 @@
           <p:cNvPr id="3" name="内容占位符 2">
             <a:extLst>
               <a:ext uri="{FF2B5EF4-FFF2-40B4-BE49-F238E27FC236}">
-                <a16:creationId xmlns:a16="http://schemas.microsoft.com/office/drawing/2014/main" id="{C02280F2-920F-6859-5BAA-056F0273CCB7}"/>
+                <a16:creationId xmlns:a16="http://schemas.microsoft.com/office/drawing/2014/main" xmlns="" id="{C02280F2-920F-6859-5BAA-056F0273CCB7}"/>
               </a:ext>
             </a:extLst>
           </p:cNvPr>
@@ -4298,11 +4768,7 @@
           <a:p>
             <a:r>
               <a:rPr lang="en-US" b="0" i="0" dirty="0">
-                <a:solidFill>
-                  <a:srgbClr val="2C3E50"/>
-                </a:solidFill>
                 <a:effectLst/>
-                <a:latin typeface="var(--font-family-heading)"/>
               </a:rPr>
               <a:t>Prediction</a:t>
             </a:r>
@@ -4323,7 +4789,7 @@
           <p:cNvPr id="5" name="图片 4">
             <a:extLst>
               <a:ext uri="{FF2B5EF4-FFF2-40B4-BE49-F238E27FC236}">
-                <a16:creationId xmlns:a16="http://schemas.microsoft.com/office/drawing/2014/main" id="{937C80C1-6061-F42A-9C66-2CCDD6EE339F}"/>
+                <a16:creationId xmlns:a16="http://schemas.microsoft.com/office/drawing/2014/main" xmlns="" id="{937C80C1-6061-F42A-9C66-2CCDD6EE339F}"/>
               </a:ext>
             </a:extLst>
           </p:cNvPr>
@@ -4340,7 +4806,7 @@
         </p:blipFill>
         <p:spPr>
           <a:xfrm>
-            <a:off x="3497660" y="3600241"/>
+            <a:off x="3497660" y="3491605"/>
             <a:ext cx="2769060" cy="1164264"/>
           </a:xfrm>
           <a:prstGeom prst="rect">
@@ -4353,7 +4819,7 @@
           <p:cNvPr id="9" name="图片 8">
             <a:extLst>
               <a:ext uri="{FF2B5EF4-FFF2-40B4-BE49-F238E27FC236}">
-                <a16:creationId xmlns:a16="http://schemas.microsoft.com/office/drawing/2014/main" id="{AD15792A-F729-C892-5BE4-1D6A6334C154}"/>
+                <a16:creationId xmlns:a16="http://schemas.microsoft.com/office/drawing/2014/main" xmlns="" id="{AD15792A-F729-C892-5BE4-1D6A6334C154}"/>
               </a:ext>
             </a:extLst>
           </p:cNvPr>
@@ -4413,7 +4879,7 @@
           <p:cNvPr id="2" name="标题 1">
             <a:extLst>
               <a:ext uri="{FF2B5EF4-FFF2-40B4-BE49-F238E27FC236}">
-                <a16:creationId xmlns:a16="http://schemas.microsoft.com/office/drawing/2014/main" id="{3FD0EBE6-ED64-004B-A7AE-A52C9E0CB054}"/>
+                <a16:creationId xmlns:a16="http://schemas.microsoft.com/office/drawing/2014/main" xmlns="" id="{3FD0EBE6-ED64-004B-A7AE-A52C9E0CB054}"/>
               </a:ext>
             </a:extLst>
           </p:cNvPr>
@@ -4431,7 +4897,15 @@
           <a:p>
             <a:r>
               <a:rPr lang="en-US" dirty="0"/>
-              <a:t>The Usage of Kalman Filter</a:t>
+              <a:t>The </a:t>
+            </a:r>
+            <a:r>
+              <a:rPr lang="en-US" dirty="0" smtClean="0"/>
+              <a:t>Domain Usage </a:t>
+            </a:r>
+            <a:r>
+              <a:rPr lang="en-US" dirty="0"/>
+              <a:t>of Kalman Filter</a:t>
             </a:r>
           </a:p>
         </p:txBody>
@@ -4441,7 +4915,7 @@
           <p:cNvPr id="3" name="内容占位符 2">
             <a:extLst>
               <a:ext uri="{FF2B5EF4-FFF2-40B4-BE49-F238E27FC236}">
-                <a16:creationId xmlns:a16="http://schemas.microsoft.com/office/drawing/2014/main" id="{4D61A00B-5B45-158E-F0F1-939ECF07428F}"/>
+                <a16:creationId xmlns:a16="http://schemas.microsoft.com/office/drawing/2014/main" xmlns="" id="{4D61A00B-5B45-158E-F0F1-939ECF07428F}"/>
               </a:ext>
             </a:extLst>
           </p:cNvPr>
@@ -4458,102 +4932,90 @@
           <a:lstStyle/>
           <a:p>
             <a:r>
-              <a:rPr lang="en-US" b="1" i="0" dirty="0">
+              <a:rPr lang="en-US" i="0" dirty="0">
                 <a:effectLst/>
-                <a:latin typeface="Söhne"/>
               </a:rPr>
               <a:t>Aerospace and Navigation</a:t>
             </a:r>
           </a:p>
           <a:p>
             <a:r>
-              <a:rPr lang="en-US" b="1" i="0" dirty="0">
+              <a:rPr lang="en-US" i="0" dirty="0">
                 <a:effectLst/>
-                <a:latin typeface="Söhne"/>
               </a:rPr>
               <a:t>Robotics</a:t>
             </a:r>
           </a:p>
           <a:p>
             <a:r>
-              <a:rPr lang="en-US" b="1" i="0" dirty="0">
+              <a:rPr lang="en-US" i="0" dirty="0">
                 <a:effectLst/>
-                <a:latin typeface="Söhne"/>
               </a:rPr>
               <a:t>Finance and Economics</a:t>
             </a:r>
             <a:r>
-              <a:rPr lang="en-US" b="0" i="0" dirty="0">
+              <a:rPr lang="en-US" i="0" dirty="0">
                 <a:solidFill>
                   <a:srgbClr val="374151"/>
                 </a:solidFill>
                 <a:effectLst/>
-                <a:latin typeface="Söhne"/>
               </a:rPr>
               <a:t>:</a:t>
             </a:r>
-            <a:endParaRPr lang="en-US" b="1" dirty="0">
+            <a:endParaRPr lang="en-US" dirty="0">
               <a:solidFill>
                 <a:srgbClr val="374151"/>
               </a:solidFill>
-              <a:latin typeface="Söhne"/>
             </a:endParaRPr>
           </a:p>
           <a:p>
             <a:r>
-              <a:rPr lang="en-US" b="1" i="0" dirty="0">
+              <a:rPr lang="en-US" i="0" dirty="0">
                 <a:effectLst/>
-                <a:latin typeface="Söhne"/>
               </a:rPr>
               <a:t>Signal Processing</a:t>
             </a:r>
-            <a:endParaRPr lang="en-US" b="1" i="0" dirty="0">
+            <a:endParaRPr lang="en-US" i="0" dirty="0">
               <a:solidFill>
                 <a:srgbClr val="374151"/>
               </a:solidFill>
               <a:effectLst/>
-              <a:latin typeface="Söhne"/>
             </a:endParaRPr>
           </a:p>
           <a:p>
             <a:r>
-              <a:rPr lang="en-US" b="1" i="0" dirty="0">
+              <a:rPr lang="en-US" i="0" dirty="0">
                 <a:effectLst/>
-                <a:latin typeface="Söhne"/>
               </a:rPr>
               <a:t>Weather Forecasting</a:t>
             </a:r>
-            <a:endParaRPr lang="en-US" b="1" dirty="0">
+            <a:endParaRPr lang="en-US" dirty="0">
               <a:solidFill>
                 <a:srgbClr val="374151"/>
               </a:solidFill>
-              <a:latin typeface="Söhne"/>
             </a:endParaRPr>
           </a:p>
           <a:p>
             <a:r>
-              <a:rPr lang="en-US" b="1" i="0" dirty="0">
+              <a:rPr lang="en-US" i="0" dirty="0">
                 <a:effectLst/>
-                <a:latin typeface="Söhne"/>
               </a:rPr>
               <a:t>Control Systems</a:t>
             </a:r>
             <a:r>
-              <a:rPr lang="en-US" b="0" i="0" dirty="0">
+              <a:rPr lang="en-US" i="0" dirty="0">
                 <a:solidFill>
                   <a:srgbClr val="374151"/>
                 </a:solidFill>
                 <a:effectLst/>
-                <a:latin typeface="Söhne"/>
               </a:rPr>
               <a:t>:</a:t>
             </a:r>
           </a:p>
           <a:p>
             <a:r>
-              <a:rPr lang="en-US" b="1" i="0" dirty="0">
+              <a:rPr lang="en-US" i="0" dirty="0">
                 <a:effectLst/>
-                <a:latin typeface="Söhne"/>
               </a:rPr>
               <a:t>Communication Systems</a:t>
             </a:r>
@@ -4596,7 +5058,7 @@
           <p:cNvPr id="2" name="标题 1">
             <a:extLst>
               <a:ext uri="{FF2B5EF4-FFF2-40B4-BE49-F238E27FC236}">
-                <a16:creationId xmlns:a16="http://schemas.microsoft.com/office/drawing/2014/main" id="{82AA09A9-AC22-5051-EE21-F2A27C4C131A}"/>
+                <a16:creationId xmlns:a16="http://schemas.microsoft.com/office/drawing/2014/main" xmlns="" id="{82AA09A9-AC22-5051-EE21-F2A27C4C131A}"/>
               </a:ext>
             </a:extLst>
           </p:cNvPr>
@@ -4624,7 +5086,7 @@
           <p:cNvPr id="1026" name="Picture 2" descr="Measure a gold">
             <a:extLst>
               <a:ext uri="{FF2B5EF4-FFF2-40B4-BE49-F238E27FC236}">
-                <a16:creationId xmlns:a16="http://schemas.microsoft.com/office/drawing/2014/main" id="{059CFA18-4C83-5F3A-6C2B-D64C147142A1}"/>
+                <a16:creationId xmlns:a16="http://schemas.microsoft.com/office/drawing/2014/main" xmlns="" id="{059CFA18-4C83-5F3A-6C2B-D64C147142A1}"/>
               </a:ext>
             </a:extLst>
           </p:cNvPr>
@@ -4671,7 +5133,7 @@
           <p:cNvPr id="1028" name="Picture 4" descr="Gold | Bulwik Jewellery">
             <a:extLst>
               <a:ext uri="{FF2B5EF4-FFF2-40B4-BE49-F238E27FC236}">
-                <a16:creationId xmlns:a16="http://schemas.microsoft.com/office/drawing/2014/main" id="{DF6C7BA2-8B2E-AF0F-2EE8-8687E8F6372D}"/>
+                <a16:creationId xmlns:a16="http://schemas.microsoft.com/office/drawing/2014/main" xmlns="" id="{DF6C7BA2-8B2E-AF0F-2EE8-8687E8F6372D}"/>
               </a:ext>
             </a:extLst>
           </p:cNvPr>
@@ -4748,7 +5210,7 @@
           <p:cNvPr id="2" name="标题 1">
             <a:extLst>
               <a:ext uri="{FF2B5EF4-FFF2-40B4-BE49-F238E27FC236}">
-                <a16:creationId xmlns:a16="http://schemas.microsoft.com/office/drawing/2014/main" id="{82AA09A9-AC22-5051-EE21-F2A27C4C131A}"/>
+                <a16:creationId xmlns:a16="http://schemas.microsoft.com/office/drawing/2014/main" xmlns="" id="{82AA09A9-AC22-5051-EE21-F2A27C4C131A}"/>
               </a:ext>
             </a:extLst>
           </p:cNvPr>
@@ -4776,7 +5238,7 @@
           <p:cNvPr id="1026" name="Picture 2" descr="Measure a gold">
             <a:extLst>
               <a:ext uri="{FF2B5EF4-FFF2-40B4-BE49-F238E27FC236}">
-                <a16:creationId xmlns:a16="http://schemas.microsoft.com/office/drawing/2014/main" id="{059CFA18-4C83-5F3A-6C2B-D64C147142A1}"/>
+                <a16:creationId xmlns:a16="http://schemas.microsoft.com/office/drawing/2014/main" xmlns="" id="{059CFA18-4C83-5F3A-6C2B-D64C147142A1}"/>
               </a:ext>
             </a:extLst>
           </p:cNvPr>
@@ -4823,7 +5285,7 @@
           <p:cNvPr id="1028" name="Picture 4" descr="Gold | Bulwik Jewellery">
             <a:extLst>
               <a:ext uri="{FF2B5EF4-FFF2-40B4-BE49-F238E27FC236}">
-                <a16:creationId xmlns:a16="http://schemas.microsoft.com/office/drawing/2014/main" id="{DF6C7BA2-8B2E-AF0F-2EE8-8687E8F6372D}"/>
+                <a16:creationId xmlns:a16="http://schemas.microsoft.com/office/drawing/2014/main" xmlns="" id="{DF6C7BA2-8B2E-AF0F-2EE8-8687E8F6372D}"/>
               </a:ext>
             </a:extLst>
           </p:cNvPr>
@@ -4870,7 +5332,7 @@
           <p:cNvPr id="4" name="图片 3">
             <a:extLst>
               <a:ext uri="{FF2B5EF4-FFF2-40B4-BE49-F238E27FC236}">
-                <a16:creationId xmlns:a16="http://schemas.microsoft.com/office/drawing/2014/main" id="{D3C87205-F7B7-9E30-DCD8-27B50F3911AF}"/>
+                <a16:creationId xmlns:a16="http://schemas.microsoft.com/office/drawing/2014/main" xmlns="" id="{D3C87205-F7B7-9E30-DCD8-27B50F3911AF}"/>
               </a:ext>
             </a:extLst>
           </p:cNvPr>
@@ -4929,7 +5391,7 @@
           <p:cNvPr id="2" name="标题 1">
             <a:extLst>
               <a:ext uri="{FF2B5EF4-FFF2-40B4-BE49-F238E27FC236}">
-                <a16:creationId xmlns:a16="http://schemas.microsoft.com/office/drawing/2014/main" id="{EE82346B-A7C5-EF04-816A-22A43A463747}"/>
+                <a16:creationId xmlns:a16="http://schemas.microsoft.com/office/drawing/2014/main" xmlns="" id="{EE82346B-A7C5-EF04-816A-22A43A463747}"/>
               </a:ext>
             </a:extLst>
           </p:cNvPr>
@@ -4957,7 +5419,7 @@
           <p:cNvPr id="3" name="内容占位符 2">
             <a:extLst>
               <a:ext uri="{FF2B5EF4-FFF2-40B4-BE49-F238E27FC236}">
-                <a16:creationId xmlns:a16="http://schemas.microsoft.com/office/drawing/2014/main" id="{BC4C3EB5-D9D3-B906-1B49-5EEDA39163CC}"/>
+                <a16:creationId xmlns:a16="http://schemas.microsoft.com/office/drawing/2014/main" xmlns="" id="{BC4C3EB5-D9D3-B906-1B49-5EEDA39163CC}"/>
               </a:ext>
             </a:extLst>
           </p:cNvPr>
@@ -4982,7 +5444,7 @@
           <p:cNvPr id="5" name="图片 4">
             <a:extLst>
               <a:ext uri="{FF2B5EF4-FFF2-40B4-BE49-F238E27FC236}">
-                <a16:creationId xmlns:a16="http://schemas.microsoft.com/office/drawing/2014/main" id="{915C136C-4C50-50A7-EE1D-98C4ADD1BB03}"/>
+                <a16:creationId xmlns:a16="http://schemas.microsoft.com/office/drawing/2014/main" xmlns="" id="{915C136C-4C50-50A7-EE1D-98C4ADD1BB03}"/>
               </a:ext>
             </a:extLst>
           </p:cNvPr>
@@ -5042,7 +5504,7 @@
           <p:cNvPr id="2" name="标题 1">
             <a:extLst>
               <a:ext uri="{FF2B5EF4-FFF2-40B4-BE49-F238E27FC236}">
-                <a16:creationId xmlns:a16="http://schemas.microsoft.com/office/drawing/2014/main" id="{C9127D9B-9414-77EC-0A68-29FD840F02E9}"/>
+                <a16:creationId xmlns:a16="http://schemas.microsoft.com/office/drawing/2014/main" xmlns="" id="{C9127D9B-9414-77EC-0A68-29FD840F02E9}"/>
               </a:ext>
             </a:extLst>
           </p:cNvPr>
@@ -5070,7 +5532,7 @@
           <p:cNvPr id="3" name="内容占位符 2">
             <a:extLst>
               <a:ext uri="{FF2B5EF4-FFF2-40B4-BE49-F238E27FC236}">
-                <a16:creationId xmlns:a16="http://schemas.microsoft.com/office/drawing/2014/main" id="{6682DEB9-1F3F-86E6-2C1D-4B28A6FA27E0}"/>
+                <a16:creationId xmlns:a16="http://schemas.microsoft.com/office/drawing/2014/main" xmlns="" id="{6682DEB9-1F3F-86E6-2C1D-4B28A6FA27E0}"/>
               </a:ext>
             </a:extLst>
           </p:cNvPr>
@@ -5095,7 +5557,7 @@
           <p:cNvPr id="5" name="图片 4">
             <a:extLst>
               <a:ext uri="{FF2B5EF4-FFF2-40B4-BE49-F238E27FC236}">
-                <a16:creationId xmlns:a16="http://schemas.microsoft.com/office/drawing/2014/main" id="{12BFB8BA-39AE-F058-2C8E-11AEA6ADB350}"/>
+                <a16:creationId xmlns:a16="http://schemas.microsoft.com/office/drawing/2014/main" xmlns="" id="{12BFB8BA-39AE-F058-2C8E-11AEA6ADB350}"/>
               </a:ext>
             </a:extLst>
           </p:cNvPr>
@@ -5155,7 +5617,7 @@
           <p:cNvPr id="2" name="标题 1">
             <a:extLst>
               <a:ext uri="{FF2B5EF4-FFF2-40B4-BE49-F238E27FC236}">
-                <a16:creationId xmlns:a16="http://schemas.microsoft.com/office/drawing/2014/main" id="{887EC568-F726-48DA-C182-951B1E028ECC}"/>
+                <a16:creationId xmlns:a16="http://schemas.microsoft.com/office/drawing/2014/main" xmlns="" id="{C9127D9B-9414-77EC-0A68-29FD840F02E9}"/>
               </a:ext>
             </a:extLst>
           </p:cNvPr>
@@ -5173,7 +5635,7 @@
           <a:p>
             <a:r>
               <a:rPr lang="en-US" dirty="0"/>
-              <a:t>Example – Track a Car</a:t>
+              <a:t>Example – Weight a Gold</a:t>
             </a:r>
           </a:p>
         </p:txBody>
@@ -5183,7 +5645,7 @@
           <p:cNvPr id="3" name="内容占位符 2">
             <a:extLst>
               <a:ext uri="{FF2B5EF4-FFF2-40B4-BE49-F238E27FC236}">
-                <a16:creationId xmlns:a16="http://schemas.microsoft.com/office/drawing/2014/main" id="{B2FE7A0C-1F7E-AAD3-040B-A76C36D5CAD8}"/>
+                <a16:creationId xmlns:a16="http://schemas.microsoft.com/office/drawing/2014/main" xmlns="" id="{6682DEB9-1F3F-86E6-2C1D-4B28A6FA27E0}"/>
               </a:ext>
             </a:extLst>
           </p:cNvPr>
@@ -5205,13 +5667,7 @@
       </p:sp>
       <p:pic>
         <p:nvPicPr>
-          <p:cNvPr id="2050" name="Picture 2" descr="Alt text">
-            <a:extLst>
-              <a:ext uri="{FF2B5EF4-FFF2-40B4-BE49-F238E27FC236}">
-                <a16:creationId xmlns:a16="http://schemas.microsoft.com/office/drawing/2014/main" id="{7CC6E176-6B19-029A-688A-F02FEBA64EBE}"/>
-              </a:ext>
-            </a:extLst>
-          </p:cNvPr>
+          <p:cNvPr id="3074" name="Picture 2" descr="Measurements vs. True value vs. Estimates"/>
           <p:cNvPicPr>
             <a:picLocks noChangeAspect="1" noChangeArrowheads="1"/>
           </p:cNvPicPr>
@@ -5232,8 +5688,8 @@
         </p:blipFill>
         <p:spPr bwMode="auto">
           <a:xfrm>
-            <a:off x="838200" y="1825625"/>
-            <a:ext cx="6814886" cy="2358200"/>
+            <a:off x="642795" y="1758269"/>
+            <a:ext cx="8845390" cy="4762903"/>
           </a:xfrm>
           <a:prstGeom prst="rect">
             <a:avLst/>
@@ -5253,7 +5709,7 @@
     </p:spTree>
     <p:extLst>
       <p:ext uri="{BB962C8B-B14F-4D97-AF65-F5344CB8AC3E}">
-        <p14:creationId xmlns:p14="http://schemas.microsoft.com/office/powerpoint/2010/main" val="3052349854"/>
+        <p14:creationId xmlns:p14="http://schemas.microsoft.com/office/powerpoint/2010/main" val="2141178421"/>
       </p:ext>
     </p:extLst>
   </p:cSld>
@@ -5306,7 +5762,7 @@
     </a:clrScheme>
     <a:fontScheme name="Office">
       <a:majorFont>
-        <a:latin typeface="Calibri Light" panose="020F0302020204030204"/>
+        <a:latin typeface="Calibri Light"/>
         <a:ea typeface=""/>
         <a:cs typeface=""/>
         <a:font script="Jpan" typeface="游ゴシック Light"/>
@@ -5358,7 +5814,7 @@
         <a:font script="Tfng" typeface="Ebrima"/>
       </a:majorFont>
       <a:minorFont>
-        <a:latin typeface="Calibri" panose="020F0502020204030204"/>
+        <a:latin typeface="Calibri"/>
         <a:ea typeface=""/>
         <a:cs typeface=""/>
         <a:font script="Jpan" typeface="游ゴシック"/>
@@ -5552,7 +6008,7 @@
   <a:extraClrSchemeLst/>
   <a:extLst>
     <a:ext uri="{05A4C25C-085E-4340-85A3-A5531E510DB2}">
-      <thm15:themeFamily xmlns:thm15="http://schemas.microsoft.com/office/thememl/2012/main" name="Office Theme" id="{62F939B6-93AF-4DB8-9C6B-D6C7DFDC589F}" vid="{4A3C46E8-61CC-4603-A589-7422A47A8E4A}"/>
+      <thm15:themeFamily xmlns:thm15="http://schemas.microsoft.com/office/thememl/2012/main" xmlns="" name="Office Theme" id="{62F939B6-93AF-4DB8-9C6B-D6C7DFDC589F}" vid="{4A3C46E8-61CC-4603-A589-7422A47A8E4A}"/>
     </a:ext>
   </a:extLst>
 </a:theme>

</xml_diff>

<commit_message>
Correct some errors on slides
</commit_message>
<xml_diff>
--- a/src/.vuepress/public/data/unisa/AdvancedAnalytic1/project/Kalman Filter.pptx
+++ b/src/.vuepress/public/data/unisa/AdvancedAnalytic1/project/Kalman Filter.pptx
@@ -144,7 +144,7 @@
           <p:cNvPr id="2" name="标题 1">
             <a:extLst>
               <a:ext uri="{FF2B5EF4-FFF2-40B4-BE49-F238E27FC236}">
-                <a16:creationId xmlns:a16="http://schemas.microsoft.com/office/drawing/2014/main" xmlns="" id="{10F33BF8-FD8E-786C-E15E-E839FDF28F95}"/>
+                <a16:creationId xmlns="" xmlns:a16="http://schemas.microsoft.com/office/drawing/2014/main" id="{10F33BF8-FD8E-786C-E15E-E839FDF28F95}"/>
               </a:ext>
             </a:extLst>
           </p:cNvPr>
@@ -182,7 +182,7 @@
           <p:cNvPr id="3" name="副标题 2">
             <a:extLst>
               <a:ext uri="{FF2B5EF4-FFF2-40B4-BE49-F238E27FC236}">
-                <a16:creationId xmlns:a16="http://schemas.microsoft.com/office/drawing/2014/main" xmlns="" id="{9AC2F9CB-7901-1897-0622-D26554C82DCD}"/>
+                <a16:creationId xmlns="" xmlns:a16="http://schemas.microsoft.com/office/drawing/2014/main" id="{9AC2F9CB-7901-1897-0622-D26554C82DCD}"/>
               </a:ext>
             </a:extLst>
           </p:cNvPr>
@@ -253,7 +253,7 @@
           <p:cNvPr id="4" name="日期占位符 3">
             <a:extLst>
               <a:ext uri="{FF2B5EF4-FFF2-40B4-BE49-F238E27FC236}">
-                <a16:creationId xmlns:a16="http://schemas.microsoft.com/office/drawing/2014/main" xmlns="" id="{7E582C05-515F-B6CD-BAAD-A85C6E8EE755}"/>
+                <a16:creationId xmlns="" xmlns:a16="http://schemas.microsoft.com/office/drawing/2014/main" id="{7E582C05-515F-B6CD-BAAD-A85C6E8EE755}"/>
               </a:ext>
             </a:extLst>
           </p:cNvPr>
@@ -282,7 +282,7 @@
           <p:cNvPr id="5" name="页脚占位符 4">
             <a:extLst>
               <a:ext uri="{FF2B5EF4-FFF2-40B4-BE49-F238E27FC236}">
-                <a16:creationId xmlns:a16="http://schemas.microsoft.com/office/drawing/2014/main" xmlns="" id="{E3C4F145-A780-D801-34B1-952578D06BB7}"/>
+                <a16:creationId xmlns="" xmlns:a16="http://schemas.microsoft.com/office/drawing/2014/main" id="{E3C4F145-A780-D801-34B1-952578D06BB7}"/>
               </a:ext>
             </a:extLst>
           </p:cNvPr>
@@ -307,7 +307,7 @@
           <p:cNvPr id="6" name="灯片编号占位符 5">
             <a:extLst>
               <a:ext uri="{FF2B5EF4-FFF2-40B4-BE49-F238E27FC236}">
-                <a16:creationId xmlns:a16="http://schemas.microsoft.com/office/drawing/2014/main" xmlns="" id="{643C2776-D61B-1BE0-DAD9-9115B8BF85AE}"/>
+                <a16:creationId xmlns="" xmlns:a16="http://schemas.microsoft.com/office/drawing/2014/main" id="{643C2776-D61B-1BE0-DAD9-9115B8BF85AE}"/>
               </a:ext>
             </a:extLst>
           </p:cNvPr>
@@ -366,7 +366,7 @@
           <p:cNvPr id="2" name="标题 1">
             <a:extLst>
               <a:ext uri="{FF2B5EF4-FFF2-40B4-BE49-F238E27FC236}">
-                <a16:creationId xmlns:a16="http://schemas.microsoft.com/office/drawing/2014/main" xmlns="" id="{EA6036EE-75BD-2041-346A-9751132F17EB}"/>
+                <a16:creationId xmlns="" xmlns:a16="http://schemas.microsoft.com/office/drawing/2014/main" id="{EA6036EE-75BD-2041-346A-9751132F17EB}"/>
               </a:ext>
             </a:extLst>
           </p:cNvPr>
@@ -395,7 +395,7 @@
           <p:cNvPr id="3" name="竖排文字占位符 2">
             <a:extLst>
               <a:ext uri="{FF2B5EF4-FFF2-40B4-BE49-F238E27FC236}">
-                <a16:creationId xmlns:a16="http://schemas.microsoft.com/office/drawing/2014/main" xmlns="" id="{35A7DEB4-59FC-F94E-CE1E-1BAE867E1B52}"/>
+                <a16:creationId xmlns="" xmlns:a16="http://schemas.microsoft.com/office/drawing/2014/main" id="{35A7DEB4-59FC-F94E-CE1E-1BAE867E1B52}"/>
               </a:ext>
             </a:extLst>
           </p:cNvPr>
@@ -453,7 +453,7 @@
           <p:cNvPr id="4" name="日期占位符 3">
             <a:extLst>
               <a:ext uri="{FF2B5EF4-FFF2-40B4-BE49-F238E27FC236}">
-                <a16:creationId xmlns:a16="http://schemas.microsoft.com/office/drawing/2014/main" xmlns="" id="{FAF04A84-931B-567B-8BA7-1CFAA44D303E}"/>
+                <a16:creationId xmlns="" xmlns:a16="http://schemas.microsoft.com/office/drawing/2014/main" id="{FAF04A84-931B-567B-8BA7-1CFAA44D303E}"/>
               </a:ext>
             </a:extLst>
           </p:cNvPr>
@@ -482,7 +482,7 @@
           <p:cNvPr id="5" name="页脚占位符 4">
             <a:extLst>
               <a:ext uri="{FF2B5EF4-FFF2-40B4-BE49-F238E27FC236}">
-                <a16:creationId xmlns:a16="http://schemas.microsoft.com/office/drawing/2014/main" xmlns="" id="{8C580D2B-CF67-5316-F00F-82BEBDA94534}"/>
+                <a16:creationId xmlns="" xmlns:a16="http://schemas.microsoft.com/office/drawing/2014/main" id="{8C580D2B-CF67-5316-F00F-82BEBDA94534}"/>
               </a:ext>
             </a:extLst>
           </p:cNvPr>
@@ -507,7 +507,7 @@
           <p:cNvPr id="6" name="灯片编号占位符 5">
             <a:extLst>
               <a:ext uri="{FF2B5EF4-FFF2-40B4-BE49-F238E27FC236}">
-                <a16:creationId xmlns:a16="http://schemas.microsoft.com/office/drawing/2014/main" xmlns="" id="{FB3F5507-C9AC-5F2D-6392-B66544928DFA}"/>
+                <a16:creationId xmlns="" xmlns:a16="http://schemas.microsoft.com/office/drawing/2014/main" id="{FB3F5507-C9AC-5F2D-6392-B66544928DFA}"/>
               </a:ext>
             </a:extLst>
           </p:cNvPr>
@@ -566,7 +566,7 @@
           <p:cNvPr id="2" name="竖排标题 1">
             <a:extLst>
               <a:ext uri="{FF2B5EF4-FFF2-40B4-BE49-F238E27FC236}">
-                <a16:creationId xmlns:a16="http://schemas.microsoft.com/office/drawing/2014/main" xmlns="" id="{FF963630-547A-D682-588A-9B3BF4A2BF47}"/>
+                <a16:creationId xmlns="" xmlns:a16="http://schemas.microsoft.com/office/drawing/2014/main" id="{FF963630-547A-D682-588A-9B3BF4A2BF47}"/>
               </a:ext>
             </a:extLst>
           </p:cNvPr>
@@ -600,7 +600,7 @@
           <p:cNvPr id="3" name="竖排文字占位符 2">
             <a:extLst>
               <a:ext uri="{FF2B5EF4-FFF2-40B4-BE49-F238E27FC236}">
-                <a16:creationId xmlns:a16="http://schemas.microsoft.com/office/drawing/2014/main" xmlns="" id="{0441B8FB-15EA-E2DB-E546-0FDFA74E648A}"/>
+                <a16:creationId xmlns="" xmlns:a16="http://schemas.microsoft.com/office/drawing/2014/main" id="{0441B8FB-15EA-E2DB-E546-0FDFA74E648A}"/>
               </a:ext>
             </a:extLst>
           </p:cNvPr>
@@ -663,7 +663,7 @@
           <p:cNvPr id="4" name="日期占位符 3">
             <a:extLst>
               <a:ext uri="{FF2B5EF4-FFF2-40B4-BE49-F238E27FC236}">
-                <a16:creationId xmlns:a16="http://schemas.microsoft.com/office/drawing/2014/main" xmlns="" id="{E7099FBA-3318-F430-9238-CE6D093F7B06}"/>
+                <a16:creationId xmlns="" xmlns:a16="http://schemas.microsoft.com/office/drawing/2014/main" id="{E7099FBA-3318-F430-9238-CE6D093F7B06}"/>
               </a:ext>
             </a:extLst>
           </p:cNvPr>
@@ -692,7 +692,7 @@
           <p:cNvPr id="5" name="页脚占位符 4">
             <a:extLst>
               <a:ext uri="{FF2B5EF4-FFF2-40B4-BE49-F238E27FC236}">
-                <a16:creationId xmlns:a16="http://schemas.microsoft.com/office/drawing/2014/main" xmlns="" id="{B3F16089-F829-DD68-5D3F-2175104F0EF8}"/>
+                <a16:creationId xmlns="" xmlns:a16="http://schemas.microsoft.com/office/drawing/2014/main" id="{B3F16089-F829-DD68-5D3F-2175104F0EF8}"/>
               </a:ext>
             </a:extLst>
           </p:cNvPr>
@@ -717,7 +717,7 @@
           <p:cNvPr id="6" name="灯片编号占位符 5">
             <a:extLst>
               <a:ext uri="{FF2B5EF4-FFF2-40B4-BE49-F238E27FC236}">
-                <a16:creationId xmlns:a16="http://schemas.microsoft.com/office/drawing/2014/main" xmlns="" id="{284F7E61-C042-2616-1A4C-8239F8AD939F}"/>
+                <a16:creationId xmlns="" xmlns:a16="http://schemas.microsoft.com/office/drawing/2014/main" id="{284F7E61-C042-2616-1A4C-8239F8AD939F}"/>
               </a:ext>
             </a:extLst>
           </p:cNvPr>
@@ -776,7 +776,7 @@
           <p:cNvPr id="2" name="标题 1">
             <a:extLst>
               <a:ext uri="{FF2B5EF4-FFF2-40B4-BE49-F238E27FC236}">
-                <a16:creationId xmlns:a16="http://schemas.microsoft.com/office/drawing/2014/main" xmlns="" id="{07EA60D0-A96A-7BA3-8151-D2426ABEB894}"/>
+                <a16:creationId xmlns="" xmlns:a16="http://schemas.microsoft.com/office/drawing/2014/main" id="{07EA60D0-A96A-7BA3-8151-D2426ABEB894}"/>
               </a:ext>
             </a:extLst>
           </p:cNvPr>
@@ -805,7 +805,7 @@
           <p:cNvPr id="3" name="内容占位符 2">
             <a:extLst>
               <a:ext uri="{FF2B5EF4-FFF2-40B4-BE49-F238E27FC236}">
-                <a16:creationId xmlns:a16="http://schemas.microsoft.com/office/drawing/2014/main" xmlns="" id="{8995B592-6FF4-F1CF-0AD8-196E556B8A02}"/>
+                <a16:creationId xmlns="" xmlns:a16="http://schemas.microsoft.com/office/drawing/2014/main" id="{8995B592-6FF4-F1CF-0AD8-196E556B8A02}"/>
               </a:ext>
             </a:extLst>
           </p:cNvPr>
@@ -863,7 +863,7 @@
           <p:cNvPr id="4" name="日期占位符 3">
             <a:extLst>
               <a:ext uri="{FF2B5EF4-FFF2-40B4-BE49-F238E27FC236}">
-                <a16:creationId xmlns:a16="http://schemas.microsoft.com/office/drawing/2014/main" xmlns="" id="{F688347B-553B-FB7C-071A-8F8B9CFAAA17}"/>
+                <a16:creationId xmlns="" xmlns:a16="http://schemas.microsoft.com/office/drawing/2014/main" id="{F688347B-553B-FB7C-071A-8F8B9CFAAA17}"/>
               </a:ext>
             </a:extLst>
           </p:cNvPr>
@@ -892,7 +892,7 @@
           <p:cNvPr id="5" name="页脚占位符 4">
             <a:extLst>
               <a:ext uri="{FF2B5EF4-FFF2-40B4-BE49-F238E27FC236}">
-                <a16:creationId xmlns:a16="http://schemas.microsoft.com/office/drawing/2014/main" xmlns="" id="{6204CF4E-0B10-2210-EBC6-A8F0445FC0D1}"/>
+                <a16:creationId xmlns="" xmlns:a16="http://schemas.microsoft.com/office/drawing/2014/main" id="{6204CF4E-0B10-2210-EBC6-A8F0445FC0D1}"/>
               </a:ext>
             </a:extLst>
           </p:cNvPr>
@@ -917,7 +917,7 @@
           <p:cNvPr id="6" name="灯片编号占位符 5">
             <a:extLst>
               <a:ext uri="{FF2B5EF4-FFF2-40B4-BE49-F238E27FC236}">
-                <a16:creationId xmlns:a16="http://schemas.microsoft.com/office/drawing/2014/main" xmlns="" id="{CF57CACF-E97F-6DF7-EC7C-9F8F35C17F00}"/>
+                <a16:creationId xmlns="" xmlns:a16="http://schemas.microsoft.com/office/drawing/2014/main" id="{CF57CACF-E97F-6DF7-EC7C-9F8F35C17F00}"/>
               </a:ext>
             </a:extLst>
           </p:cNvPr>
@@ -976,7 +976,7 @@
           <p:cNvPr id="2" name="标题 1">
             <a:extLst>
               <a:ext uri="{FF2B5EF4-FFF2-40B4-BE49-F238E27FC236}">
-                <a16:creationId xmlns:a16="http://schemas.microsoft.com/office/drawing/2014/main" xmlns="" id="{CE67FC3D-1EFA-9088-66D0-E3063BBDFCCF}"/>
+                <a16:creationId xmlns="" xmlns:a16="http://schemas.microsoft.com/office/drawing/2014/main" id="{CE67FC3D-1EFA-9088-66D0-E3063BBDFCCF}"/>
               </a:ext>
             </a:extLst>
           </p:cNvPr>
@@ -1014,7 +1014,7 @@
           <p:cNvPr id="3" name="文本占位符 2">
             <a:extLst>
               <a:ext uri="{FF2B5EF4-FFF2-40B4-BE49-F238E27FC236}">
-                <a16:creationId xmlns:a16="http://schemas.microsoft.com/office/drawing/2014/main" xmlns="" id="{74FDC549-C0B9-87F6-5635-A3153B46A35F}"/>
+                <a16:creationId xmlns="" xmlns:a16="http://schemas.microsoft.com/office/drawing/2014/main" id="{74FDC549-C0B9-87F6-5635-A3153B46A35F}"/>
               </a:ext>
             </a:extLst>
           </p:cNvPr>
@@ -1139,7 +1139,7 @@
           <p:cNvPr id="4" name="日期占位符 3">
             <a:extLst>
               <a:ext uri="{FF2B5EF4-FFF2-40B4-BE49-F238E27FC236}">
-                <a16:creationId xmlns:a16="http://schemas.microsoft.com/office/drawing/2014/main" xmlns="" id="{18304B00-38CB-B596-9C8C-B7949712E01E}"/>
+                <a16:creationId xmlns="" xmlns:a16="http://schemas.microsoft.com/office/drawing/2014/main" id="{18304B00-38CB-B596-9C8C-B7949712E01E}"/>
               </a:ext>
             </a:extLst>
           </p:cNvPr>
@@ -1168,7 +1168,7 @@
           <p:cNvPr id="5" name="页脚占位符 4">
             <a:extLst>
               <a:ext uri="{FF2B5EF4-FFF2-40B4-BE49-F238E27FC236}">
-                <a16:creationId xmlns:a16="http://schemas.microsoft.com/office/drawing/2014/main" xmlns="" id="{0AECB766-FFA2-24BC-153B-CA2622A7D8B4}"/>
+                <a16:creationId xmlns="" xmlns:a16="http://schemas.microsoft.com/office/drawing/2014/main" id="{0AECB766-FFA2-24BC-153B-CA2622A7D8B4}"/>
               </a:ext>
             </a:extLst>
           </p:cNvPr>
@@ -1193,7 +1193,7 @@
           <p:cNvPr id="6" name="灯片编号占位符 5">
             <a:extLst>
               <a:ext uri="{FF2B5EF4-FFF2-40B4-BE49-F238E27FC236}">
-                <a16:creationId xmlns:a16="http://schemas.microsoft.com/office/drawing/2014/main" xmlns="" id="{C37203E8-005F-F530-D6EC-FFD3FA376590}"/>
+                <a16:creationId xmlns="" xmlns:a16="http://schemas.microsoft.com/office/drawing/2014/main" id="{C37203E8-005F-F530-D6EC-FFD3FA376590}"/>
               </a:ext>
             </a:extLst>
           </p:cNvPr>
@@ -1252,7 +1252,7 @@
           <p:cNvPr id="2" name="标题 1">
             <a:extLst>
               <a:ext uri="{FF2B5EF4-FFF2-40B4-BE49-F238E27FC236}">
-                <a16:creationId xmlns:a16="http://schemas.microsoft.com/office/drawing/2014/main" xmlns="" id="{81BB6436-DABC-EA59-16D2-57D8BEB021D9}"/>
+                <a16:creationId xmlns="" xmlns:a16="http://schemas.microsoft.com/office/drawing/2014/main" id="{81BB6436-DABC-EA59-16D2-57D8BEB021D9}"/>
               </a:ext>
             </a:extLst>
           </p:cNvPr>
@@ -1281,7 +1281,7 @@
           <p:cNvPr id="3" name="内容占位符 2">
             <a:extLst>
               <a:ext uri="{FF2B5EF4-FFF2-40B4-BE49-F238E27FC236}">
-                <a16:creationId xmlns:a16="http://schemas.microsoft.com/office/drawing/2014/main" xmlns="" id="{333F17B2-88DA-F787-56F4-1765242A77DF}"/>
+                <a16:creationId xmlns="" xmlns:a16="http://schemas.microsoft.com/office/drawing/2014/main" id="{333F17B2-88DA-F787-56F4-1765242A77DF}"/>
               </a:ext>
             </a:extLst>
           </p:cNvPr>
@@ -1344,7 +1344,7 @@
           <p:cNvPr id="4" name="内容占位符 3">
             <a:extLst>
               <a:ext uri="{FF2B5EF4-FFF2-40B4-BE49-F238E27FC236}">
-                <a16:creationId xmlns:a16="http://schemas.microsoft.com/office/drawing/2014/main" xmlns="" id="{23BA2EE3-B444-FF67-B4EA-11FDF0E5061D}"/>
+                <a16:creationId xmlns="" xmlns:a16="http://schemas.microsoft.com/office/drawing/2014/main" id="{23BA2EE3-B444-FF67-B4EA-11FDF0E5061D}"/>
               </a:ext>
             </a:extLst>
           </p:cNvPr>
@@ -1407,7 +1407,7 @@
           <p:cNvPr id="5" name="日期占位符 4">
             <a:extLst>
               <a:ext uri="{FF2B5EF4-FFF2-40B4-BE49-F238E27FC236}">
-                <a16:creationId xmlns:a16="http://schemas.microsoft.com/office/drawing/2014/main" xmlns="" id="{FE56265B-DC6C-28F4-81DB-D7F60B054010}"/>
+                <a16:creationId xmlns="" xmlns:a16="http://schemas.microsoft.com/office/drawing/2014/main" id="{FE56265B-DC6C-28F4-81DB-D7F60B054010}"/>
               </a:ext>
             </a:extLst>
           </p:cNvPr>
@@ -1436,7 +1436,7 @@
           <p:cNvPr id="6" name="页脚占位符 5">
             <a:extLst>
               <a:ext uri="{FF2B5EF4-FFF2-40B4-BE49-F238E27FC236}">
-                <a16:creationId xmlns:a16="http://schemas.microsoft.com/office/drawing/2014/main" xmlns="" id="{83EC8090-BD4F-CDCD-9C61-5123F78AC20A}"/>
+                <a16:creationId xmlns="" xmlns:a16="http://schemas.microsoft.com/office/drawing/2014/main" id="{83EC8090-BD4F-CDCD-9C61-5123F78AC20A}"/>
               </a:ext>
             </a:extLst>
           </p:cNvPr>
@@ -1461,7 +1461,7 @@
           <p:cNvPr id="7" name="灯片编号占位符 6">
             <a:extLst>
               <a:ext uri="{FF2B5EF4-FFF2-40B4-BE49-F238E27FC236}">
-                <a16:creationId xmlns:a16="http://schemas.microsoft.com/office/drawing/2014/main" xmlns="" id="{C226ACE0-F80E-3F73-E8B0-CF76AF97F25E}"/>
+                <a16:creationId xmlns="" xmlns:a16="http://schemas.microsoft.com/office/drawing/2014/main" id="{C226ACE0-F80E-3F73-E8B0-CF76AF97F25E}"/>
               </a:ext>
             </a:extLst>
           </p:cNvPr>
@@ -1520,7 +1520,7 @@
           <p:cNvPr id="2" name="标题 1">
             <a:extLst>
               <a:ext uri="{FF2B5EF4-FFF2-40B4-BE49-F238E27FC236}">
-                <a16:creationId xmlns:a16="http://schemas.microsoft.com/office/drawing/2014/main" xmlns="" id="{50BE3C57-7CD4-B732-EC2A-8DE16644555C}"/>
+                <a16:creationId xmlns="" xmlns:a16="http://schemas.microsoft.com/office/drawing/2014/main" id="{50BE3C57-7CD4-B732-EC2A-8DE16644555C}"/>
               </a:ext>
             </a:extLst>
           </p:cNvPr>
@@ -1554,7 +1554,7 @@
           <p:cNvPr id="3" name="文本占位符 2">
             <a:extLst>
               <a:ext uri="{FF2B5EF4-FFF2-40B4-BE49-F238E27FC236}">
-                <a16:creationId xmlns:a16="http://schemas.microsoft.com/office/drawing/2014/main" xmlns="" id="{B43143F4-2584-0768-FED4-4E3F3A8F20AF}"/>
+                <a16:creationId xmlns="" xmlns:a16="http://schemas.microsoft.com/office/drawing/2014/main" id="{B43143F4-2584-0768-FED4-4E3F3A8F20AF}"/>
               </a:ext>
             </a:extLst>
           </p:cNvPr>
@@ -1625,7 +1625,7 @@
           <p:cNvPr id="4" name="内容占位符 3">
             <a:extLst>
               <a:ext uri="{FF2B5EF4-FFF2-40B4-BE49-F238E27FC236}">
-                <a16:creationId xmlns:a16="http://schemas.microsoft.com/office/drawing/2014/main" xmlns="" id="{2F128599-7522-0440-5350-B3C70CC4A24C}"/>
+                <a16:creationId xmlns="" xmlns:a16="http://schemas.microsoft.com/office/drawing/2014/main" id="{2F128599-7522-0440-5350-B3C70CC4A24C}"/>
               </a:ext>
             </a:extLst>
           </p:cNvPr>
@@ -1688,7 +1688,7 @@
           <p:cNvPr id="5" name="文本占位符 4">
             <a:extLst>
               <a:ext uri="{FF2B5EF4-FFF2-40B4-BE49-F238E27FC236}">
-                <a16:creationId xmlns:a16="http://schemas.microsoft.com/office/drawing/2014/main" xmlns="" id="{9F0B35A0-7A68-0D8C-991E-ADF73C8FBED5}"/>
+                <a16:creationId xmlns="" xmlns:a16="http://schemas.microsoft.com/office/drawing/2014/main" id="{9F0B35A0-7A68-0D8C-991E-ADF73C8FBED5}"/>
               </a:ext>
             </a:extLst>
           </p:cNvPr>
@@ -1759,7 +1759,7 @@
           <p:cNvPr id="6" name="内容占位符 5">
             <a:extLst>
               <a:ext uri="{FF2B5EF4-FFF2-40B4-BE49-F238E27FC236}">
-                <a16:creationId xmlns:a16="http://schemas.microsoft.com/office/drawing/2014/main" xmlns="" id="{F802823B-E595-5F81-D71F-B0305CAA1581}"/>
+                <a16:creationId xmlns="" xmlns:a16="http://schemas.microsoft.com/office/drawing/2014/main" id="{F802823B-E595-5F81-D71F-B0305CAA1581}"/>
               </a:ext>
             </a:extLst>
           </p:cNvPr>
@@ -1822,7 +1822,7 @@
           <p:cNvPr id="7" name="日期占位符 6">
             <a:extLst>
               <a:ext uri="{FF2B5EF4-FFF2-40B4-BE49-F238E27FC236}">
-                <a16:creationId xmlns:a16="http://schemas.microsoft.com/office/drawing/2014/main" xmlns="" id="{9E1EE24D-D1DE-9B3E-4080-6808708C05A8}"/>
+                <a16:creationId xmlns="" xmlns:a16="http://schemas.microsoft.com/office/drawing/2014/main" id="{9E1EE24D-D1DE-9B3E-4080-6808708C05A8}"/>
               </a:ext>
             </a:extLst>
           </p:cNvPr>
@@ -1851,7 +1851,7 @@
           <p:cNvPr id="8" name="页脚占位符 7">
             <a:extLst>
               <a:ext uri="{FF2B5EF4-FFF2-40B4-BE49-F238E27FC236}">
-                <a16:creationId xmlns:a16="http://schemas.microsoft.com/office/drawing/2014/main" xmlns="" id="{C06C2DEB-A9DD-A722-1495-E6D7A91BC29C}"/>
+                <a16:creationId xmlns="" xmlns:a16="http://schemas.microsoft.com/office/drawing/2014/main" id="{C06C2DEB-A9DD-A722-1495-E6D7A91BC29C}"/>
               </a:ext>
             </a:extLst>
           </p:cNvPr>
@@ -1876,7 +1876,7 @@
           <p:cNvPr id="9" name="灯片编号占位符 8">
             <a:extLst>
               <a:ext uri="{FF2B5EF4-FFF2-40B4-BE49-F238E27FC236}">
-                <a16:creationId xmlns:a16="http://schemas.microsoft.com/office/drawing/2014/main" xmlns="" id="{D8971254-CB67-6345-01AC-7BAF7FD67DFF}"/>
+                <a16:creationId xmlns="" xmlns:a16="http://schemas.microsoft.com/office/drawing/2014/main" id="{D8971254-CB67-6345-01AC-7BAF7FD67DFF}"/>
               </a:ext>
             </a:extLst>
           </p:cNvPr>
@@ -1935,7 +1935,7 @@
           <p:cNvPr id="2" name="标题 1">
             <a:extLst>
               <a:ext uri="{FF2B5EF4-FFF2-40B4-BE49-F238E27FC236}">
-                <a16:creationId xmlns:a16="http://schemas.microsoft.com/office/drawing/2014/main" xmlns="" id="{06648288-2F93-747D-9554-15E36671F261}"/>
+                <a16:creationId xmlns="" xmlns:a16="http://schemas.microsoft.com/office/drawing/2014/main" id="{06648288-2F93-747D-9554-15E36671F261}"/>
               </a:ext>
             </a:extLst>
           </p:cNvPr>
@@ -1964,7 +1964,7 @@
           <p:cNvPr id="3" name="日期占位符 2">
             <a:extLst>
               <a:ext uri="{FF2B5EF4-FFF2-40B4-BE49-F238E27FC236}">
-                <a16:creationId xmlns:a16="http://schemas.microsoft.com/office/drawing/2014/main" xmlns="" id="{35174584-4E29-D26E-0C6F-FD2DB8A038A7}"/>
+                <a16:creationId xmlns="" xmlns:a16="http://schemas.microsoft.com/office/drawing/2014/main" id="{35174584-4E29-D26E-0C6F-FD2DB8A038A7}"/>
               </a:ext>
             </a:extLst>
           </p:cNvPr>
@@ -1993,7 +1993,7 @@
           <p:cNvPr id="4" name="页脚占位符 3">
             <a:extLst>
               <a:ext uri="{FF2B5EF4-FFF2-40B4-BE49-F238E27FC236}">
-                <a16:creationId xmlns:a16="http://schemas.microsoft.com/office/drawing/2014/main" xmlns="" id="{CADE618B-D099-FF72-1C9A-FF8374FA83E0}"/>
+                <a16:creationId xmlns="" xmlns:a16="http://schemas.microsoft.com/office/drawing/2014/main" id="{CADE618B-D099-FF72-1C9A-FF8374FA83E0}"/>
               </a:ext>
             </a:extLst>
           </p:cNvPr>
@@ -2018,7 +2018,7 @@
           <p:cNvPr id="5" name="灯片编号占位符 4">
             <a:extLst>
               <a:ext uri="{FF2B5EF4-FFF2-40B4-BE49-F238E27FC236}">
-                <a16:creationId xmlns:a16="http://schemas.microsoft.com/office/drawing/2014/main" xmlns="" id="{38451358-EAB2-6BBD-CD23-0286DD1C0A53}"/>
+                <a16:creationId xmlns="" xmlns:a16="http://schemas.microsoft.com/office/drawing/2014/main" id="{38451358-EAB2-6BBD-CD23-0286DD1C0A53}"/>
               </a:ext>
             </a:extLst>
           </p:cNvPr>
@@ -2077,7 +2077,7 @@
           <p:cNvPr id="2" name="日期占位符 1">
             <a:extLst>
               <a:ext uri="{FF2B5EF4-FFF2-40B4-BE49-F238E27FC236}">
-                <a16:creationId xmlns:a16="http://schemas.microsoft.com/office/drawing/2014/main" xmlns="" id="{33190D7B-3496-BB63-17A5-158547EBAFF9}"/>
+                <a16:creationId xmlns="" xmlns:a16="http://schemas.microsoft.com/office/drawing/2014/main" id="{33190D7B-3496-BB63-17A5-158547EBAFF9}"/>
               </a:ext>
             </a:extLst>
           </p:cNvPr>
@@ -2106,7 +2106,7 @@
           <p:cNvPr id="3" name="页脚占位符 2">
             <a:extLst>
               <a:ext uri="{FF2B5EF4-FFF2-40B4-BE49-F238E27FC236}">
-                <a16:creationId xmlns:a16="http://schemas.microsoft.com/office/drawing/2014/main" xmlns="" id="{1DD90573-7834-709E-2B09-296E30DF435A}"/>
+                <a16:creationId xmlns="" xmlns:a16="http://schemas.microsoft.com/office/drawing/2014/main" id="{1DD90573-7834-709E-2B09-296E30DF435A}"/>
               </a:ext>
             </a:extLst>
           </p:cNvPr>
@@ -2131,7 +2131,7 @@
           <p:cNvPr id="4" name="灯片编号占位符 3">
             <a:extLst>
               <a:ext uri="{FF2B5EF4-FFF2-40B4-BE49-F238E27FC236}">
-                <a16:creationId xmlns:a16="http://schemas.microsoft.com/office/drawing/2014/main" xmlns="" id="{E1379807-BBF2-3092-4B19-368A23A121C4}"/>
+                <a16:creationId xmlns="" xmlns:a16="http://schemas.microsoft.com/office/drawing/2014/main" id="{E1379807-BBF2-3092-4B19-368A23A121C4}"/>
               </a:ext>
             </a:extLst>
           </p:cNvPr>
@@ -2190,7 +2190,7 @@
           <p:cNvPr id="2" name="标题 1">
             <a:extLst>
               <a:ext uri="{FF2B5EF4-FFF2-40B4-BE49-F238E27FC236}">
-                <a16:creationId xmlns:a16="http://schemas.microsoft.com/office/drawing/2014/main" xmlns="" id="{25E85BB5-563D-24A5-F24B-ACA0E5ADABF9}"/>
+                <a16:creationId xmlns="" xmlns:a16="http://schemas.microsoft.com/office/drawing/2014/main" id="{25E85BB5-563D-24A5-F24B-ACA0E5ADABF9}"/>
               </a:ext>
             </a:extLst>
           </p:cNvPr>
@@ -2228,7 +2228,7 @@
           <p:cNvPr id="3" name="内容占位符 2">
             <a:extLst>
               <a:ext uri="{FF2B5EF4-FFF2-40B4-BE49-F238E27FC236}">
-                <a16:creationId xmlns:a16="http://schemas.microsoft.com/office/drawing/2014/main" xmlns="" id="{C1289F38-DB5E-A78A-05ED-CFD3413A93F7}"/>
+                <a16:creationId xmlns="" xmlns:a16="http://schemas.microsoft.com/office/drawing/2014/main" id="{C1289F38-DB5E-A78A-05ED-CFD3413A93F7}"/>
               </a:ext>
             </a:extLst>
           </p:cNvPr>
@@ -2319,7 +2319,7 @@
           <p:cNvPr id="4" name="文本占位符 3">
             <a:extLst>
               <a:ext uri="{FF2B5EF4-FFF2-40B4-BE49-F238E27FC236}">
-                <a16:creationId xmlns:a16="http://schemas.microsoft.com/office/drawing/2014/main" xmlns="" id="{8EB3C4BF-4FF5-8AB9-9C5D-0B2A90D1E8F5}"/>
+                <a16:creationId xmlns="" xmlns:a16="http://schemas.microsoft.com/office/drawing/2014/main" id="{8EB3C4BF-4FF5-8AB9-9C5D-0B2A90D1E8F5}"/>
               </a:ext>
             </a:extLst>
           </p:cNvPr>
@@ -2390,7 +2390,7 @@
           <p:cNvPr id="5" name="日期占位符 4">
             <a:extLst>
               <a:ext uri="{FF2B5EF4-FFF2-40B4-BE49-F238E27FC236}">
-                <a16:creationId xmlns:a16="http://schemas.microsoft.com/office/drawing/2014/main" xmlns="" id="{D2EC3A4D-B75A-4727-24FA-A74947B1AC9D}"/>
+                <a16:creationId xmlns="" xmlns:a16="http://schemas.microsoft.com/office/drawing/2014/main" id="{D2EC3A4D-B75A-4727-24FA-A74947B1AC9D}"/>
               </a:ext>
             </a:extLst>
           </p:cNvPr>
@@ -2419,7 +2419,7 @@
           <p:cNvPr id="6" name="页脚占位符 5">
             <a:extLst>
               <a:ext uri="{FF2B5EF4-FFF2-40B4-BE49-F238E27FC236}">
-                <a16:creationId xmlns:a16="http://schemas.microsoft.com/office/drawing/2014/main" xmlns="" id="{3082729F-7372-D5A4-CE10-418BC38154B3}"/>
+                <a16:creationId xmlns="" xmlns:a16="http://schemas.microsoft.com/office/drawing/2014/main" id="{3082729F-7372-D5A4-CE10-418BC38154B3}"/>
               </a:ext>
             </a:extLst>
           </p:cNvPr>
@@ -2444,7 +2444,7 @@
           <p:cNvPr id="7" name="灯片编号占位符 6">
             <a:extLst>
               <a:ext uri="{FF2B5EF4-FFF2-40B4-BE49-F238E27FC236}">
-                <a16:creationId xmlns:a16="http://schemas.microsoft.com/office/drawing/2014/main" xmlns="" id="{7F7D7F14-8019-48F4-B05F-BFE11B73B7A7}"/>
+                <a16:creationId xmlns="" xmlns:a16="http://schemas.microsoft.com/office/drawing/2014/main" id="{7F7D7F14-8019-48F4-B05F-BFE11B73B7A7}"/>
               </a:ext>
             </a:extLst>
           </p:cNvPr>
@@ -2503,7 +2503,7 @@
           <p:cNvPr id="2" name="标题 1">
             <a:extLst>
               <a:ext uri="{FF2B5EF4-FFF2-40B4-BE49-F238E27FC236}">
-                <a16:creationId xmlns:a16="http://schemas.microsoft.com/office/drawing/2014/main" xmlns="" id="{59FE2280-6670-C94E-0DF5-91978AFA7056}"/>
+                <a16:creationId xmlns="" xmlns:a16="http://schemas.microsoft.com/office/drawing/2014/main" id="{59FE2280-6670-C94E-0DF5-91978AFA7056}"/>
               </a:ext>
             </a:extLst>
           </p:cNvPr>
@@ -2541,7 +2541,7 @@
           <p:cNvPr id="3" name="图片占位符 2">
             <a:extLst>
               <a:ext uri="{FF2B5EF4-FFF2-40B4-BE49-F238E27FC236}">
-                <a16:creationId xmlns:a16="http://schemas.microsoft.com/office/drawing/2014/main" xmlns="" id="{0041BED5-92ED-AC74-6807-2113BAFCA812}"/>
+                <a16:creationId xmlns="" xmlns:a16="http://schemas.microsoft.com/office/drawing/2014/main" id="{0041BED5-92ED-AC74-6807-2113BAFCA812}"/>
               </a:ext>
             </a:extLst>
           </p:cNvPr>
@@ -2608,7 +2608,7 @@
           <p:cNvPr id="4" name="文本占位符 3">
             <a:extLst>
               <a:ext uri="{FF2B5EF4-FFF2-40B4-BE49-F238E27FC236}">
-                <a16:creationId xmlns:a16="http://schemas.microsoft.com/office/drawing/2014/main" xmlns="" id="{67BDB5BB-A36C-979E-585C-FE2BC429D7F6}"/>
+                <a16:creationId xmlns="" xmlns:a16="http://schemas.microsoft.com/office/drawing/2014/main" id="{67BDB5BB-A36C-979E-585C-FE2BC429D7F6}"/>
               </a:ext>
             </a:extLst>
           </p:cNvPr>
@@ -2679,7 +2679,7 @@
           <p:cNvPr id="5" name="日期占位符 4">
             <a:extLst>
               <a:ext uri="{FF2B5EF4-FFF2-40B4-BE49-F238E27FC236}">
-                <a16:creationId xmlns:a16="http://schemas.microsoft.com/office/drawing/2014/main" xmlns="" id="{8F192718-E975-55E0-B895-63A124910067}"/>
+                <a16:creationId xmlns="" xmlns:a16="http://schemas.microsoft.com/office/drawing/2014/main" id="{8F192718-E975-55E0-B895-63A124910067}"/>
               </a:ext>
             </a:extLst>
           </p:cNvPr>
@@ -2708,7 +2708,7 @@
           <p:cNvPr id="6" name="页脚占位符 5">
             <a:extLst>
               <a:ext uri="{FF2B5EF4-FFF2-40B4-BE49-F238E27FC236}">
-                <a16:creationId xmlns:a16="http://schemas.microsoft.com/office/drawing/2014/main" xmlns="" id="{20EB14A0-932E-D2B9-9ED9-B80E2859AB1C}"/>
+                <a16:creationId xmlns="" xmlns:a16="http://schemas.microsoft.com/office/drawing/2014/main" id="{20EB14A0-932E-D2B9-9ED9-B80E2859AB1C}"/>
               </a:ext>
             </a:extLst>
           </p:cNvPr>
@@ -2733,7 +2733,7 @@
           <p:cNvPr id="7" name="灯片编号占位符 6">
             <a:extLst>
               <a:ext uri="{FF2B5EF4-FFF2-40B4-BE49-F238E27FC236}">
-                <a16:creationId xmlns:a16="http://schemas.microsoft.com/office/drawing/2014/main" xmlns="" id="{BC421619-2C72-C208-D14C-AF0CB76DDF08}"/>
+                <a16:creationId xmlns="" xmlns:a16="http://schemas.microsoft.com/office/drawing/2014/main" id="{BC421619-2C72-C208-D14C-AF0CB76DDF08}"/>
               </a:ext>
             </a:extLst>
           </p:cNvPr>
@@ -2797,7 +2797,7 @@
           <p:cNvPr id="2" name="标题占位符 1">
             <a:extLst>
               <a:ext uri="{FF2B5EF4-FFF2-40B4-BE49-F238E27FC236}">
-                <a16:creationId xmlns:a16="http://schemas.microsoft.com/office/drawing/2014/main" xmlns="" id="{2FDE79DA-3549-F3A3-FCB4-F0D88BDB80FE}"/>
+                <a16:creationId xmlns="" xmlns:a16="http://schemas.microsoft.com/office/drawing/2014/main" id="{2FDE79DA-3549-F3A3-FCB4-F0D88BDB80FE}"/>
               </a:ext>
             </a:extLst>
           </p:cNvPr>
@@ -2836,7 +2836,7 @@
           <p:cNvPr id="3" name="文本占位符 2">
             <a:extLst>
               <a:ext uri="{FF2B5EF4-FFF2-40B4-BE49-F238E27FC236}">
-                <a16:creationId xmlns:a16="http://schemas.microsoft.com/office/drawing/2014/main" xmlns="" id="{738A3F15-CA53-DA31-8BB4-5AEC4A2B8105}"/>
+                <a16:creationId xmlns="" xmlns:a16="http://schemas.microsoft.com/office/drawing/2014/main" id="{738A3F15-CA53-DA31-8BB4-5AEC4A2B8105}"/>
               </a:ext>
             </a:extLst>
           </p:cNvPr>
@@ -2904,7 +2904,7 @@
           <p:cNvPr id="4" name="日期占位符 3">
             <a:extLst>
               <a:ext uri="{FF2B5EF4-FFF2-40B4-BE49-F238E27FC236}">
-                <a16:creationId xmlns:a16="http://schemas.microsoft.com/office/drawing/2014/main" xmlns="" id="{904A0621-10A1-9453-405A-725CA9DD73DA}"/>
+                <a16:creationId xmlns="" xmlns:a16="http://schemas.microsoft.com/office/drawing/2014/main" id="{904A0621-10A1-9453-405A-725CA9DD73DA}"/>
               </a:ext>
             </a:extLst>
           </p:cNvPr>
@@ -2951,7 +2951,7 @@
           <p:cNvPr id="5" name="页脚占位符 4">
             <a:extLst>
               <a:ext uri="{FF2B5EF4-FFF2-40B4-BE49-F238E27FC236}">
-                <a16:creationId xmlns:a16="http://schemas.microsoft.com/office/drawing/2014/main" xmlns="" id="{87C79395-795F-E2AE-BE57-7368ECF212C8}"/>
+                <a16:creationId xmlns="" xmlns:a16="http://schemas.microsoft.com/office/drawing/2014/main" id="{87C79395-795F-E2AE-BE57-7368ECF212C8}"/>
               </a:ext>
             </a:extLst>
           </p:cNvPr>
@@ -2994,7 +2994,7 @@
           <p:cNvPr id="6" name="灯片编号占位符 5">
             <a:extLst>
               <a:ext uri="{FF2B5EF4-FFF2-40B4-BE49-F238E27FC236}">
-                <a16:creationId xmlns:a16="http://schemas.microsoft.com/office/drawing/2014/main" xmlns="" id="{3430DED2-C8D2-D377-6F2B-ABAC2F7F5DF3}"/>
+                <a16:creationId xmlns="" xmlns:a16="http://schemas.microsoft.com/office/drawing/2014/main" id="{3430DED2-C8D2-D377-6F2B-ABAC2F7F5DF3}"/>
               </a:ext>
             </a:extLst>
           </p:cNvPr>
@@ -3362,7 +3362,7 @@
           <p:cNvPr id="2" name="标题 1">
             <a:extLst>
               <a:ext uri="{FF2B5EF4-FFF2-40B4-BE49-F238E27FC236}">
-                <a16:creationId xmlns:a16="http://schemas.microsoft.com/office/drawing/2014/main" xmlns="" id="{8F71CC32-FF3D-7C37-2552-16EA87FD3FCD}"/>
+                <a16:creationId xmlns="" xmlns:a16="http://schemas.microsoft.com/office/drawing/2014/main" id="{8F71CC32-FF3D-7C37-2552-16EA87FD3FCD}"/>
               </a:ext>
             </a:extLst>
           </p:cNvPr>
@@ -3391,7 +3391,7 @@
           <p:cNvPr id="3" name="副标题 2">
             <a:extLst>
               <a:ext uri="{FF2B5EF4-FFF2-40B4-BE49-F238E27FC236}">
-                <a16:creationId xmlns:a16="http://schemas.microsoft.com/office/drawing/2014/main" xmlns="" id="{0B796731-8234-25E1-8D71-3F1CC8A90185}"/>
+                <a16:creationId xmlns="" xmlns:a16="http://schemas.microsoft.com/office/drawing/2014/main" id="{0B796731-8234-25E1-8D71-3F1CC8A90185}"/>
               </a:ext>
             </a:extLst>
           </p:cNvPr>
@@ -3407,9 +3407,20 @@
           <a:bodyPr/>
           <a:lstStyle/>
           <a:p>
+            <a:endParaRPr lang="en-US" dirty="0" smtClean="0"/>
+          </a:p>
+          <a:p>
+            <a:r>
+              <a:rPr lang="en-US" dirty="0" err="1" smtClean="0"/>
+              <a:t>Haiyue</a:t>
+            </a:r>
+            <a:r>
+              <a:rPr lang="en-US" dirty="0" smtClean="0"/>
+              <a:t> </a:t>
+            </a:r>
             <a:r>
               <a:rPr lang="en-US" dirty="0"/>
-              <a:t>Haiyue Wang</a:t>
+              <a:t>Wang</a:t>
             </a:r>
           </a:p>
         </p:txBody>
@@ -3449,7 +3460,7 @@
           <p:cNvPr id="2" name="标题 1">
             <a:extLst>
               <a:ext uri="{FF2B5EF4-FFF2-40B4-BE49-F238E27FC236}">
-                <a16:creationId xmlns:a16="http://schemas.microsoft.com/office/drawing/2014/main" xmlns="" id="{887EC568-F726-48DA-C182-951B1E028ECC}"/>
+                <a16:creationId xmlns="" xmlns:a16="http://schemas.microsoft.com/office/drawing/2014/main" id="{887EC568-F726-48DA-C182-951B1E028ECC}"/>
               </a:ext>
             </a:extLst>
           </p:cNvPr>
@@ -3477,7 +3488,7 @@
           <p:cNvPr id="3" name="内容占位符 2">
             <a:extLst>
               <a:ext uri="{FF2B5EF4-FFF2-40B4-BE49-F238E27FC236}">
-                <a16:creationId xmlns:a16="http://schemas.microsoft.com/office/drawing/2014/main" xmlns="" id="{B2FE7A0C-1F7E-AAD3-040B-A76C36D5CAD8}"/>
+                <a16:creationId xmlns="" xmlns:a16="http://schemas.microsoft.com/office/drawing/2014/main" id="{B2FE7A0C-1F7E-AAD3-040B-A76C36D5CAD8}"/>
               </a:ext>
             </a:extLst>
           </p:cNvPr>
@@ -3502,7 +3513,7 @@
           <p:cNvPr id="2050" name="Picture 2" descr="Alt text">
             <a:extLst>
               <a:ext uri="{FF2B5EF4-FFF2-40B4-BE49-F238E27FC236}">
-                <a16:creationId xmlns:a16="http://schemas.microsoft.com/office/drawing/2014/main" xmlns="" id="{7CC6E176-6B19-029A-688A-F02FEBA64EBE}"/>
+                <a16:creationId xmlns="" xmlns:a16="http://schemas.microsoft.com/office/drawing/2014/main" id="{7CC6E176-6B19-029A-688A-F02FEBA64EBE}"/>
               </a:ext>
             </a:extLst>
           </p:cNvPr>
@@ -3579,7 +3590,7 @@
           <p:cNvPr id="2" name="标题 1">
             <a:extLst>
               <a:ext uri="{FF2B5EF4-FFF2-40B4-BE49-F238E27FC236}">
-                <a16:creationId xmlns:a16="http://schemas.microsoft.com/office/drawing/2014/main" xmlns="" id="{887EC568-F726-48DA-C182-951B1E028ECC}"/>
+                <a16:creationId xmlns="" xmlns:a16="http://schemas.microsoft.com/office/drawing/2014/main" id="{887EC568-F726-48DA-C182-951B1E028ECC}"/>
               </a:ext>
             </a:extLst>
           </p:cNvPr>
@@ -3607,7 +3618,7 @@
           <p:cNvPr id="2050" name="Picture 2" descr="Alt text">
             <a:extLst>
               <a:ext uri="{FF2B5EF4-FFF2-40B4-BE49-F238E27FC236}">
-                <a16:creationId xmlns:a16="http://schemas.microsoft.com/office/drawing/2014/main" xmlns="" id="{7CC6E176-6B19-029A-688A-F02FEBA64EBE}"/>
+                <a16:creationId xmlns="" xmlns:a16="http://schemas.microsoft.com/office/drawing/2014/main" id="{7CC6E176-6B19-029A-688A-F02FEBA64EBE}"/>
               </a:ext>
             </a:extLst>
           </p:cNvPr>
@@ -3654,7 +3665,7 @@
           <p:cNvPr id="5" name="图片 4">
             <a:extLst>
               <a:ext uri="{FF2B5EF4-FFF2-40B4-BE49-F238E27FC236}">
-                <a16:creationId xmlns:a16="http://schemas.microsoft.com/office/drawing/2014/main" xmlns="" id="{22401DF9-F90B-54F6-285B-57CB4DE59A81}"/>
+                <a16:creationId xmlns="" xmlns:a16="http://schemas.microsoft.com/office/drawing/2014/main" id="{22401DF9-F90B-54F6-285B-57CB4DE59A81}"/>
               </a:ext>
             </a:extLst>
           </p:cNvPr>
@@ -3714,7 +3725,7 @@
           <p:cNvPr id="2" name="标题 1">
             <a:extLst>
               <a:ext uri="{FF2B5EF4-FFF2-40B4-BE49-F238E27FC236}">
-                <a16:creationId xmlns:a16="http://schemas.microsoft.com/office/drawing/2014/main" xmlns="" id="{887EC568-F726-48DA-C182-951B1E028ECC}"/>
+                <a16:creationId xmlns="" xmlns:a16="http://schemas.microsoft.com/office/drawing/2014/main" id="{887EC568-F726-48DA-C182-951B1E028ECC}"/>
               </a:ext>
             </a:extLst>
           </p:cNvPr>
@@ -3742,7 +3753,7 @@
           <p:cNvPr id="5" name="图片 4">
             <a:extLst>
               <a:ext uri="{FF2B5EF4-FFF2-40B4-BE49-F238E27FC236}">
-                <a16:creationId xmlns:a16="http://schemas.microsoft.com/office/drawing/2014/main" xmlns="" id="{22401DF9-F90B-54F6-285B-57CB4DE59A81}"/>
+                <a16:creationId xmlns="" xmlns:a16="http://schemas.microsoft.com/office/drawing/2014/main" id="{22401DF9-F90B-54F6-285B-57CB4DE59A81}"/>
               </a:ext>
             </a:extLst>
           </p:cNvPr>
@@ -3772,7 +3783,7 @@
           <p:cNvPr id="6" name="图片 5">
             <a:extLst>
               <a:ext uri="{FF2B5EF4-FFF2-40B4-BE49-F238E27FC236}">
-                <a16:creationId xmlns:a16="http://schemas.microsoft.com/office/drawing/2014/main" xmlns="" id="{262AF52F-D744-C56B-DD2F-5A039117BDE3}"/>
+                <a16:creationId xmlns="" xmlns:a16="http://schemas.microsoft.com/office/drawing/2014/main" id="{262AF52F-D744-C56B-DD2F-5A039117BDE3}"/>
               </a:ext>
             </a:extLst>
           </p:cNvPr>
@@ -3802,7 +3813,7 @@
           <p:cNvPr id="7" name="箭头: 下 6">
             <a:extLst>
               <a:ext uri="{FF2B5EF4-FFF2-40B4-BE49-F238E27FC236}">
-                <a16:creationId xmlns:a16="http://schemas.microsoft.com/office/drawing/2014/main" xmlns="" id="{BEE142A4-1CD6-D216-26AA-C6D105709863}"/>
+                <a16:creationId xmlns="" xmlns:a16="http://schemas.microsoft.com/office/drawing/2014/main" id="{BEE142A4-1CD6-D216-26AA-C6D105709863}"/>
               </a:ext>
             </a:extLst>
           </p:cNvPr>
@@ -3848,7 +3859,7 @@
           <p:cNvPr id="9" name="图片 8">
             <a:extLst>
               <a:ext uri="{FF2B5EF4-FFF2-40B4-BE49-F238E27FC236}">
-                <a16:creationId xmlns:a16="http://schemas.microsoft.com/office/drawing/2014/main" xmlns="" id="{AB6309C6-4438-FD9C-0E40-43FEADE06FB4}"/>
+                <a16:creationId xmlns="" xmlns:a16="http://schemas.microsoft.com/office/drawing/2014/main" id="{AB6309C6-4438-FD9C-0E40-43FEADE06FB4}"/>
               </a:ext>
             </a:extLst>
           </p:cNvPr>
@@ -3878,7 +3889,7 @@
           <p:cNvPr id="10" name="箭头: 下 9">
             <a:extLst>
               <a:ext uri="{FF2B5EF4-FFF2-40B4-BE49-F238E27FC236}">
-                <a16:creationId xmlns:a16="http://schemas.microsoft.com/office/drawing/2014/main" xmlns="" id="{8B1E5912-7870-3A7A-285C-7F220C8E8269}"/>
+                <a16:creationId xmlns="" xmlns:a16="http://schemas.microsoft.com/office/drawing/2014/main" id="{8B1E5912-7870-3A7A-285C-7F220C8E8269}"/>
               </a:ext>
             </a:extLst>
           </p:cNvPr>
@@ -4311,7 +4322,7 @@
           <p:cNvPr id="2" name="标题 1">
             <a:extLst>
               <a:ext uri="{FF2B5EF4-FFF2-40B4-BE49-F238E27FC236}">
-                <a16:creationId xmlns:a16="http://schemas.microsoft.com/office/drawing/2014/main" xmlns="" id="{38FB9F3A-0389-1798-E65F-493B28D68275}"/>
+                <a16:creationId xmlns="" xmlns:a16="http://schemas.microsoft.com/office/drawing/2014/main" id="{38FB9F3A-0389-1798-E65F-493B28D68275}"/>
               </a:ext>
             </a:extLst>
           </p:cNvPr>
@@ -4339,7 +4350,7 @@
           <p:cNvPr id="3" name="内容占位符 2">
             <a:extLst>
               <a:ext uri="{FF2B5EF4-FFF2-40B4-BE49-F238E27FC236}">
-                <a16:creationId xmlns:a16="http://schemas.microsoft.com/office/drawing/2014/main" xmlns="" id="{17A5B292-3C99-3224-014C-93DC00A3D5E4}"/>
+                <a16:creationId xmlns="" xmlns:a16="http://schemas.microsoft.com/office/drawing/2014/main" id="{17A5B292-3C99-3224-014C-93DC00A3D5E4}"/>
               </a:ext>
             </a:extLst>
           </p:cNvPr>
@@ -4448,7 +4459,7 @@
           <p:cNvPr id="2" name="标题 1">
             <a:extLst>
               <a:ext uri="{FF2B5EF4-FFF2-40B4-BE49-F238E27FC236}">
-                <a16:creationId xmlns:a16="http://schemas.microsoft.com/office/drawing/2014/main" xmlns="" id="{BFED13D0-1777-7362-78DA-C791BAE10491}"/>
+                <a16:creationId xmlns="" xmlns:a16="http://schemas.microsoft.com/office/drawing/2014/main" id="{BFED13D0-1777-7362-78DA-C791BAE10491}"/>
               </a:ext>
             </a:extLst>
           </p:cNvPr>
@@ -4476,7 +4487,7 @@
           <p:cNvPr id="3" name="内容占位符 2">
             <a:extLst>
               <a:ext uri="{FF2B5EF4-FFF2-40B4-BE49-F238E27FC236}">
-                <a16:creationId xmlns:a16="http://schemas.microsoft.com/office/drawing/2014/main" xmlns="" id="{780350DE-192C-DC5E-C6D5-B1C97C4347AB}"/>
+                <a16:creationId xmlns="" xmlns:a16="http://schemas.microsoft.com/office/drawing/2014/main" id="{780350DE-192C-DC5E-C6D5-B1C97C4347AB}"/>
               </a:ext>
             </a:extLst>
           </p:cNvPr>
@@ -4606,7 +4617,7 @@
           <p:cNvPr id="2" name="标题 1">
             <a:extLst>
               <a:ext uri="{FF2B5EF4-FFF2-40B4-BE49-F238E27FC236}">
-                <a16:creationId xmlns:a16="http://schemas.microsoft.com/office/drawing/2014/main" xmlns="" id="{D86D4608-98F4-4324-A054-81A0D333A46B}"/>
+                <a16:creationId xmlns="" xmlns:a16="http://schemas.microsoft.com/office/drawing/2014/main" id="{D86D4608-98F4-4324-A054-81A0D333A46B}"/>
               </a:ext>
             </a:extLst>
           </p:cNvPr>
@@ -4634,7 +4645,7 @@
           <p:cNvPr id="3" name="内容占位符 2">
             <a:extLst>
               <a:ext uri="{FF2B5EF4-FFF2-40B4-BE49-F238E27FC236}">
-                <a16:creationId xmlns:a16="http://schemas.microsoft.com/office/drawing/2014/main" xmlns="" id="{BD98E641-3408-FBD2-97F5-5CD1CF1DB7BF}"/>
+                <a16:creationId xmlns="" xmlns:a16="http://schemas.microsoft.com/office/drawing/2014/main" id="{BD98E641-3408-FBD2-97F5-5CD1CF1DB7BF}"/>
               </a:ext>
             </a:extLst>
           </p:cNvPr>
@@ -4658,14 +4669,32 @@
           <a:p>
             <a:r>
               <a:rPr lang="en-US" dirty="0"/>
-              <a:t>2. The Usage </a:t>
-            </a:r>
+              <a:t>2. The </a:t>
+            </a:r>
+            <a:r>
+              <a:rPr lang="en-US" dirty="0" smtClean="0"/>
+              <a:t>Domain using </a:t>
+            </a:r>
+            <a:r>
+              <a:rPr lang="en-US" dirty="0" err="1" smtClean="0"/>
+              <a:t>Kalma</a:t>
+            </a:r>
+            <a:r>
+              <a:rPr lang="en-US" dirty="0" smtClean="0"/>
+              <a:t> Filter</a:t>
+            </a:r>
+            <a:endParaRPr lang="en-US" dirty="0"/>
           </a:p>
           <a:p>
             <a:r>
               <a:rPr lang="en-US" dirty="0"/>
-              <a:t>3. Two example to get the Kalman Filter</a:t>
-            </a:r>
+              <a:t>3. </a:t>
+            </a:r>
+            <a:r>
+              <a:rPr lang="en-US" dirty="0" smtClean="0"/>
+              <a:t>Three examples</a:t>
+            </a:r>
+            <a:endParaRPr lang="en-US" dirty="0"/>
           </a:p>
           <a:p>
             <a:r>
@@ -4710,7 +4739,7 @@
           <p:cNvPr id="2" name="标题 1">
             <a:extLst>
               <a:ext uri="{FF2B5EF4-FFF2-40B4-BE49-F238E27FC236}">
-                <a16:creationId xmlns:a16="http://schemas.microsoft.com/office/drawing/2014/main" xmlns="" id="{93244E1B-52FB-177A-9CDA-F863A850CFAD}"/>
+                <a16:creationId xmlns="" xmlns:a16="http://schemas.microsoft.com/office/drawing/2014/main" id="{93244E1B-52FB-177A-9CDA-F863A850CFAD}"/>
               </a:ext>
             </a:extLst>
           </p:cNvPr>
@@ -4738,7 +4767,7 @@
           <p:cNvPr id="3" name="内容占位符 2">
             <a:extLst>
               <a:ext uri="{FF2B5EF4-FFF2-40B4-BE49-F238E27FC236}">
-                <a16:creationId xmlns:a16="http://schemas.microsoft.com/office/drawing/2014/main" xmlns="" id="{C02280F2-920F-6859-5BAA-056F0273CCB7}"/>
+                <a16:creationId xmlns="" xmlns:a16="http://schemas.microsoft.com/office/drawing/2014/main" id="{C02280F2-920F-6859-5BAA-056F0273CCB7}"/>
               </a:ext>
             </a:extLst>
           </p:cNvPr>
@@ -4756,7 +4785,55 @@
           <a:p>
             <a:r>
               <a:rPr lang="en-US" dirty="0"/>
-              <a:t>The Kalman Filter is a mathematical algorithm used for estimating and predicting the state of a dynamic system, particularly in the presence of noisy or uncertain data.</a:t>
+              <a:t>The Kalman Filter is a mathematical algorithm used for </a:t>
+            </a:r>
+            <a:r>
+              <a:rPr lang="en-US" dirty="0">
+                <a:solidFill>
+                  <a:srgbClr val="FF0000"/>
+                </a:solidFill>
+              </a:rPr>
+              <a:t>estimating</a:t>
+            </a:r>
+            <a:r>
+              <a:rPr lang="en-US" dirty="0"/>
+              <a:t> and </a:t>
+            </a:r>
+            <a:r>
+              <a:rPr lang="en-US" dirty="0">
+                <a:solidFill>
+                  <a:srgbClr val="FF0000"/>
+                </a:solidFill>
+              </a:rPr>
+              <a:t>predicting</a:t>
+            </a:r>
+            <a:r>
+              <a:rPr lang="en-US" dirty="0"/>
+              <a:t> the state of a </a:t>
+            </a:r>
+            <a:r>
+              <a:rPr lang="en-US" dirty="0">
+                <a:solidFill>
+                  <a:srgbClr val="FF0000"/>
+                </a:solidFill>
+              </a:rPr>
+              <a:t>dynamic</a:t>
+            </a:r>
+            <a:r>
+              <a:rPr lang="en-US" dirty="0"/>
+              <a:t> system, particularly in the presence of </a:t>
+            </a:r>
+            <a:r>
+              <a:rPr lang="en-US" dirty="0">
+                <a:solidFill>
+                  <a:srgbClr val="FF0000"/>
+                </a:solidFill>
+              </a:rPr>
+              <a:t>noisy or uncertain data</a:t>
+            </a:r>
+            <a:r>
+              <a:rPr lang="en-US" dirty="0"/>
+              <a:t>.</a:t>
             </a:r>
           </a:p>
           <a:p>
@@ -4789,7 +4866,7 @@
           <p:cNvPr id="5" name="图片 4">
             <a:extLst>
               <a:ext uri="{FF2B5EF4-FFF2-40B4-BE49-F238E27FC236}">
-                <a16:creationId xmlns:a16="http://schemas.microsoft.com/office/drawing/2014/main" xmlns="" id="{937C80C1-6061-F42A-9C66-2CCDD6EE339F}"/>
+                <a16:creationId xmlns="" xmlns:a16="http://schemas.microsoft.com/office/drawing/2014/main" id="{937C80C1-6061-F42A-9C66-2CCDD6EE339F}"/>
               </a:ext>
             </a:extLst>
           </p:cNvPr>
@@ -4819,7 +4896,7 @@
           <p:cNvPr id="9" name="图片 8">
             <a:extLst>
               <a:ext uri="{FF2B5EF4-FFF2-40B4-BE49-F238E27FC236}">
-                <a16:creationId xmlns:a16="http://schemas.microsoft.com/office/drawing/2014/main" xmlns="" id="{AD15792A-F729-C892-5BE4-1D6A6334C154}"/>
+                <a16:creationId xmlns="" xmlns:a16="http://schemas.microsoft.com/office/drawing/2014/main" id="{AD15792A-F729-C892-5BE4-1D6A6334C154}"/>
               </a:ext>
             </a:extLst>
           </p:cNvPr>
@@ -4879,7 +4956,7 @@
           <p:cNvPr id="2" name="标题 1">
             <a:extLst>
               <a:ext uri="{FF2B5EF4-FFF2-40B4-BE49-F238E27FC236}">
-                <a16:creationId xmlns:a16="http://schemas.microsoft.com/office/drawing/2014/main" xmlns="" id="{3FD0EBE6-ED64-004B-A7AE-A52C9E0CB054}"/>
+                <a16:creationId xmlns="" xmlns:a16="http://schemas.microsoft.com/office/drawing/2014/main" id="{3FD0EBE6-ED64-004B-A7AE-A52C9E0CB054}"/>
               </a:ext>
             </a:extLst>
           </p:cNvPr>
@@ -4915,7 +4992,7 @@
           <p:cNvPr id="3" name="内容占位符 2">
             <a:extLst>
               <a:ext uri="{FF2B5EF4-FFF2-40B4-BE49-F238E27FC236}">
-                <a16:creationId xmlns:a16="http://schemas.microsoft.com/office/drawing/2014/main" xmlns="" id="{4D61A00B-5B45-158E-F0F1-939ECF07428F}"/>
+                <a16:creationId xmlns="" xmlns:a16="http://schemas.microsoft.com/office/drawing/2014/main" id="{4D61A00B-5B45-158E-F0F1-939ECF07428F}"/>
               </a:ext>
             </a:extLst>
           </p:cNvPr>
@@ -5058,7 +5135,7 @@
           <p:cNvPr id="2" name="标题 1">
             <a:extLst>
               <a:ext uri="{FF2B5EF4-FFF2-40B4-BE49-F238E27FC236}">
-                <a16:creationId xmlns:a16="http://schemas.microsoft.com/office/drawing/2014/main" xmlns="" id="{82AA09A9-AC22-5051-EE21-F2A27C4C131A}"/>
+                <a16:creationId xmlns="" xmlns:a16="http://schemas.microsoft.com/office/drawing/2014/main" id="{82AA09A9-AC22-5051-EE21-F2A27C4C131A}"/>
               </a:ext>
             </a:extLst>
           </p:cNvPr>
@@ -5086,7 +5163,7 @@
           <p:cNvPr id="1026" name="Picture 2" descr="Measure a gold">
             <a:extLst>
               <a:ext uri="{FF2B5EF4-FFF2-40B4-BE49-F238E27FC236}">
-                <a16:creationId xmlns:a16="http://schemas.microsoft.com/office/drawing/2014/main" xmlns="" id="{059CFA18-4C83-5F3A-6C2B-D64C147142A1}"/>
+                <a16:creationId xmlns="" xmlns:a16="http://schemas.microsoft.com/office/drawing/2014/main" id="{059CFA18-4C83-5F3A-6C2B-D64C147142A1}"/>
               </a:ext>
             </a:extLst>
           </p:cNvPr>
@@ -5133,7 +5210,7 @@
           <p:cNvPr id="1028" name="Picture 4" descr="Gold | Bulwik Jewellery">
             <a:extLst>
               <a:ext uri="{FF2B5EF4-FFF2-40B4-BE49-F238E27FC236}">
-                <a16:creationId xmlns:a16="http://schemas.microsoft.com/office/drawing/2014/main" xmlns="" id="{DF6C7BA2-8B2E-AF0F-2EE8-8687E8F6372D}"/>
+                <a16:creationId xmlns="" xmlns:a16="http://schemas.microsoft.com/office/drawing/2014/main" id="{DF6C7BA2-8B2E-AF0F-2EE8-8687E8F6372D}"/>
               </a:ext>
             </a:extLst>
           </p:cNvPr>
@@ -5210,7 +5287,7 @@
           <p:cNvPr id="2" name="标题 1">
             <a:extLst>
               <a:ext uri="{FF2B5EF4-FFF2-40B4-BE49-F238E27FC236}">
-                <a16:creationId xmlns:a16="http://schemas.microsoft.com/office/drawing/2014/main" xmlns="" id="{82AA09A9-AC22-5051-EE21-F2A27C4C131A}"/>
+                <a16:creationId xmlns="" xmlns:a16="http://schemas.microsoft.com/office/drawing/2014/main" id="{82AA09A9-AC22-5051-EE21-F2A27C4C131A}"/>
               </a:ext>
             </a:extLst>
           </p:cNvPr>
@@ -5238,7 +5315,7 @@
           <p:cNvPr id="1026" name="Picture 2" descr="Measure a gold">
             <a:extLst>
               <a:ext uri="{FF2B5EF4-FFF2-40B4-BE49-F238E27FC236}">
-                <a16:creationId xmlns:a16="http://schemas.microsoft.com/office/drawing/2014/main" xmlns="" id="{059CFA18-4C83-5F3A-6C2B-D64C147142A1}"/>
+                <a16:creationId xmlns="" xmlns:a16="http://schemas.microsoft.com/office/drawing/2014/main" id="{059CFA18-4C83-5F3A-6C2B-D64C147142A1}"/>
               </a:ext>
             </a:extLst>
           </p:cNvPr>
@@ -5285,7 +5362,7 @@
           <p:cNvPr id="1028" name="Picture 4" descr="Gold | Bulwik Jewellery">
             <a:extLst>
               <a:ext uri="{FF2B5EF4-FFF2-40B4-BE49-F238E27FC236}">
-                <a16:creationId xmlns:a16="http://schemas.microsoft.com/office/drawing/2014/main" xmlns="" id="{DF6C7BA2-8B2E-AF0F-2EE8-8687E8F6372D}"/>
+                <a16:creationId xmlns="" xmlns:a16="http://schemas.microsoft.com/office/drawing/2014/main" id="{DF6C7BA2-8B2E-AF0F-2EE8-8687E8F6372D}"/>
               </a:ext>
             </a:extLst>
           </p:cNvPr>
@@ -5332,7 +5409,7 @@
           <p:cNvPr id="4" name="图片 3">
             <a:extLst>
               <a:ext uri="{FF2B5EF4-FFF2-40B4-BE49-F238E27FC236}">
-                <a16:creationId xmlns:a16="http://schemas.microsoft.com/office/drawing/2014/main" xmlns="" id="{D3C87205-F7B7-9E30-DCD8-27B50F3911AF}"/>
+                <a16:creationId xmlns="" xmlns:a16="http://schemas.microsoft.com/office/drawing/2014/main" id="{D3C87205-F7B7-9E30-DCD8-27B50F3911AF}"/>
               </a:ext>
             </a:extLst>
           </p:cNvPr>
@@ -5391,7 +5468,7 @@
           <p:cNvPr id="2" name="标题 1">
             <a:extLst>
               <a:ext uri="{FF2B5EF4-FFF2-40B4-BE49-F238E27FC236}">
-                <a16:creationId xmlns:a16="http://schemas.microsoft.com/office/drawing/2014/main" xmlns="" id="{EE82346B-A7C5-EF04-816A-22A43A463747}"/>
+                <a16:creationId xmlns="" xmlns:a16="http://schemas.microsoft.com/office/drawing/2014/main" id="{EE82346B-A7C5-EF04-816A-22A43A463747}"/>
               </a:ext>
             </a:extLst>
           </p:cNvPr>
@@ -5419,7 +5496,7 @@
           <p:cNvPr id="3" name="内容占位符 2">
             <a:extLst>
               <a:ext uri="{FF2B5EF4-FFF2-40B4-BE49-F238E27FC236}">
-                <a16:creationId xmlns:a16="http://schemas.microsoft.com/office/drawing/2014/main" xmlns="" id="{BC4C3EB5-D9D3-B906-1B49-5EEDA39163CC}"/>
+                <a16:creationId xmlns="" xmlns:a16="http://schemas.microsoft.com/office/drawing/2014/main" id="{BC4C3EB5-D9D3-B906-1B49-5EEDA39163CC}"/>
               </a:ext>
             </a:extLst>
           </p:cNvPr>
@@ -5444,7 +5521,7 @@
           <p:cNvPr id="5" name="图片 4">
             <a:extLst>
               <a:ext uri="{FF2B5EF4-FFF2-40B4-BE49-F238E27FC236}">
-                <a16:creationId xmlns:a16="http://schemas.microsoft.com/office/drawing/2014/main" xmlns="" id="{915C136C-4C50-50A7-EE1D-98C4ADD1BB03}"/>
+                <a16:creationId xmlns="" xmlns:a16="http://schemas.microsoft.com/office/drawing/2014/main" id="{915C136C-4C50-50A7-EE1D-98C4ADD1BB03}"/>
               </a:ext>
             </a:extLst>
           </p:cNvPr>
@@ -5504,7 +5581,7 @@
           <p:cNvPr id="2" name="标题 1">
             <a:extLst>
               <a:ext uri="{FF2B5EF4-FFF2-40B4-BE49-F238E27FC236}">
-                <a16:creationId xmlns:a16="http://schemas.microsoft.com/office/drawing/2014/main" xmlns="" id="{C9127D9B-9414-77EC-0A68-29FD840F02E9}"/>
+                <a16:creationId xmlns="" xmlns:a16="http://schemas.microsoft.com/office/drawing/2014/main" id="{C9127D9B-9414-77EC-0A68-29FD840F02E9}"/>
               </a:ext>
             </a:extLst>
           </p:cNvPr>
@@ -5532,7 +5609,7 @@
           <p:cNvPr id="3" name="内容占位符 2">
             <a:extLst>
               <a:ext uri="{FF2B5EF4-FFF2-40B4-BE49-F238E27FC236}">
-                <a16:creationId xmlns:a16="http://schemas.microsoft.com/office/drawing/2014/main" xmlns="" id="{6682DEB9-1F3F-86E6-2C1D-4B28A6FA27E0}"/>
+                <a16:creationId xmlns="" xmlns:a16="http://schemas.microsoft.com/office/drawing/2014/main" id="{6682DEB9-1F3F-86E6-2C1D-4B28A6FA27E0}"/>
               </a:ext>
             </a:extLst>
           </p:cNvPr>
@@ -5557,7 +5634,7 @@
           <p:cNvPr id="5" name="图片 4">
             <a:extLst>
               <a:ext uri="{FF2B5EF4-FFF2-40B4-BE49-F238E27FC236}">
-                <a16:creationId xmlns:a16="http://schemas.microsoft.com/office/drawing/2014/main" xmlns="" id="{12BFB8BA-39AE-F058-2C8E-11AEA6ADB350}"/>
+                <a16:creationId xmlns="" xmlns:a16="http://schemas.microsoft.com/office/drawing/2014/main" id="{12BFB8BA-39AE-F058-2C8E-11AEA6ADB350}"/>
               </a:ext>
             </a:extLst>
           </p:cNvPr>
@@ -5617,7 +5694,7 @@
           <p:cNvPr id="2" name="标题 1">
             <a:extLst>
               <a:ext uri="{FF2B5EF4-FFF2-40B4-BE49-F238E27FC236}">
-                <a16:creationId xmlns:a16="http://schemas.microsoft.com/office/drawing/2014/main" xmlns="" id="{C9127D9B-9414-77EC-0A68-29FD840F02E9}"/>
+                <a16:creationId xmlns="" xmlns:a16="http://schemas.microsoft.com/office/drawing/2014/main" id="{C9127D9B-9414-77EC-0A68-29FD840F02E9}"/>
               </a:ext>
             </a:extLst>
           </p:cNvPr>
@@ -5645,7 +5722,7 @@
           <p:cNvPr id="3" name="内容占位符 2">
             <a:extLst>
               <a:ext uri="{FF2B5EF4-FFF2-40B4-BE49-F238E27FC236}">
-                <a16:creationId xmlns:a16="http://schemas.microsoft.com/office/drawing/2014/main" xmlns="" id="{6682DEB9-1F3F-86E6-2C1D-4B28A6FA27E0}"/>
+                <a16:creationId xmlns="" xmlns:a16="http://schemas.microsoft.com/office/drawing/2014/main" id="{6682DEB9-1F3F-86E6-2C1D-4B28A6FA27E0}"/>
               </a:ext>
             </a:extLst>
           </p:cNvPr>
@@ -6008,7 +6085,7 @@
   <a:extraClrSchemeLst/>
   <a:extLst>
     <a:ext uri="{05A4C25C-085E-4340-85A3-A5531E510DB2}">
-      <thm15:themeFamily xmlns:thm15="http://schemas.microsoft.com/office/thememl/2012/main" xmlns="" name="Office Theme" id="{62F939B6-93AF-4DB8-9C6B-D6C7DFDC589F}" vid="{4A3C46E8-61CC-4603-A589-7422A47A8E4A}"/>
+      <thm15:themeFamily xmlns="" xmlns:thm15="http://schemas.microsoft.com/office/thememl/2012/main" name="Office Theme" id="{62F939B6-93AF-4DB8-9C6B-D6C7DFDC589F}" vid="{4A3C46E8-61CC-4603-A589-7422A47A8E4A}"/>
     </a:ext>
   </a:extLst>
 </a:theme>

</xml_diff>

<commit_message>
Add something of Kalman Filter
</commit_message>
<xml_diff>
--- a/src/.vuepress/public/data/unisa/AdvancedAnalytic1/project/Kalman Filter.pptx
+++ b/src/.vuepress/public/data/unisa/AdvancedAnalytic1/project/Kalman Filter.pptx
@@ -8,19 +8,21 @@
     <p:sldId id="256" r:id="rId2"/>
     <p:sldId id="270" r:id="rId3"/>
     <p:sldId id="257" r:id="rId4"/>
-    <p:sldId id="265" r:id="rId5"/>
-    <p:sldId id="266" r:id="rId6"/>
-    <p:sldId id="272" r:id="rId7"/>
-    <p:sldId id="267" r:id="rId8"/>
-    <p:sldId id="268" r:id="rId9"/>
-    <p:sldId id="283" r:id="rId10"/>
-    <p:sldId id="269" r:id="rId11"/>
-    <p:sldId id="273" r:id="rId12"/>
-    <p:sldId id="280" r:id="rId13"/>
-    <p:sldId id="281" r:id="rId14"/>
-    <p:sldId id="282" r:id="rId15"/>
-    <p:sldId id="274" r:id="rId16"/>
-    <p:sldId id="275" r:id="rId17"/>
+    <p:sldId id="285" r:id="rId5"/>
+    <p:sldId id="284" r:id="rId6"/>
+    <p:sldId id="266" r:id="rId7"/>
+    <p:sldId id="272" r:id="rId8"/>
+    <p:sldId id="267" r:id="rId9"/>
+    <p:sldId id="268" r:id="rId10"/>
+    <p:sldId id="283" r:id="rId11"/>
+    <p:sldId id="269" r:id="rId12"/>
+    <p:sldId id="273" r:id="rId13"/>
+    <p:sldId id="280" r:id="rId14"/>
+    <p:sldId id="281" r:id="rId15"/>
+    <p:sldId id="282" r:id="rId16"/>
+    <p:sldId id="286" r:id="rId17"/>
+    <p:sldId id="274" r:id="rId18"/>
+    <p:sldId id="275" r:id="rId19"/>
   </p:sldIdLst>
   <p:sldSz cx="12192000" cy="6858000"/>
   <p:notesSz cx="6858000" cy="9144000"/>
@@ -144,7 +146,7 @@
           <p:cNvPr id="2" name="标题 1">
             <a:extLst>
               <a:ext uri="{FF2B5EF4-FFF2-40B4-BE49-F238E27FC236}">
-                <a16:creationId xmlns="" xmlns:a16="http://schemas.microsoft.com/office/drawing/2014/main" id="{10F33BF8-FD8E-786C-E15E-E839FDF28F95}"/>
+                <a16:creationId xmlns:a16="http://schemas.microsoft.com/office/drawing/2014/main" xmlns="" id="{10F33BF8-FD8E-786C-E15E-E839FDF28F95}"/>
               </a:ext>
             </a:extLst>
           </p:cNvPr>
@@ -182,7 +184,7 @@
           <p:cNvPr id="3" name="副标题 2">
             <a:extLst>
               <a:ext uri="{FF2B5EF4-FFF2-40B4-BE49-F238E27FC236}">
-                <a16:creationId xmlns="" xmlns:a16="http://schemas.microsoft.com/office/drawing/2014/main" id="{9AC2F9CB-7901-1897-0622-D26554C82DCD}"/>
+                <a16:creationId xmlns:a16="http://schemas.microsoft.com/office/drawing/2014/main" xmlns="" id="{9AC2F9CB-7901-1897-0622-D26554C82DCD}"/>
               </a:ext>
             </a:extLst>
           </p:cNvPr>
@@ -253,7 +255,7 @@
           <p:cNvPr id="4" name="日期占位符 3">
             <a:extLst>
               <a:ext uri="{FF2B5EF4-FFF2-40B4-BE49-F238E27FC236}">
-                <a16:creationId xmlns="" xmlns:a16="http://schemas.microsoft.com/office/drawing/2014/main" id="{7E582C05-515F-B6CD-BAAD-A85C6E8EE755}"/>
+                <a16:creationId xmlns:a16="http://schemas.microsoft.com/office/drawing/2014/main" xmlns="" id="{7E582C05-515F-B6CD-BAAD-A85C6E8EE755}"/>
               </a:ext>
             </a:extLst>
           </p:cNvPr>
@@ -282,7 +284,7 @@
           <p:cNvPr id="5" name="页脚占位符 4">
             <a:extLst>
               <a:ext uri="{FF2B5EF4-FFF2-40B4-BE49-F238E27FC236}">
-                <a16:creationId xmlns="" xmlns:a16="http://schemas.microsoft.com/office/drawing/2014/main" id="{E3C4F145-A780-D801-34B1-952578D06BB7}"/>
+                <a16:creationId xmlns:a16="http://schemas.microsoft.com/office/drawing/2014/main" xmlns="" id="{E3C4F145-A780-D801-34B1-952578D06BB7}"/>
               </a:ext>
             </a:extLst>
           </p:cNvPr>
@@ -307,7 +309,7 @@
           <p:cNvPr id="6" name="灯片编号占位符 5">
             <a:extLst>
               <a:ext uri="{FF2B5EF4-FFF2-40B4-BE49-F238E27FC236}">
-                <a16:creationId xmlns="" xmlns:a16="http://schemas.microsoft.com/office/drawing/2014/main" id="{643C2776-D61B-1BE0-DAD9-9115B8BF85AE}"/>
+                <a16:creationId xmlns:a16="http://schemas.microsoft.com/office/drawing/2014/main" xmlns="" id="{643C2776-D61B-1BE0-DAD9-9115B8BF85AE}"/>
               </a:ext>
             </a:extLst>
           </p:cNvPr>
@@ -366,7 +368,7 @@
           <p:cNvPr id="2" name="标题 1">
             <a:extLst>
               <a:ext uri="{FF2B5EF4-FFF2-40B4-BE49-F238E27FC236}">
-                <a16:creationId xmlns="" xmlns:a16="http://schemas.microsoft.com/office/drawing/2014/main" id="{EA6036EE-75BD-2041-346A-9751132F17EB}"/>
+                <a16:creationId xmlns:a16="http://schemas.microsoft.com/office/drawing/2014/main" xmlns="" id="{EA6036EE-75BD-2041-346A-9751132F17EB}"/>
               </a:ext>
             </a:extLst>
           </p:cNvPr>
@@ -395,7 +397,7 @@
           <p:cNvPr id="3" name="竖排文字占位符 2">
             <a:extLst>
               <a:ext uri="{FF2B5EF4-FFF2-40B4-BE49-F238E27FC236}">
-                <a16:creationId xmlns="" xmlns:a16="http://schemas.microsoft.com/office/drawing/2014/main" id="{35A7DEB4-59FC-F94E-CE1E-1BAE867E1B52}"/>
+                <a16:creationId xmlns:a16="http://schemas.microsoft.com/office/drawing/2014/main" xmlns="" id="{35A7DEB4-59FC-F94E-CE1E-1BAE867E1B52}"/>
               </a:ext>
             </a:extLst>
           </p:cNvPr>
@@ -453,7 +455,7 @@
           <p:cNvPr id="4" name="日期占位符 3">
             <a:extLst>
               <a:ext uri="{FF2B5EF4-FFF2-40B4-BE49-F238E27FC236}">
-                <a16:creationId xmlns="" xmlns:a16="http://schemas.microsoft.com/office/drawing/2014/main" id="{FAF04A84-931B-567B-8BA7-1CFAA44D303E}"/>
+                <a16:creationId xmlns:a16="http://schemas.microsoft.com/office/drawing/2014/main" xmlns="" id="{FAF04A84-931B-567B-8BA7-1CFAA44D303E}"/>
               </a:ext>
             </a:extLst>
           </p:cNvPr>
@@ -482,7 +484,7 @@
           <p:cNvPr id="5" name="页脚占位符 4">
             <a:extLst>
               <a:ext uri="{FF2B5EF4-FFF2-40B4-BE49-F238E27FC236}">
-                <a16:creationId xmlns="" xmlns:a16="http://schemas.microsoft.com/office/drawing/2014/main" id="{8C580D2B-CF67-5316-F00F-82BEBDA94534}"/>
+                <a16:creationId xmlns:a16="http://schemas.microsoft.com/office/drawing/2014/main" xmlns="" id="{8C580D2B-CF67-5316-F00F-82BEBDA94534}"/>
               </a:ext>
             </a:extLst>
           </p:cNvPr>
@@ -507,7 +509,7 @@
           <p:cNvPr id="6" name="灯片编号占位符 5">
             <a:extLst>
               <a:ext uri="{FF2B5EF4-FFF2-40B4-BE49-F238E27FC236}">
-                <a16:creationId xmlns="" xmlns:a16="http://schemas.microsoft.com/office/drawing/2014/main" id="{FB3F5507-C9AC-5F2D-6392-B66544928DFA}"/>
+                <a16:creationId xmlns:a16="http://schemas.microsoft.com/office/drawing/2014/main" xmlns="" id="{FB3F5507-C9AC-5F2D-6392-B66544928DFA}"/>
               </a:ext>
             </a:extLst>
           </p:cNvPr>
@@ -566,7 +568,7 @@
           <p:cNvPr id="2" name="竖排标题 1">
             <a:extLst>
               <a:ext uri="{FF2B5EF4-FFF2-40B4-BE49-F238E27FC236}">
-                <a16:creationId xmlns="" xmlns:a16="http://schemas.microsoft.com/office/drawing/2014/main" id="{FF963630-547A-D682-588A-9B3BF4A2BF47}"/>
+                <a16:creationId xmlns:a16="http://schemas.microsoft.com/office/drawing/2014/main" xmlns="" id="{FF963630-547A-D682-588A-9B3BF4A2BF47}"/>
               </a:ext>
             </a:extLst>
           </p:cNvPr>
@@ -600,7 +602,7 @@
           <p:cNvPr id="3" name="竖排文字占位符 2">
             <a:extLst>
               <a:ext uri="{FF2B5EF4-FFF2-40B4-BE49-F238E27FC236}">
-                <a16:creationId xmlns="" xmlns:a16="http://schemas.microsoft.com/office/drawing/2014/main" id="{0441B8FB-15EA-E2DB-E546-0FDFA74E648A}"/>
+                <a16:creationId xmlns:a16="http://schemas.microsoft.com/office/drawing/2014/main" xmlns="" id="{0441B8FB-15EA-E2DB-E546-0FDFA74E648A}"/>
               </a:ext>
             </a:extLst>
           </p:cNvPr>
@@ -663,7 +665,7 @@
           <p:cNvPr id="4" name="日期占位符 3">
             <a:extLst>
               <a:ext uri="{FF2B5EF4-FFF2-40B4-BE49-F238E27FC236}">
-                <a16:creationId xmlns="" xmlns:a16="http://schemas.microsoft.com/office/drawing/2014/main" id="{E7099FBA-3318-F430-9238-CE6D093F7B06}"/>
+                <a16:creationId xmlns:a16="http://schemas.microsoft.com/office/drawing/2014/main" xmlns="" id="{E7099FBA-3318-F430-9238-CE6D093F7B06}"/>
               </a:ext>
             </a:extLst>
           </p:cNvPr>
@@ -692,7 +694,7 @@
           <p:cNvPr id="5" name="页脚占位符 4">
             <a:extLst>
               <a:ext uri="{FF2B5EF4-FFF2-40B4-BE49-F238E27FC236}">
-                <a16:creationId xmlns="" xmlns:a16="http://schemas.microsoft.com/office/drawing/2014/main" id="{B3F16089-F829-DD68-5D3F-2175104F0EF8}"/>
+                <a16:creationId xmlns:a16="http://schemas.microsoft.com/office/drawing/2014/main" xmlns="" id="{B3F16089-F829-DD68-5D3F-2175104F0EF8}"/>
               </a:ext>
             </a:extLst>
           </p:cNvPr>
@@ -717,7 +719,7 @@
           <p:cNvPr id="6" name="灯片编号占位符 5">
             <a:extLst>
               <a:ext uri="{FF2B5EF4-FFF2-40B4-BE49-F238E27FC236}">
-                <a16:creationId xmlns="" xmlns:a16="http://schemas.microsoft.com/office/drawing/2014/main" id="{284F7E61-C042-2616-1A4C-8239F8AD939F}"/>
+                <a16:creationId xmlns:a16="http://schemas.microsoft.com/office/drawing/2014/main" xmlns="" id="{284F7E61-C042-2616-1A4C-8239F8AD939F}"/>
               </a:ext>
             </a:extLst>
           </p:cNvPr>
@@ -776,7 +778,7 @@
           <p:cNvPr id="2" name="标题 1">
             <a:extLst>
               <a:ext uri="{FF2B5EF4-FFF2-40B4-BE49-F238E27FC236}">
-                <a16:creationId xmlns="" xmlns:a16="http://schemas.microsoft.com/office/drawing/2014/main" id="{07EA60D0-A96A-7BA3-8151-D2426ABEB894}"/>
+                <a16:creationId xmlns:a16="http://schemas.microsoft.com/office/drawing/2014/main" xmlns="" id="{07EA60D0-A96A-7BA3-8151-D2426ABEB894}"/>
               </a:ext>
             </a:extLst>
           </p:cNvPr>
@@ -805,7 +807,7 @@
           <p:cNvPr id="3" name="内容占位符 2">
             <a:extLst>
               <a:ext uri="{FF2B5EF4-FFF2-40B4-BE49-F238E27FC236}">
-                <a16:creationId xmlns="" xmlns:a16="http://schemas.microsoft.com/office/drawing/2014/main" id="{8995B592-6FF4-F1CF-0AD8-196E556B8A02}"/>
+                <a16:creationId xmlns:a16="http://schemas.microsoft.com/office/drawing/2014/main" xmlns="" id="{8995B592-6FF4-F1CF-0AD8-196E556B8A02}"/>
               </a:ext>
             </a:extLst>
           </p:cNvPr>
@@ -863,7 +865,7 @@
           <p:cNvPr id="4" name="日期占位符 3">
             <a:extLst>
               <a:ext uri="{FF2B5EF4-FFF2-40B4-BE49-F238E27FC236}">
-                <a16:creationId xmlns="" xmlns:a16="http://schemas.microsoft.com/office/drawing/2014/main" id="{F688347B-553B-FB7C-071A-8F8B9CFAAA17}"/>
+                <a16:creationId xmlns:a16="http://schemas.microsoft.com/office/drawing/2014/main" xmlns="" id="{F688347B-553B-FB7C-071A-8F8B9CFAAA17}"/>
               </a:ext>
             </a:extLst>
           </p:cNvPr>
@@ -892,7 +894,7 @@
           <p:cNvPr id="5" name="页脚占位符 4">
             <a:extLst>
               <a:ext uri="{FF2B5EF4-FFF2-40B4-BE49-F238E27FC236}">
-                <a16:creationId xmlns="" xmlns:a16="http://schemas.microsoft.com/office/drawing/2014/main" id="{6204CF4E-0B10-2210-EBC6-A8F0445FC0D1}"/>
+                <a16:creationId xmlns:a16="http://schemas.microsoft.com/office/drawing/2014/main" xmlns="" id="{6204CF4E-0B10-2210-EBC6-A8F0445FC0D1}"/>
               </a:ext>
             </a:extLst>
           </p:cNvPr>
@@ -917,7 +919,7 @@
           <p:cNvPr id="6" name="灯片编号占位符 5">
             <a:extLst>
               <a:ext uri="{FF2B5EF4-FFF2-40B4-BE49-F238E27FC236}">
-                <a16:creationId xmlns="" xmlns:a16="http://schemas.microsoft.com/office/drawing/2014/main" id="{CF57CACF-E97F-6DF7-EC7C-9F8F35C17F00}"/>
+                <a16:creationId xmlns:a16="http://schemas.microsoft.com/office/drawing/2014/main" xmlns="" id="{CF57CACF-E97F-6DF7-EC7C-9F8F35C17F00}"/>
               </a:ext>
             </a:extLst>
           </p:cNvPr>
@@ -976,7 +978,7 @@
           <p:cNvPr id="2" name="标题 1">
             <a:extLst>
               <a:ext uri="{FF2B5EF4-FFF2-40B4-BE49-F238E27FC236}">
-                <a16:creationId xmlns="" xmlns:a16="http://schemas.microsoft.com/office/drawing/2014/main" id="{CE67FC3D-1EFA-9088-66D0-E3063BBDFCCF}"/>
+                <a16:creationId xmlns:a16="http://schemas.microsoft.com/office/drawing/2014/main" xmlns="" id="{CE67FC3D-1EFA-9088-66D0-E3063BBDFCCF}"/>
               </a:ext>
             </a:extLst>
           </p:cNvPr>
@@ -1014,7 +1016,7 @@
           <p:cNvPr id="3" name="文本占位符 2">
             <a:extLst>
               <a:ext uri="{FF2B5EF4-FFF2-40B4-BE49-F238E27FC236}">
-                <a16:creationId xmlns="" xmlns:a16="http://schemas.microsoft.com/office/drawing/2014/main" id="{74FDC549-C0B9-87F6-5635-A3153B46A35F}"/>
+                <a16:creationId xmlns:a16="http://schemas.microsoft.com/office/drawing/2014/main" xmlns="" id="{74FDC549-C0B9-87F6-5635-A3153B46A35F}"/>
               </a:ext>
             </a:extLst>
           </p:cNvPr>
@@ -1139,7 +1141,7 @@
           <p:cNvPr id="4" name="日期占位符 3">
             <a:extLst>
               <a:ext uri="{FF2B5EF4-FFF2-40B4-BE49-F238E27FC236}">
-                <a16:creationId xmlns="" xmlns:a16="http://schemas.microsoft.com/office/drawing/2014/main" id="{18304B00-38CB-B596-9C8C-B7949712E01E}"/>
+                <a16:creationId xmlns:a16="http://schemas.microsoft.com/office/drawing/2014/main" xmlns="" id="{18304B00-38CB-B596-9C8C-B7949712E01E}"/>
               </a:ext>
             </a:extLst>
           </p:cNvPr>
@@ -1168,7 +1170,7 @@
           <p:cNvPr id="5" name="页脚占位符 4">
             <a:extLst>
               <a:ext uri="{FF2B5EF4-FFF2-40B4-BE49-F238E27FC236}">
-                <a16:creationId xmlns="" xmlns:a16="http://schemas.microsoft.com/office/drawing/2014/main" id="{0AECB766-FFA2-24BC-153B-CA2622A7D8B4}"/>
+                <a16:creationId xmlns:a16="http://schemas.microsoft.com/office/drawing/2014/main" xmlns="" id="{0AECB766-FFA2-24BC-153B-CA2622A7D8B4}"/>
               </a:ext>
             </a:extLst>
           </p:cNvPr>
@@ -1193,7 +1195,7 @@
           <p:cNvPr id="6" name="灯片编号占位符 5">
             <a:extLst>
               <a:ext uri="{FF2B5EF4-FFF2-40B4-BE49-F238E27FC236}">
-                <a16:creationId xmlns="" xmlns:a16="http://schemas.microsoft.com/office/drawing/2014/main" id="{C37203E8-005F-F530-D6EC-FFD3FA376590}"/>
+                <a16:creationId xmlns:a16="http://schemas.microsoft.com/office/drawing/2014/main" xmlns="" id="{C37203E8-005F-F530-D6EC-FFD3FA376590}"/>
               </a:ext>
             </a:extLst>
           </p:cNvPr>
@@ -1252,7 +1254,7 @@
           <p:cNvPr id="2" name="标题 1">
             <a:extLst>
               <a:ext uri="{FF2B5EF4-FFF2-40B4-BE49-F238E27FC236}">
-                <a16:creationId xmlns="" xmlns:a16="http://schemas.microsoft.com/office/drawing/2014/main" id="{81BB6436-DABC-EA59-16D2-57D8BEB021D9}"/>
+                <a16:creationId xmlns:a16="http://schemas.microsoft.com/office/drawing/2014/main" xmlns="" id="{81BB6436-DABC-EA59-16D2-57D8BEB021D9}"/>
               </a:ext>
             </a:extLst>
           </p:cNvPr>
@@ -1281,7 +1283,7 @@
           <p:cNvPr id="3" name="内容占位符 2">
             <a:extLst>
               <a:ext uri="{FF2B5EF4-FFF2-40B4-BE49-F238E27FC236}">
-                <a16:creationId xmlns="" xmlns:a16="http://schemas.microsoft.com/office/drawing/2014/main" id="{333F17B2-88DA-F787-56F4-1765242A77DF}"/>
+                <a16:creationId xmlns:a16="http://schemas.microsoft.com/office/drawing/2014/main" xmlns="" id="{333F17B2-88DA-F787-56F4-1765242A77DF}"/>
               </a:ext>
             </a:extLst>
           </p:cNvPr>
@@ -1344,7 +1346,7 @@
           <p:cNvPr id="4" name="内容占位符 3">
             <a:extLst>
               <a:ext uri="{FF2B5EF4-FFF2-40B4-BE49-F238E27FC236}">
-                <a16:creationId xmlns="" xmlns:a16="http://schemas.microsoft.com/office/drawing/2014/main" id="{23BA2EE3-B444-FF67-B4EA-11FDF0E5061D}"/>
+                <a16:creationId xmlns:a16="http://schemas.microsoft.com/office/drawing/2014/main" xmlns="" id="{23BA2EE3-B444-FF67-B4EA-11FDF0E5061D}"/>
               </a:ext>
             </a:extLst>
           </p:cNvPr>
@@ -1407,7 +1409,7 @@
           <p:cNvPr id="5" name="日期占位符 4">
             <a:extLst>
               <a:ext uri="{FF2B5EF4-FFF2-40B4-BE49-F238E27FC236}">
-                <a16:creationId xmlns="" xmlns:a16="http://schemas.microsoft.com/office/drawing/2014/main" id="{FE56265B-DC6C-28F4-81DB-D7F60B054010}"/>
+                <a16:creationId xmlns:a16="http://schemas.microsoft.com/office/drawing/2014/main" xmlns="" id="{FE56265B-DC6C-28F4-81DB-D7F60B054010}"/>
               </a:ext>
             </a:extLst>
           </p:cNvPr>
@@ -1436,7 +1438,7 @@
           <p:cNvPr id="6" name="页脚占位符 5">
             <a:extLst>
               <a:ext uri="{FF2B5EF4-FFF2-40B4-BE49-F238E27FC236}">
-                <a16:creationId xmlns="" xmlns:a16="http://schemas.microsoft.com/office/drawing/2014/main" id="{83EC8090-BD4F-CDCD-9C61-5123F78AC20A}"/>
+                <a16:creationId xmlns:a16="http://schemas.microsoft.com/office/drawing/2014/main" xmlns="" id="{83EC8090-BD4F-CDCD-9C61-5123F78AC20A}"/>
               </a:ext>
             </a:extLst>
           </p:cNvPr>
@@ -1461,7 +1463,7 @@
           <p:cNvPr id="7" name="灯片编号占位符 6">
             <a:extLst>
               <a:ext uri="{FF2B5EF4-FFF2-40B4-BE49-F238E27FC236}">
-                <a16:creationId xmlns="" xmlns:a16="http://schemas.microsoft.com/office/drawing/2014/main" id="{C226ACE0-F80E-3F73-E8B0-CF76AF97F25E}"/>
+                <a16:creationId xmlns:a16="http://schemas.microsoft.com/office/drawing/2014/main" xmlns="" id="{C226ACE0-F80E-3F73-E8B0-CF76AF97F25E}"/>
               </a:ext>
             </a:extLst>
           </p:cNvPr>
@@ -1520,7 +1522,7 @@
           <p:cNvPr id="2" name="标题 1">
             <a:extLst>
               <a:ext uri="{FF2B5EF4-FFF2-40B4-BE49-F238E27FC236}">
-                <a16:creationId xmlns="" xmlns:a16="http://schemas.microsoft.com/office/drawing/2014/main" id="{50BE3C57-7CD4-B732-EC2A-8DE16644555C}"/>
+                <a16:creationId xmlns:a16="http://schemas.microsoft.com/office/drawing/2014/main" xmlns="" id="{50BE3C57-7CD4-B732-EC2A-8DE16644555C}"/>
               </a:ext>
             </a:extLst>
           </p:cNvPr>
@@ -1554,7 +1556,7 @@
           <p:cNvPr id="3" name="文本占位符 2">
             <a:extLst>
               <a:ext uri="{FF2B5EF4-FFF2-40B4-BE49-F238E27FC236}">
-                <a16:creationId xmlns="" xmlns:a16="http://schemas.microsoft.com/office/drawing/2014/main" id="{B43143F4-2584-0768-FED4-4E3F3A8F20AF}"/>
+                <a16:creationId xmlns:a16="http://schemas.microsoft.com/office/drawing/2014/main" xmlns="" id="{B43143F4-2584-0768-FED4-4E3F3A8F20AF}"/>
               </a:ext>
             </a:extLst>
           </p:cNvPr>
@@ -1625,7 +1627,7 @@
           <p:cNvPr id="4" name="内容占位符 3">
             <a:extLst>
               <a:ext uri="{FF2B5EF4-FFF2-40B4-BE49-F238E27FC236}">
-                <a16:creationId xmlns="" xmlns:a16="http://schemas.microsoft.com/office/drawing/2014/main" id="{2F128599-7522-0440-5350-B3C70CC4A24C}"/>
+                <a16:creationId xmlns:a16="http://schemas.microsoft.com/office/drawing/2014/main" xmlns="" id="{2F128599-7522-0440-5350-B3C70CC4A24C}"/>
               </a:ext>
             </a:extLst>
           </p:cNvPr>
@@ -1688,7 +1690,7 @@
           <p:cNvPr id="5" name="文本占位符 4">
             <a:extLst>
               <a:ext uri="{FF2B5EF4-FFF2-40B4-BE49-F238E27FC236}">
-                <a16:creationId xmlns="" xmlns:a16="http://schemas.microsoft.com/office/drawing/2014/main" id="{9F0B35A0-7A68-0D8C-991E-ADF73C8FBED5}"/>
+                <a16:creationId xmlns:a16="http://schemas.microsoft.com/office/drawing/2014/main" xmlns="" id="{9F0B35A0-7A68-0D8C-991E-ADF73C8FBED5}"/>
               </a:ext>
             </a:extLst>
           </p:cNvPr>
@@ -1759,7 +1761,7 @@
           <p:cNvPr id="6" name="内容占位符 5">
             <a:extLst>
               <a:ext uri="{FF2B5EF4-FFF2-40B4-BE49-F238E27FC236}">
-                <a16:creationId xmlns="" xmlns:a16="http://schemas.microsoft.com/office/drawing/2014/main" id="{F802823B-E595-5F81-D71F-B0305CAA1581}"/>
+                <a16:creationId xmlns:a16="http://schemas.microsoft.com/office/drawing/2014/main" xmlns="" id="{F802823B-E595-5F81-D71F-B0305CAA1581}"/>
               </a:ext>
             </a:extLst>
           </p:cNvPr>
@@ -1822,7 +1824,7 @@
           <p:cNvPr id="7" name="日期占位符 6">
             <a:extLst>
               <a:ext uri="{FF2B5EF4-FFF2-40B4-BE49-F238E27FC236}">
-                <a16:creationId xmlns="" xmlns:a16="http://schemas.microsoft.com/office/drawing/2014/main" id="{9E1EE24D-D1DE-9B3E-4080-6808708C05A8}"/>
+                <a16:creationId xmlns:a16="http://schemas.microsoft.com/office/drawing/2014/main" xmlns="" id="{9E1EE24D-D1DE-9B3E-4080-6808708C05A8}"/>
               </a:ext>
             </a:extLst>
           </p:cNvPr>
@@ -1851,7 +1853,7 @@
           <p:cNvPr id="8" name="页脚占位符 7">
             <a:extLst>
               <a:ext uri="{FF2B5EF4-FFF2-40B4-BE49-F238E27FC236}">
-                <a16:creationId xmlns="" xmlns:a16="http://schemas.microsoft.com/office/drawing/2014/main" id="{C06C2DEB-A9DD-A722-1495-E6D7A91BC29C}"/>
+                <a16:creationId xmlns:a16="http://schemas.microsoft.com/office/drawing/2014/main" xmlns="" id="{C06C2DEB-A9DD-A722-1495-E6D7A91BC29C}"/>
               </a:ext>
             </a:extLst>
           </p:cNvPr>
@@ -1876,7 +1878,7 @@
           <p:cNvPr id="9" name="灯片编号占位符 8">
             <a:extLst>
               <a:ext uri="{FF2B5EF4-FFF2-40B4-BE49-F238E27FC236}">
-                <a16:creationId xmlns="" xmlns:a16="http://schemas.microsoft.com/office/drawing/2014/main" id="{D8971254-CB67-6345-01AC-7BAF7FD67DFF}"/>
+                <a16:creationId xmlns:a16="http://schemas.microsoft.com/office/drawing/2014/main" xmlns="" id="{D8971254-CB67-6345-01AC-7BAF7FD67DFF}"/>
               </a:ext>
             </a:extLst>
           </p:cNvPr>
@@ -1935,7 +1937,7 @@
           <p:cNvPr id="2" name="标题 1">
             <a:extLst>
               <a:ext uri="{FF2B5EF4-FFF2-40B4-BE49-F238E27FC236}">
-                <a16:creationId xmlns="" xmlns:a16="http://schemas.microsoft.com/office/drawing/2014/main" id="{06648288-2F93-747D-9554-15E36671F261}"/>
+                <a16:creationId xmlns:a16="http://schemas.microsoft.com/office/drawing/2014/main" xmlns="" id="{06648288-2F93-747D-9554-15E36671F261}"/>
               </a:ext>
             </a:extLst>
           </p:cNvPr>
@@ -1964,7 +1966,7 @@
           <p:cNvPr id="3" name="日期占位符 2">
             <a:extLst>
               <a:ext uri="{FF2B5EF4-FFF2-40B4-BE49-F238E27FC236}">
-                <a16:creationId xmlns="" xmlns:a16="http://schemas.microsoft.com/office/drawing/2014/main" id="{35174584-4E29-D26E-0C6F-FD2DB8A038A7}"/>
+                <a16:creationId xmlns:a16="http://schemas.microsoft.com/office/drawing/2014/main" xmlns="" id="{35174584-4E29-D26E-0C6F-FD2DB8A038A7}"/>
               </a:ext>
             </a:extLst>
           </p:cNvPr>
@@ -1993,7 +1995,7 @@
           <p:cNvPr id="4" name="页脚占位符 3">
             <a:extLst>
               <a:ext uri="{FF2B5EF4-FFF2-40B4-BE49-F238E27FC236}">
-                <a16:creationId xmlns="" xmlns:a16="http://schemas.microsoft.com/office/drawing/2014/main" id="{CADE618B-D099-FF72-1C9A-FF8374FA83E0}"/>
+                <a16:creationId xmlns:a16="http://schemas.microsoft.com/office/drawing/2014/main" xmlns="" id="{CADE618B-D099-FF72-1C9A-FF8374FA83E0}"/>
               </a:ext>
             </a:extLst>
           </p:cNvPr>
@@ -2018,7 +2020,7 @@
           <p:cNvPr id="5" name="灯片编号占位符 4">
             <a:extLst>
               <a:ext uri="{FF2B5EF4-FFF2-40B4-BE49-F238E27FC236}">
-                <a16:creationId xmlns="" xmlns:a16="http://schemas.microsoft.com/office/drawing/2014/main" id="{38451358-EAB2-6BBD-CD23-0286DD1C0A53}"/>
+                <a16:creationId xmlns:a16="http://schemas.microsoft.com/office/drawing/2014/main" xmlns="" id="{38451358-EAB2-6BBD-CD23-0286DD1C0A53}"/>
               </a:ext>
             </a:extLst>
           </p:cNvPr>
@@ -2077,7 +2079,7 @@
           <p:cNvPr id="2" name="日期占位符 1">
             <a:extLst>
               <a:ext uri="{FF2B5EF4-FFF2-40B4-BE49-F238E27FC236}">
-                <a16:creationId xmlns="" xmlns:a16="http://schemas.microsoft.com/office/drawing/2014/main" id="{33190D7B-3496-BB63-17A5-158547EBAFF9}"/>
+                <a16:creationId xmlns:a16="http://schemas.microsoft.com/office/drawing/2014/main" xmlns="" id="{33190D7B-3496-BB63-17A5-158547EBAFF9}"/>
               </a:ext>
             </a:extLst>
           </p:cNvPr>
@@ -2106,7 +2108,7 @@
           <p:cNvPr id="3" name="页脚占位符 2">
             <a:extLst>
               <a:ext uri="{FF2B5EF4-FFF2-40B4-BE49-F238E27FC236}">
-                <a16:creationId xmlns="" xmlns:a16="http://schemas.microsoft.com/office/drawing/2014/main" id="{1DD90573-7834-709E-2B09-296E30DF435A}"/>
+                <a16:creationId xmlns:a16="http://schemas.microsoft.com/office/drawing/2014/main" xmlns="" id="{1DD90573-7834-709E-2B09-296E30DF435A}"/>
               </a:ext>
             </a:extLst>
           </p:cNvPr>
@@ -2131,7 +2133,7 @@
           <p:cNvPr id="4" name="灯片编号占位符 3">
             <a:extLst>
               <a:ext uri="{FF2B5EF4-FFF2-40B4-BE49-F238E27FC236}">
-                <a16:creationId xmlns="" xmlns:a16="http://schemas.microsoft.com/office/drawing/2014/main" id="{E1379807-BBF2-3092-4B19-368A23A121C4}"/>
+                <a16:creationId xmlns:a16="http://schemas.microsoft.com/office/drawing/2014/main" xmlns="" id="{E1379807-BBF2-3092-4B19-368A23A121C4}"/>
               </a:ext>
             </a:extLst>
           </p:cNvPr>
@@ -2190,7 +2192,7 @@
           <p:cNvPr id="2" name="标题 1">
             <a:extLst>
               <a:ext uri="{FF2B5EF4-FFF2-40B4-BE49-F238E27FC236}">
-                <a16:creationId xmlns="" xmlns:a16="http://schemas.microsoft.com/office/drawing/2014/main" id="{25E85BB5-563D-24A5-F24B-ACA0E5ADABF9}"/>
+                <a16:creationId xmlns:a16="http://schemas.microsoft.com/office/drawing/2014/main" xmlns="" id="{25E85BB5-563D-24A5-F24B-ACA0E5ADABF9}"/>
               </a:ext>
             </a:extLst>
           </p:cNvPr>
@@ -2228,7 +2230,7 @@
           <p:cNvPr id="3" name="内容占位符 2">
             <a:extLst>
               <a:ext uri="{FF2B5EF4-FFF2-40B4-BE49-F238E27FC236}">
-                <a16:creationId xmlns="" xmlns:a16="http://schemas.microsoft.com/office/drawing/2014/main" id="{C1289F38-DB5E-A78A-05ED-CFD3413A93F7}"/>
+                <a16:creationId xmlns:a16="http://schemas.microsoft.com/office/drawing/2014/main" xmlns="" id="{C1289F38-DB5E-A78A-05ED-CFD3413A93F7}"/>
               </a:ext>
             </a:extLst>
           </p:cNvPr>
@@ -2319,7 +2321,7 @@
           <p:cNvPr id="4" name="文本占位符 3">
             <a:extLst>
               <a:ext uri="{FF2B5EF4-FFF2-40B4-BE49-F238E27FC236}">
-                <a16:creationId xmlns="" xmlns:a16="http://schemas.microsoft.com/office/drawing/2014/main" id="{8EB3C4BF-4FF5-8AB9-9C5D-0B2A90D1E8F5}"/>
+                <a16:creationId xmlns:a16="http://schemas.microsoft.com/office/drawing/2014/main" xmlns="" id="{8EB3C4BF-4FF5-8AB9-9C5D-0B2A90D1E8F5}"/>
               </a:ext>
             </a:extLst>
           </p:cNvPr>
@@ -2390,7 +2392,7 @@
           <p:cNvPr id="5" name="日期占位符 4">
             <a:extLst>
               <a:ext uri="{FF2B5EF4-FFF2-40B4-BE49-F238E27FC236}">
-                <a16:creationId xmlns="" xmlns:a16="http://schemas.microsoft.com/office/drawing/2014/main" id="{D2EC3A4D-B75A-4727-24FA-A74947B1AC9D}"/>
+                <a16:creationId xmlns:a16="http://schemas.microsoft.com/office/drawing/2014/main" xmlns="" id="{D2EC3A4D-B75A-4727-24FA-A74947B1AC9D}"/>
               </a:ext>
             </a:extLst>
           </p:cNvPr>
@@ -2419,7 +2421,7 @@
           <p:cNvPr id="6" name="页脚占位符 5">
             <a:extLst>
               <a:ext uri="{FF2B5EF4-FFF2-40B4-BE49-F238E27FC236}">
-                <a16:creationId xmlns="" xmlns:a16="http://schemas.microsoft.com/office/drawing/2014/main" id="{3082729F-7372-D5A4-CE10-418BC38154B3}"/>
+                <a16:creationId xmlns:a16="http://schemas.microsoft.com/office/drawing/2014/main" xmlns="" id="{3082729F-7372-D5A4-CE10-418BC38154B3}"/>
               </a:ext>
             </a:extLst>
           </p:cNvPr>
@@ -2444,7 +2446,7 @@
           <p:cNvPr id="7" name="灯片编号占位符 6">
             <a:extLst>
               <a:ext uri="{FF2B5EF4-FFF2-40B4-BE49-F238E27FC236}">
-                <a16:creationId xmlns="" xmlns:a16="http://schemas.microsoft.com/office/drawing/2014/main" id="{7F7D7F14-8019-48F4-B05F-BFE11B73B7A7}"/>
+                <a16:creationId xmlns:a16="http://schemas.microsoft.com/office/drawing/2014/main" xmlns="" id="{7F7D7F14-8019-48F4-B05F-BFE11B73B7A7}"/>
               </a:ext>
             </a:extLst>
           </p:cNvPr>
@@ -2503,7 +2505,7 @@
           <p:cNvPr id="2" name="标题 1">
             <a:extLst>
               <a:ext uri="{FF2B5EF4-FFF2-40B4-BE49-F238E27FC236}">
-                <a16:creationId xmlns="" xmlns:a16="http://schemas.microsoft.com/office/drawing/2014/main" id="{59FE2280-6670-C94E-0DF5-91978AFA7056}"/>
+                <a16:creationId xmlns:a16="http://schemas.microsoft.com/office/drawing/2014/main" xmlns="" id="{59FE2280-6670-C94E-0DF5-91978AFA7056}"/>
               </a:ext>
             </a:extLst>
           </p:cNvPr>
@@ -2541,7 +2543,7 @@
           <p:cNvPr id="3" name="图片占位符 2">
             <a:extLst>
               <a:ext uri="{FF2B5EF4-FFF2-40B4-BE49-F238E27FC236}">
-                <a16:creationId xmlns="" xmlns:a16="http://schemas.microsoft.com/office/drawing/2014/main" id="{0041BED5-92ED-AC74-6807-2113BAFCA812}"/>
+                <a16:creationId xmlns:a16="http://schemas.microsoft.com/office/drawing/2014/main" xmlns="" id="{0041BED5-92ED-AC74-6807-2113BAFCA812}"/>
               </a:ext>
             </a:extLst>
           </p:cNvPr>
@@ -2608,7 +2610,7 @@
           <p:cNvPr id="4" name="文本占位符 3">
             <a:extLst>
               <a:ext uri="{FF2B5EF4-FFF2-40B4-BE49-F238E27FC236}">
-                <a16:creationId xmlns="" xmlns:a16="http://schemas.microsoft.com/office/drawing/2014/main" id="{67BDB5BB-A36C-979E-585C-FE2BC429D7F6}"/>
+                <a16:creationId xmlns:a16="http://schemas.microsoft.com/office/drawing/2014/main" xmlns="" id="{67BDB5BB-A36C-979E-585C-FE2BC429D7F6}"/>
               </a:ext>
             </a:extLst>
           </p:cNvPr>
@@ -2679,7 +2681,7 @@
           <p:cNvPr id="5" name="日期占位符 4">
             <a:extLst>
               <a:ext uri="{FF2B5EF4-FFF2-40B4-BE49-F238E27FC236}">
-                <a16:creationId xmlns="" xmlns:a16="http://schemas.microsoft.com/office/drawing/2014/main" id="{8F192718-E975-55E0-B895-63A124910067}"/>
+                <a16:creationId xmlns:a16="http://schemas.microsoft.com/office/drawing/2014/main" xmlns="" id="{8F192718-E975-55E0-B895-63A124910067}"/>
               </a:ext>
             </a:extLst>
           </p:cNvPr>
@@ -2708,7 +2710,7 @@
           <p:cNvPr id="6" name="页脚占位符 5">
             <a:extLst>
               <a:ext uri="{FF2B5EF4-FFF2-40B4-BE49-F238E27FC236}">
-                <a16:creationId xmlns="" xmlns:a16="http://schemas.microsoft.com/office/drawing/2014/main" id="{20EB14A0-932E-D2B9-9ED9-B80E2859AB1C}"/>
+                <a16:creationId xmlns:a16="http://schemas.microsoft.com/office/drawing/2014/main" xmlns="" id="{20EB14A0-932E-D2B9-9ED9-B80E2859AB1C}"/>
               </a:ext>
             </a:extLst>
           </p:cNvPr>
@@ -2733,7 +2735,7 @@
           <p:cNvPr id="7" name="灯片编号占位符 6">
             <a:extLst>
               <a:ext uri="{FF2B5EF4-FFF2-40B4-BE49-F238E27FC236}">
-                <a16:creationId xmlns="" xmlns:a16="http://schemas.microsoft.com/office/drawing/2014/main" id="{BC421619-2C72-C208-D14C-AF0CB76DDF08}"/>
+                <a16:creationId xmlns:a16="http://schemas.microsoft.com/office/drawing/2014/main" xmlns="" id="{BC421619-2C72-C208-D14C-AF0CB76DDF08}"/>
               </a:ext>
             </a:extLst>
           </p:cNvPr>
@@ -2797,7 +2799,7 @@
           <p:cNvPr id="2" name="标题占位符 1">
             <a:extLst>
               <a:ext uri="{FF2B5EF4-FFF2-40B4-BE49-F238E27FC236}">
-                <a16:creationId xmlns="" xmlns:a16="http://schemas.microsoft.com/office/drawing/2014/main" id="{2FDE79DA-3549-F3A3-FCB4-F0D88BDB80FE}"/>
+                <a16:creationId xmlns:a16="http://schemas.microsoft.com/office/drawing/2014/main" xmlns="" id="{2FDE79DA-3549-F3A3-FCB4-F0D88BDB80FE}"/>
               </a:ext>
             </a:extLst>
           </p:cNvPr>
@@ -2836,7 +2838,7 @@
           <p:cNvPr id="3" name="文本占位符 2">
             <a:extLst>
               <a:ext uri="{FF2B5EF4-FFF2-40B4-BE49-F238E27FC236}">
-                <a16:creationId xmlns="" xmlns:a16="http://schemas.microsoft.com/office/drawing/2014/main" id="{738A3F15-CA53-DA31-8BB4-5AEC4A2B8105}"/>
+                <a16:creationId xmlns:a16="http://schemas.microsoft.com/office/drawing/2014/main" xmlns="" id="{738A3F15-CA53-DA31-8BB4-5AEC4A2B8105}"/>
               </a:ext>
             </a:extLst>
           </p:cNvPr>
@@ -2904,7 +2906,7 @@
           <p:cNvPr id="4" name="日期占位符 3">
             <a:extLst>
               <a:ext uri="{FF2B5EF4-FFF2-40B4-BE49-F238E27FC236}">
-                <a16:creationId xmlns="" xmlns:a16="http://schemas.microsoft.com/office/drawing/2014/main" id="{904A0621-10A1-9453-405A-725CA9DD73DA}"/>
+                <a16:creationId xmlns:a16="http://schemas.microsoft.com/office/drawing/2014/main" xmlns="" id="{904A0621-10A1-9453-405A-725CA9DD73DA}"/>
               </a:ext>
             </a:extLst>
           </p:cNvPr>
@@ -2951,7 +2953,7 @@
           <p:cNvPr id="5" name="页脚占位符 4">
             <a:extLst>
               <a:ext uri="{FF2B5EF4-FFF2-40B4-BE49-F238E27FC236}">
-                <a16:creationId xmlns="" xmlns:a16="http://schemas.microsoft.com/office/drawing/2014/main" id="{87C79395-795F-E2AE-BE57-7368ECF212C8}"/>
+                <a16:creationId xmlns:a16="http://schemas.microsoft.com/office/drawing/2014/main" xmlns="" id="{87C79395-795F-E2AE-BE57-7368ECF212C8}"/>
               </a:ext>
             </a:extLst>
           </p:cNvPr>
@@ -2994,7 +2996,7 @@
           <p:cNvPr id="6" name="灯片编号占位符 5">
             <a:extLst>
               <a:ext uri="{FF2B5EF4-FFF2-40B4-BE49-F238E27FC236}">
-                <a16:creationId xmlns="" xmlns:a16="http://schemas.microsoft.com/office/drawing/2014/main" id="{3430DED2-C8D2-D377-6F2B-ABAC2F7F5DF3}"/>
+                <a16:creationId xmlns:a16="http://schemas.microsoft.com/office/drawing/2014/main" xmlns="" id="{3430DED2-C8D2-D377-6F2B-ABAC2F7F5DF3}"/>
               </a:ext>
             </a:extLst>
           </p:cNvPr>
@@ -3362,7 +3364,7 @@
           <p:cNvPr id="2" name="标题 1">
             <a:extLst>
               <a:ext uri="{FF2B5EF4-FFF2-40B4-BE49-F238E27FC236}">
-                <a16:creationId xmlns="" xmlns:a16="http://schemas.microsoft.com/office/drawing/2014/main" id="{8F71CC32-FF3D-7C37-2552-16EA87FD3FCD}"/>
+                <a16:creationId xmlns:a16="http://schemas.microsoft.com/office/drawing/2014/main" xmlns="" id="{8F71CC32-FF3D-7C37-2552-16EA87FD3FCD}"/>
               </a:ext>
             </a:extLst>
           </p:cNvPr>
@@ -3391,7 +3393,7 @@
           <p:cNvPr id="3" name="副标题 2">
             <a:extLst>
               <a:ext uri="{FF2B5EF4-FFF2-40B4-BE49-F238E27FC236}">
-                <a16:creationId xmlns="" xmlns:a16="http://schemas.microsoft.com/office/drawing/2014/main" id="{0B796731-8234-25E1-8D71-3F1CC8A90185}"/>
+                <a16:creationId xmlns:a16="http://schemas.microsoft.com/office/drawing/2014/main" xmlns="" id="{0B796731-8234-25E1-8D71-3F1CC8A90185}"/>
               </a:ext>
             </a:extLst>
           </p:cNvPr>
@@ -3460,7 +3462,131 @@
           <p:cNvPr id="2" name="标题 1">
             <a:extLst>
               <a:ext uri="{FF2B5EF4-FFF2-40B4-BE49-F238E27FC236}">
-                <a16:creationId xmlns="" xmlns:a16="http://schemas.microsoft.com/office/drawing/2014/main" id="{887EC568-F726-48DA-C182-951B1E028ECC}"/>
+                <a16:creationId xmlns:a16="http://schemas.microsoft.com/office/drawing/2014/main" xmlns="" id="{C9127D9B-9414-77EC-0A68-29FD840F02E9}"/>
+              </a:ext>
+            </a:extLst>
+          </p:cNvPr>
+          <p:cNvSpPr>
+            <a:spLocks noGrp="1"/>
+          </p:cNvSpPr>
+          <p:nvPr>
+            <p:ph type="title"/>
+          </p:nvPr>
+        </p:nvSpPr>
+        <p:spPr/>
+        <p:txBody>
+          <a:bodyPr/>
+          <a:lstStyle/>
+          <a:p>
+            <a:r>
+              <a:rPr lang="en-US" dirty="0"/>
+              <a:t>Example – Weight a Gold</a:t>
+            </a:r>
+          </a:p>
+        </p:txBody>
+      </p:sp>
+      <p:sp>
+        <p:nvSpPr>
+          <p:cNvPr id="3" name="内容占位符 2">
+            <a:extLst>
+              <a:ext uri="{FF2B5EF4-FFF2-40B4-BE49-F238E27FC236}">
+                <a16:creationId xmlns:a16="http://schemas.microsoft.com/office/drawing/2014/main" xmlns="" id="{6682DEB9-1F3F-86E6-2C1D-4B28A6FA27E0}"/>
+              </a:ext>
+            </a:extLst>
+          </p:cNvPr>
+          <p:cNvSpPr>
+            <a:spLocks noGrp="1"/>
+          </p:cNvSpPr>
+          <p:nvPr>
+            <p:ph idx="1"/>
+          </p:nvPr>
+        </p:nvSpPr>
+        <p:spPr/>
+        <p:txBody>
+          <a:bodyPr/>
+          <a:lstStyle/>
+          <a:p>
+            <a:endParaRPr lang="en-US"/>
+          </a:p>
+        </p:txBody>
+      </p:sp>
+      <p:pic>
+        <p:nvPicPr>
+          <p:cNvPr id="3074" name="Picture 2" descr="Measurements vs. True value vs. Estimates"/>
+          <p:cNvPicPr>
+            <a:picLocks noChangeAspect="1" noChangeArrowheads="1"/>
+          </p:cNvPicPr>
+          <p:nvPr/>
+        </p:nvPicPr>
+        <p:blipFill>
+          <a:blip r:embed="rId2">
+            <a:extLst>
+              <a:ext uri="{28A0092B-C50C-407E-A947-70E740481C1C}">
+                <a14:useLocalDpi xmlns:a14="http://schemas.microsoft.com/office/drawing/2010/main" val="0"/>
+              </a:ext>
+            </a:extLst>
+          </a:blip>
+          <a:srcRect/>
+          <a:stretch>
+            <a:fillRect/>
+          </a:stretch>
+        </p:blipFill>
+        <p:spPr bwMode="auto">
+          <a:xfrm>
+            <a:off x="642795" y="1758269"/>
+            <a:ext cx="8845390" cy="4762903"/>
+          </a:xfrm>
+          <a:prstGeom prst="rect">
+            <a:avLst/>
+          </a:prstGeom>
+          <a:noFill/>
+          <a:extLst>
+            <a:ext uri="{909E8E84-426E-40DD-AFC4-6F175D3DCCD1}">
+              <a14:hiddenFill xmlns:a14="http://schemas.microsoft.com/office/drawing/2010/main">
+                <a:solidFill>
+                  <a:srgbClr val="FFFFFF"/>
+                </a:solidFill>
+              </a14:hiddenFill>
+            </a:ext>
+          </a:extLst>
+        </p:spPr>
+      </p:pic>
+    </p:spTree>
+    <p:extLst>
+      <p:ext uri="{BB962C8B-B14F-4D97-AF65-F5344CB8AC3E}">
+        <p14:creationId xmlns:p14="http://schemas.microsoft.com/office/powerpoint/2010/main" val="2141178421"/>
+      </p:ext>
+    </p:extLst>
+  </p:cSld>
+  <p:clrMapOvr>
+    <a:masterClrMapping/>
+  </p:clrMapOvr>
+</p:sld>
+</file>
+
+<file path=ppt/slides/slide11.xml><?xml version="1.0" encoding="utf-8"?>
+<p:sld xmlns:a="http://schemas.openxmlformats.org/drawingml/2006/main" xmlns:r="http://schemas.openxmlformats.org/officeDocument/2006/relationships" xmlns:p="http://schemas.openxmlformats.org/presentationml/2006/main">
+  <p:cSld>
+    <p:spTree>
+      <p:nvGrpSpPr>
+        <p:cNvPr id="1" name=""/>
+        <p:cNvGrpSpPr/>
+        <p:nvPr/>
+      </p:nvGrpSpPr>
+      <p:grpSpPr>
+        <a:xfrm>
+          <a:off x="0" y="0"/>
+          <a:ext cx="0" cy="0"/>
+          <a:chOff x="0" y="0"/>
+          <a:chExt cx="0" cy="0"/>
+        </a:xfrm>
+      </p:grpSpPr>
+      <p:sp>
+        <p:nvSpPr>
+          <p:cNvPr id="2" name="标题 1">
+            <a:extLst>
+              <a:ext uri="{FF2B5EF4-FFF2-40B4-BE49-F238E27FC236}">
+                <a16:creationId xmlns:a16="http://schemas.microsoft.com/office/drawing/2014/main" xmlns="" id="{887EC568-F726-48DA-C182-951B1E028ECC}"/>
               </a:ext>
             </a:extLst>
           </p:cNvPr>
@@ -3488,7 +3614,7 @@
           <p:cNvPr id="3" name="内容占位符 2">
             <a:extLst>
               <a:ext uri="{FF2B5EF4-FFF2-40B4-BE49-F238E27FC236}">
-                <a16:creationId xmlns="" xmlns:a16="http://schemas.microsoft.com/office/drawing/2014/main" id="{B2FE7A0C-1F7E-AAD3-040B-A76C36D5CAD8}"/>
+                <a16:creationId xmlns:a16="http://schemas.microsoft.com/office/drawing/2014/main" xmlns="" id="{B2FE7A0C-1F7E-AAD3-040B-A76C36D5CAD8}"/>
               </a:ext>
             </a:extLst>
           </p:cNvPr>
@@ -3513,7 +3639,7 @@
           <p:cNvPr id="2050" name="Picture 2" descr="Alt text">
             <a:extLst>
               <a:ext uri="{FF2B5EF4-FFF2-40B4-BE49-F238E27FC236}">
-                <a16:creationId xmlns="" xmlns:a16="http://schemas.microsoft.com/office/drawing/2014/main" id="{7CC6E176-6B19-029A-688A-F02FEBA64EBE}"/>
+                <a16:creationId xmlns:a16="http://schemas.microsoft.com/office/drawing/2014/main" xmlns="" id="{7CC6E176-6B19-029A-688A-F02FEBA64EBE}"/>
               </a:ext>
             </a:extLst>
           </p:cNvPr>
@@ -3568,7 +3694,7 @@
 </p:sld>
 </file>
 
-<file path=ppt/slides/slide11.xml><?xml version="1.0" encoding="utf-8"?>
+<file path=ppt/slides/slide12.xml><?xml version="1.0" encoding="utf-8"?>
 <p:sld xmlns:a="http://schemas.openxmlformats.org/drawingml/2006/main" xmlns:r="http://schemas.openxmlformats.org/officeDocument/2006/relationships" xmlns:p="http://schemas.openxmlformats.org/presentationml/2006/main">
   <p:cSld>
     <p:spTree>
@@ -3590,7 +3716,7 @@
           <p:cNvPr id="2" name="标题 1">
             <a:extLst>
               <a:ext uri="{FF2B5EF4-FFF2-40B4-BE49-F238E27FC236}">
-                <a16:creationId xmlns="" xmlns:a16="http://schemas.microsoft.com/office/drawing/2014/main" id="{887EC568-F726-48DA-C182-951B1E028ECC}"/>
+                <a16:creationId xmlns:a16="http://schemas.microsoft.com/office/drawing/2014/main" xmlns="" id="{887EC568-F726-48DA-C182-951B1E028ECC}"/>
               </a:ext>
             </a:extLst>
           </p:cNvPr>
@@ -3618,7 +3744,7 @@
           <p:cNvPr id="2050" name="Picture 2" descr="Alt text">
             <a:extLst>
               <a:ext uri="{FF2B5EF4-FFF2-40B4-BE49-F238E27FC236}">
-                <a16:creationId xmlns="" xmlns:a16="http://schemas.microsoft.com/office/drawing/2014/main" id="{7CC6E176-6B19-029A-688A-F02FEBA64EBE}"/>
+                <a16:creationId xmlns:a16="http://schemas.microsoft.com/office/drawing/2014/main" xmlns="" id="{7CC6E176-6B19-029A-688A-F02FEBA64EBE}"/>
               </a:ext>
             </a:extLst>
           </p:cNvPr>
@@ -3665,7 +3791,7 @@
           <p:cNvPr id="5" name="图片 4">
             <a:extLst>
               <a:ext uri="{FF2B5EF4-FFF2-40B4-BE49-F238E27FC236}">
-                <a16:creationId xmlns="" xmlns:a16="http://schemas.microsoft.com/office/drawing/2014/main" id="{22401DF9-F90B-54F6-285B-57CB4DE59A81}"/>
+                <a16:creationId xmlns:a16="http://schemas.microsoft.com/office/drawing/2014/main" xmlns="" id="{22401DF9-F90B-54F6-285B-57CB4DE59A81}"/>
               </a:ext>
             </a:extLst>
           </p:cNvPr>
@@ -3703,7 +3829,7 @@
 </p:sld>
 </file>
 
-<file path=ppt/slides/slide12.xml><?xml version="1.0" encoding="utf-8"?>
+<file path=ppt/slides/slide13.xml><?xml version="1.0" encoding="utf-8"?>
 <p:sld xmlns:a="http://schemas.openxmlformats.org/drawingml/2006/main" xmlns:r="http://schemas.openxmlformats.org/officeDocument/2006/relationships" xmlns:p="http://schemas.openxmlformats.org/presentationml/2006/main">
   <p:cSld>
     <p:spTree>
@@ -3725,7 +3851,7 @@
           <p:cNvPr id="2" name="标题 1">
             <a:extLst>
               <a:ext uri="{FF2B5EF4-FFF2-40B4-BE49-F238E27FC236}">
-                <a16:creationId xmlns="" xmlns:a16="http://schemas.microsoft.com/office/drawing/2014/main" id="{887EC568-F726-48DA-C182-951B1E028ECC}"/>
+                <a16:creationId xmlns:a16="http://schemas.microsoft.com/office/drawing/2014/main" xmlns="" id="{887EC568-F726-48DA-C182-951B1E028ECC}"/>
               </a:ext>
             </a:extLst>
           </p:cNvPr>
@@ -3753,7 +3879,7 @@
           <p:cNvPr id="5" name="图片 4">
             <a:extLst>
               <a:ext uri="{FF2B5EF4-FFF2-40B4-BE49-F238E27FC236}">
-                <a16:creationId xmlns="" xmlns:a16="http://schemas.microsoft.com/office/drawing/2014/main" id="{22401DF9-F90B-54F6-285B-57CB4DE59A81}"/>
+                <a16:creationId xmlns:a16="http://schemas.microsoft.com/office/drawing/2014/main" xmlns="" id="{22401DF9-F90B-54F6-285B-57CB4DE59A81}"/>
               </a:ext>
             </a:extLst>
           </p:cNvPr>
@@ -3783,7 +3909,7 @@
           <p:cNvPr id="6" name="图片 5">
             <a:extLst>
               <a:ext uri="{FF2B5EF4-FFF2-40B4-BE49-F238E27FC236}">
-                <a16:creationId xmlns="" xmlns:a16="http://schemas.microsoft.com/office/drawing/2014/main" id="{262AF52F-D744-C56B-DD2F-5A039117BDE3}"/>
+                <a16:creationId xmlns:a16="http://schemas.microsoft.com/office/drawing/2014/main" xmlns="" id="{262AF52F-D744-C56B-DD2F-5A039117BDE3}"/>
               </a:ext>
             </a:extLst>
           </p:cNvPr>
@@ -3813,7 +3939,7 @@
           <p:cNvPr id="7" name="箭头: 下 6">
             <a:extLst>
               <a:ext uri="{FF2B5EF4-FFF2-40B4-BE49-F238E27FC236}">
-                <a16:creationId xmlns="" xmlns:a16="http://schemas.microsoft.com/office/drawing/2014/main" id="{BEE142A4-1CD6-D216-26AA-C6D105709863}"/>
+                <a16:creationId xmlns:a16="http://schemas.microsoft.com/office/drawing/2014/main" xmlns="" id="{BEE142A4-1CD6-D216-26AA-C6D105709863}"/>
               </a:ext>
             </a:extLst>
           </p:cNvPr>
@@ -3859,7 +3985,7 @@
           <p:cNvPr id="9" name="图片 8">
             <a:extLst>
               <a:ext uri="{FF2B5EF4-FFF2-40B4-BE49-F238E27FC236}">
-                <a16:creationId xmlns="" xmlns:a16="http://schemas.microsoft.com/office/drawing/2014/main" id="{AB6309C6-4438-FD9C-0E40-43FEADE06FB4}"/>
+                <a16:creationId xmlns:a16="http://schemas.microsoft.com/office/drawing/2014/main" xmlns="" id="{AB6309C6-4438-FD9C-0E40-43FEADE06FB4}"/>
               </a:ext>
             </a:extLst>
           </p:cNvPr>
@@ -3889,7 +4015,7 @@
           <p:cNvPr id="10" name="箭头: 下 9">
             <a:extLst>
               <a:ext uri="{FF2B5EF4-FFF2-40B4-BE49-F238E27FC236}">
-                <a16:creationId xmlns="" xmlns:a16="http://schemas.microsoft.com/office/drawing/2014/main" id="{8B1E5912-7870-3A7A-285C-7F220C8E8269}"/>
+                <a16:creationId xmlns:a16="http://schemas.microsoft.com/office/drawing/2014/main" xmlns="" id="{8B1E5912-7870-3A7A-285C-7F220C8E8269}"/>
               </a:ext>
             </a:extLst>
           </p:cNvPr>
@@ -3943,7 +4069,7 @@
 </p:sld>
 </file>
 
-<file path=ppt/slides/slide13.xml><?xml version="1.0" encoding="utf-8"?>
+<file path=ppt/slides/slide14.xml><?xml version="1.0" encoding="utf-8"?>
 <p:sld xmlns:a="http://schemas.openxmlformats.org/drawingml/2006/main" xmlns:r="http://schemas.openxmlformats.org/officeDocument/2006/relationships" xmlns:p="http://schemas.openxmlformats.org/presentationml/2006/main">
   <p:cSld>
     <p:spTree>
@@ -4155,7 +4281,7 @@
 </p:sld>
 </file>
 
-<file path=ppt/slides/slide14.xml><?xml version="1.0" encoding="utf-8"?>
+<file path=ppt/slides/slide15.xml><?xml version="1.0" encoding="utf-8"?>
 <p:sld xmlns:a="http://schemas.openxmlformats.org/drawingml/2006/main" xmlns:r="http://schemas.openxmlformats.org/officeDocument/2006/relationships" xmlns:p="http://schemas.openxmlformats.org/presentationml/2006/main">
   <p:cSld>
     <p:spTree>
@@ -4300,143 +4426,6 @@
 </p:sld>
 </file>
 
-<file path=ppt/slides/slide15.xml><?xml version="1.0" encoding="utf-8"?>
-<p:sld xmlns:a="http://schemas.openxmlformats.org/drawingml/2006/main" xmlns:r="http://schemas.openxmlformats.org/officeDocument/2006/relationships" xmlns:p="http://schemas.openxmlformats.org/presentationml/2006/main">
-  <p:cSld>
-    <p:spTree>
-      <p:nvGrpSpPr>
-        <p:cNvPr id="1" name=""/>
-        <p:cNvGrpSpPr/>
-        <p:nvPr/>
-      </p:nvGrpSpPr>
-      <p:grpSpPr>
-        <a:xfrm>
-          <a:off x="0" y="0"/>
-          <a:ext cx="0" cy="0"/>
-          <a:chOff x="0" y="0"/>
-          <a:chExt cx="0" cy="0"/>
-        </a:xfrm>
-      </p:grpSpPr>
-      <p:sp>
-        <p:nvSpPr>
-          <p:cNvPr id="2" name="标题 1">
-            <a:extLst>
-              <a:ext uri="{FF2B5EF4-FFF2-40B4-BE49-F238E27FC236}">
-                <a16:creationId xmlns="" xmlns:a16="http://schemas.microsoft.com/office/drawing/2014/main" id="{38FB9F3A-0389-1798-E65F-493B28D68275}"/>
-              </a:ext>
-            </a:extLst>
-          </p:cNvPr>
-          <p:cNvSpPr>
-            <a:spLocks noGrp="1"/>
-          </p:cNvSpPr>
-          <p:nvPr>
-            <p:ph type="title"/>
-          </p:nvPr>
-        </p:nvSpPr>
-        <p:spPr/>
-        <p:txBody>
-          <a:bodyPr/>
-          <a:lstStyle/>
-          <a:p>
-            <a:r>
-              <a:rPr lang="en-US" dirty="0"/>
-              <a:t>Conclusion</a:t>
-            </a:r>
-          </a:p>
-        </p:txBody>
-      </p:sp>
-      <p:sp>
-        <p:nvSpPr>
-          <p:cNvPr id="3" name="内容占位符 2">
-            <a:extLst>
-              <a:ext uri="{FF2B5EF4-FFF2-40B4-BE49-F238E27FC236}">
-                <a16:creationId xmlns="" xmlns:a16="http://schemas.microsoft.com/office/drawing/2014/main" id="{17A5B292-3C99-3224-014C-93DC00A3D5E4}"/>
-              </a:ext>
-            </a:extLst>
-          </p:cNvPr>
-          <p:cNvSpPr>
-            <a:spLocks noGrp="1"/>
-          </p:cNvSpPr>
-          <p:nvPr>
-            <p:ph idx="1"/>
-          </p:nvPr>
-        </p:nvSpPr>
-        <p:spPr/>
-        <p:txBody>
-          <a:bodyPr>
-            <a:normAutofit/>
-          </a:bodyPr>
-          <a:lstStyle/>
-          <a:p>
-            <a:pPr marL="0" indent="0" algn="just">
-              <a:buNone/>
-            </a:pPr>
-            <a:r>
-              <a:rPr lang="en-US" sz="3200" b="1" dirty="0"/>
-              <a:t>Kalman filtering is an idea, and the specific implementation depends on the specific state of the problem that needs to be described.</a:t>
-            </a:r>
-          </a:p>
-          <a:p>
-            <a:pPr marL="0" indent="0" algn="just">
-              <a:buNone/>
-            </a:pPr>
-            <a:endParaRPr lang="en-US" sz="3200" b="1" dirty="0"/>
-          </a:p>
-          <a:p>
-            <a:pPr marL="0" indent="0" algn="just">
-              <a:buNone/>
-            </a:pPr>
-            <a:endParaRPr lang="en-US" sz="3200" b="1" dirty="0"/>
-          </a:p>
-          <a:p>
-            <a:pPr marL="0" indent="0" algn="just">
-              <a:buNone/>
-            </a:pPr>
-            <a:endParaRPr lang="en-US" sz="3200" b="1" dirty="0"/>
-          </a:p>
-          <a:p>
-            <a:pPr marL="0" indent="0" algn="just">
-              <a:buNone/>
-            </a:pPr>
-            <a:endParaRPr lang="en-US" sz="3200" b="1" dirty="0"/>
-          </a:p>
-          <a:p>
-            <a:pPr marL="0" indent="0" algn="just">
-              <a:buNone/>
-            </a:pPr>
-            <a:r>
-              <a:rPr lang="en-US" sz="1400" b="1" dirty="0"/>
-              <a:t>All the content could view on my blog: </a:t>
-            </a:r>
-            <a:r>
-              <a:rPr lang="en-US" sz="1400" b="1" dirty="0">
-                <a:hlinkClick r:id="rId2"/>
-              </a:rPr>
-              <a:t>https://jet-w.github.io/unisa/2023SP5/AdvancedAnalyticTechniques1/project.html</a:t>
-            </a:r>
-            <a:endParaRPr lang="en-US" sz="1400" b="1" dirty="0"/>
-          </a:p>
-          <a:p>
-            <a:pPr marL="0" indent="0" algn="just">
-              <a:buNone/>
-            </a:pPr>
-            <a:endParaRPr lang="en-US" sz="3200" b="1" dirty="0"/>
-          </a:p>
-        </p:txBody>
-      </p:sp>
-    </p:spTree>
-    <p:extLst>
-      <p:ext uri="{BB962C8B-B14F-4D97-AF65-F5344CB8AC3E}">
-        <p14:creationId xmlns:p14="http://schemas.microsoft.com/office/powerpoint/2010/main" val="3234989703"/>
-      </p:ext>
-    </p:extLst>
-  </p:cSld>
-  <p:clrMapOvr>
-    <a:masterClrMapping/>
-  </p:clrMapOvr>
-</p:sld>
-</file>
-
 <file path=ppt/slides/slide16.xml><?xml version="1.0" encoding="utf-8"?>
 <p:sld xmlns:a="http://schemas.openxmlformats.org/drawingml/2006/main" xmlns:r="http://schemas.openxmlformats.org/officeDocument/2006/relationships" xmlns:p="http://schemas.openxmlformats.org/presentationml/2006/main">
   <p:cSld>
@@ -4456,10 +4445,219 @@
       </p:grpSpPr>
       <p:sp>
         <p:nvSpPr>
+          <p:cNvPr id="2" name="标题 1"/>
+          <p:cNvSpPr>
+            <a:spLocks noGrp="1"/>
+          </p:cNvSpPr>
+          <p:nvPr>
+            <p:ph type="title"/>
+          </p:nvPr>
+        </p:nvSpPr>
+        <p:spPr/>
+        <p:txBody>
+          <a:bodyPr/>
+          <a:lstStyle/>
+          <a:p>
+            <a:r>
+              <a:rPr lang="en-US" altLang="zh-CN" dirty="0" smtClean="0"/>
+              <a:t>The limitation</a:t>
+            </a:r>
+            <a:endParaRPr lang="zh-CN" altLang="en-US" dirty="0"/>
+          </a:p>
+        </p:txBody>
+      </p:sp>
+      <p:sp>
+        <p:nvSpPr>
+          <p:cNvPr id="3" name="内容占位符 2"/>
+          <p:cNvSpPr>
+            <a:spLocks noGrp="1"/>
+          </p:cNvSpPr>
+          <p:nvPr>
+            <p:ph idx="1"/>
+          </p:nvPr>
+        </p:nvSpPr>
+        <p:spPr/>
+        <p:txBody>
+          <a:bodyPr/>
+          <a:lstStyle/>
+          <a:p>
+            <a:endParaRPr lang="zh-CN" altLang="en-US" dirty="0"/>
+          </a:p>
+        </p:txBody>
+      </p:sp>
+    </p:spTree>
+    <p:extLst>
+      <p:ext uri="{BB962C8B-B14F-4D97-AF65-F5344CB8AC3E}">
+        <p14:creationId xmlns:p14="http://schemas.microsoft.com/office/powerpoint/2010/main" val="1929896867"/>
+      </p:ext>
+    </p:extLst>
+  </p:cSld>
+  <p:clrMapOvr>
+    <a:masterClrMapping/>
+  </p:clrMapOvr>
+</p:sld>
+</file>
+
+<file path=ppt/slides/slide17.xml><?xml version="1.0" encoding="utf-8"?>
+<p:sld xmlns:a="http://schemas.openxmlformats.org/drawingml/2006/main" xmlns:r="http://schemas.openxmlformats.org/officeDocument/2006/relationships" xmlns:p="http://schemas.openxmlformats.org/presentationml/2006/main">
+  <p:cSld>
+    <p:spTree>
+      <p:nvGrpSpPr>
+        <p:cNvPr id="1" name=""/>
+        <p:cNvGrpSpPr/>
+        <p:nvPr/>
+      </p:nvGrpSpPr>
+      <p:grpSpPr>
+        <a:xfrm>
+          <a:off x="0" y="0"/>
+          <a:ext cx="0" cy="0"/>
+          <a:chOff x="0" y="0"/>
+          <a:chExt cx="0" cy="0"/>
+        </a:xfrm>
+      </p:grpSpPr>
+      <p:sp>
+        <p:nvSpPr>
           <p:cNvPr id="2" name="标题 1">
             <a:extLst>
               <a:ext uri="{FF2B5EF4-FFF2-40B4-BE49-F238E27FC236}">
-                <a16:creationId xmlns="" xmlns:a16="http://schemas.microsoft.com/office/drawing/2014/main" id="{BFED13D0-1777-7362-78DA-C791BAE10491}"/>
+                <a16:creationId xmlns:a16="http://schemas.microsoft.com/office/drawing/2014/main" xmlns="" id="{38FB9F3A-0389-1798-E65F-493B28D68275}"/>
+              </a:ext>
+            </a:extLst>
+          </p:cNvPr>
+          <p:cNvSpPr>
+            <a:spLocks noGrp="1"/>
+          </p:cNvSpPr>
+          <p:nvPr>
+            <p:ph type="title"/>
+          </p:nvPr>
+        </p:nvSpPr>
+        <p:spPr/>
+        <p:txBody>
+          <a:bodyPr/>
+          <a:lstStyle/>
+          <a:p>
+            <a:r>
+              <a:rPr lang="en-US" dirty="0"/>
+              <a:t>Conclusion</a:t>
+            </a:r>
+          </a:p>
+        </p:txBody>
+      </p:sp>
+      <p:sp>
+        <p:nvSpPr>
+          <p:cNvPr id="3" name="内容占位符 2">
+            <a:extLst>
+              <a:ext uri="{FF2B5EF4-FFF2-40B4-BE49-F238E27FC236}">
+                <a16:creationId xmlns:a16="http://schemas.microsoft.com/office/drawing/2014/main" xmlns="" id="{17A5B292-3C99-3224-014C-93DC00A3D5E4}"/>
+              </a:ext>
+            </a:extLst>
+          </p:cNvPr>
+          <p:cNvSpPr>
+            <a:spLocks noGrp="1"/>
+          </p:cNvSpPr>
+          <p:nvPr>
+            <p:ph idx="1"/>
+          </p:nvPr>
+        </p:nvSpPr>
+        <p:spPr/>
+        <p:txBody>
+          <a:bodyPr>
+            <a:normAutofit/>
+          </a:bodyPr>
+          <a:lstStyle/>
+          <a:p>
+            <a:pPr marL="0" indent="0" algn="just">
+              <a:buNone/>
+            </a:pPr>
+            <a:r>
+              <a:rPr lang="en-US" sz="3200" b="1" dirty="0"/>
+              <a:t>Kalman filtering is an idea, and the specific implementation depends on the specific state of the problem that needs to be described.</a:t>
+            </a:r>
+          </a:p>
+          <a:p>
+            <a:pPr marL="0" indent="0" algn="just">
+              <a:buNone/>
+            </a:pPr>
+            <a:endParaRPr lang="en-US" sz="3200" b="1" dirty="0"/>
+          </a:p>
+          <a:p>
+            <a:pPr marL="0" indent="0" algn="just">
+              <a:buNone/>
+            </a:pPr>
+            <a:endParaRPr lang="en-US" sz="3200" b="1" dirty="0"/>
+          </a:p>
+          <a:p>
+            <a:pPr marL="0" indent="0" algn="just">
+              <a:buNone/>
+            </a:pPr>
+            <a:endParaRPr lang="en-US" sz="3200" b="1" dirty="0"/>
+          </a:p>
+          <a:p>
+            <a:pPr marL="0" indent="0" algn="just">
+              <a:buNone/>
+            </a:pPr>
+            <a:endParaRPr lang="en-US" sz="3200" b="1" dirty="0"/>
+          </a:p>
+          <a:p>
+            <a:pPr marL="0" indent="0" algn="just">
+              <a:buNone/>
+            </a:pPr>
+            <a:r>
+              <a:rPr lang="en-US" sz="1400" b="1" dirty="0"/>
+              <a:t>All the content could view on my blog: </a:t>
+            </a:r>
+            <a:r>
+              <a:rPr lang="en-US" sz="1400" b="1" dirty="0">
+                <a:hlinkClick r:id="rId2"/>
+              </a:rPr>
+              <a:t>https://jet-w.github.io/unisa/2023SP5/AdvancedAnalyticTechniques1/project.html</a:t>
+            </a:r>
+            <a:endParaRPr lang="en-US" sz="1400" b="1" dirty="0"/>
+          </a:p>
+          <a:p>
+            <a:pPr marL="0" indent="0" algn="just">
+              <a:buNone/>
+            </a:pPr>
+            <a:endParaRPr lang="en-US" sz="3200" b="1" dirty="0"/>
+          </a:p>
+        </p:txBody>
+      </p:sp>
+    </p:spTree>
+    <p:extLst>
+      <p:ext uri="{BB962C8B-B14F-4D97-AF65-F5344CB8AC3E}">
+        <p14:creationId xmlns:p14="http://schemas.microsoft.com/office/powerpoint/2010/main" val="3234989703"/>
+      </p:ext>
+    </p:extLst>
+  </p:cSld>
+  <p:clrMapOvr>
+    <a:masterClrMapping/>
+  </p:clrMapOvr>
+</p:sld>
+</file>
+
+<file path=ppt/slides/slide18.xml><?xml version="1.0" encoding="utf-8"?>
+<p:sld xmlns:a="http://schemas.openxmlformats.org/drawingml/2006/main" xmlns:r="http://schemas.openxmlformats.org/officeDocument/2006/relationships" xmlns:p="http://schemas.openxmlformats.org/presentationml/2006/main">
+  <p:cSld>
+    <p:spTree>
+      <p:nvGrpSpPr>
+        <p:cNvPr id="1" name=""/>
+        <p:cNvGrpSpPr/>
+        <p:nvPr/>
+      </p:nvGrpSpPr>
+      <p:grpSpPr>
+        <a:xfrm>
+          <a:off x="0" y="0"/>
+          <a:ext cx="0" cy="0"/>
+          <a:chOff x="0" y="0"/>
+          <a:chExt cx="0" cy="0"/>
+        </a:xfrm>
+      </p:grpSpPr>
+      <p:sp>
+        <p:nvSpPr>
+          <p:cNvPr id="2" name="标题 1">
+            <a:extLst>
+              <a:ext uri="{FF2B5EF4-FFF2-40B4-BE49-F238E27FC236}">
+                <a16:creationId xmlns:a16="http://schemas.microsoft.com/office/drawing/2014/main" xmlns="" id="{BFED13D0-1777-7362-78DA-C791BAE10491}"/>
               </a:ext>
             </a:extLst>
           </p:cNvPr>
@@ -4487,7 +4685,7 @@
           <p:cNvPr id="3" name="内容占位符 2">
             <a:extLst>
               <a:ext uri="{FF2B5EF4-FFF2-40B4-BE49-F238E27FC236}">
-                <a16:creationId xmlns="" xmlns:a16="http://schemas.microsoft.com/office/drawing/2014/main" id="{780350DE-192C-DC5E-C6D5-B1C97C4347AB}"/>
+                <a16:creationId xmlns:a16="http://schemas.microsoft.com/office/drawing/2014/main" xmlns="" id="{780350DE-192C-DC5E-C6D5-B1C97C4347AB}"/>
               </a:ext>
             </a:extLst>
           </p:cNvPr>
@@ -4617,7 +4815,7 @@
           <p:cNvPr id="2" name="标题 1">
             <a:extLst>
               <a:ext uri="{FF2B5EF4-FFF2-40B4-BE49-F238E27FC236}">
-                <a16:creationId xmlns="" xmlns:a16="http://schemas.microsoft.com/office/drawing/2014/main" id="{D86D4608-98F4-4324-A054-81A0D333A46B}"/>
+                <a16:creationId xmlns:a16="http://schemas.microsoft.com/office/drawing/2014/main" xmlns="" id="{D86D4608-98F4-4324-A054-81A0D333A46B}"/>
               </a:ext>
             </a:extLst>
           </p:cNvPr>
@@ -4645,7 +4843,7 @@
           <p:cNvPr id="3" name="内容占位符 2">
             <a:extLst>
               <a:ext uri="{FF2B5EF4-FFF2-40B4-BE49-F238E27FC236}">
-                <a16:creationId xmlns="" xmlns:a16="http://schemas.microsoft.com/office/drawing/2014/main" id="{BD98E641-3408-FBD2-97F5-5CD1CF1DB7BF}"/>
+                <a16:creationId xmlns:a16="http://schemas.microsoft.com/office/drawing/2014/main" xmlns="" id="{BD98E641-3408-FBD2-97F5-5CD1CF1DB7BF}"/>
               </a:ext>
             </a:extLst>
           </p:cNvPr>
@@ -4663,8 +4861,31 @@
           <a:p>
             <a:r>
               <a:rPr lang="en-US" dirty="0"/>
-              <a:t>1. What is Kalman Filter</a:t>
-            </a:r>
+              <a:t>1. What is </a:t>
+            </a:r>
+            <a:r>
+              <a:rPr lang="en-US" dirty="0" err="1"/>
+              <a:t>Kalman</a:t>
+            </a:r>
+            <a:r>
+              <a:rPr lang="en-US" dirty="0"/>
+              <a:t> </a:t>
+            </a:r>
+            <a:r>
+              <a:rPr lang="en-US" dirty="0" smtClean="0"/>
+              <a:t>Filter</a:t>
+            </a:r>
+          </a:p>
+          <a:p>
+            <a:r>
+              <a:rPr lang="en-US" dirty="0" smtClean="0"/>
+              <a:t>2. </a:t>
+            </a:r>
+            <a:r>
+              <a:rPr lang="en-US" altLang="zh-CN" dirty="0" smtClean="0"/>
+              <a:t>The meaning of details</a:t>
+            </a:r>
+            <a:endParaRPr lang="en-US" dirty="0"/>
           </a:p>
           <a:p>
             <a:r>
@@ -4673,7 +4894,11 @@
             </a:r>
             <a:r>
               <a:rPr lang="en-US" dirty="0" smtClean="0"/>
-              <a:t>Domain using </a:t>
+              <a:t>Domains </a:t>
+            </a:r>
+            <a:r>
+              <a:rPr lang="en-US" dirty="0" smtClean="0"/>
+              <a:t>using </a:t>
             </a:r>
             <a:r>
               <a:rPr lang="en-US" dirty="0" err="1" smtClean="0"/>
@@ -4739,7 +4964,7 @@
           <p:cNvPr id="2" name="标题 1">
             <a:extLst>
               <a:ext uri="{FF2B5EF4-FFF2-40B4-BE49-F238E27FC236}">
-                <a16:creationId xmlns="" xmlns:a16="http://schemas.microsoft.com/office/drawing/2014/main" id="{93244E1B-52FB-177A-9CDA-F863A850CFAD}"/>
+                <a16:creationId xmlns:a16="http://schemas.microsoft.com/office/drawing/2014/main" xmlns="" id="{93244E1B-52FB-177A-9CDA-F863A850CFAD}"/>
               </a:ext>
             </a:extLst>
           </p:cNvPr>
@@ -4767,7 +4992,7 @@
           <p:cNvPr id="3" name="内容占位符 2">
             <a:extLst>
               <a:ext uri="{FF2B5EF4-FFF2-40B4-BE49-F238E27FC236}">
-                <a16:creationId xmlns="" xmlns:a16="http://schemas.microsoft.com/office/drawing/2014/main" id="{C02280F2-920F-6859-5BAA-056F0273CCB7}"/>
+                <a16:creationId xmlns:a16="http://schemas.microsoft.com/office/drawing/2014/main" xmlns="" id="{C02280F2-920F-6859-5BAA-056F0273CCB7}"/>
               </a:ext>
             </a:extLst>
           </p:cNvPr>
@@ -4829,7 +5054,19 @@
                   <a:srgbClr val="FF0000"/>
                 </a:solidFill>
               </a:rPr>
-              <a:t>noisy or uncertain data</a:t>
+              <a:t>noisy </a:t>
+            </a:r>
+            <a:r>
+              <a:rPr lang="en-US" dirty="0"/>
+              <a:t>or</a:t>
+            </a:r>
+            <a:r>
+              <a:rPr lang="en-US" dirty="0">
+                <a:solidFill>
+                  <a:srgbClr val="FF0000"/>
+                </a:solidFill>
+              </a:rPr>
+              <a:t> uncertain data</a:t>
             </a:r>
             <a:r>
               <a:rPr lang="en-US" dirty="0"/>
@@ -4866,7 +5103,7 @@
           <p:cNvPr id="5" name="图片 4">
             <a:extLst>
               <a:ext uri="{FF2B5EF4-FFF2-40B4-BE49-F238E27FC236}">
-                <a16:creationId xmlns="" xmlns:a16="http://schemas.microsoft.com/office/drawing/2014/main" id="{937C80C1-6061-F42A-9C66-2CCDD6EE339F}"/>
+                <a16:creationId xmlns:a16="http://schemas.microsoft.com/office/drawing/2014/main" xmlns="" id="{937C80C1-6061-F42A-9C66-2CCDD6EE339F}"/>
               </a:ext>
             </a:extLst>
           </p:cNvPr>
@@ -4896,7 +5133,7 @@
           <p:cNvPr id="9" name="图片 8">
             <a:extLst>
               <a:ext uri="{FF2B5EF4-FFF2-40B4-BE49-F238E27FC236}">
-                <a16:creationId xmlns="" xmlns:a16="http://schemas.microsoft.com/office/drawing/2014/main" id="{AD15792A-F729-C892-5BE4-1D6A6334C154}"/>
+                <a16:creationId xmlns:a16="http://schemas.microsoft.com/office/drawing/2014/main" xmlns="" id="{AD15792A-F729-C892-5BE4-1D6A6334C154}"/>
               </a:ext>
             </a:extLst>
           </p:cNvPr>
@@ -4956,7 +5193,7 @@
           <p:cNvPr id="2" name="标题 1">
             <a:extLst>
               <a:ext uri="{FF2B5EF4-FFF2-40B4-BE49-F238E27FC236}">
-                <a16:creationId xmlns="" xmlns:a16="http://schemas.microsoft.com/office/drawing/2014/main" id="{3FD0EBE6-ED64-004B-A7AE-A52C9E0CB054}"/>
+                <a16:creationId xmlns:a16="http://schemas.microsoft.com/office/drawing/2014/main" xmlns="" id="{93244E1B-52FB-177A-9CDA-F863A850CFAD}"/>
               </a:ext>
             </a:extLst>
           </p:cNvPr>
@@ -4973,137 +5210,152 @@
           <a:lstStyle/>
           <a:p>
             <a:r>
+              <a:rPr lang="en-US" altLang="zh-CN" dirty="0"/>
+              <a:t>The meaning of </a:t>
+            </a:r>
+            <a:r>
+              <a:rPr lang="en-US" altLang="zh-CN" dirty="0" smtClean="0"/>
+              <a:t>details</a:t>
+            </a:r>
+            <a:endParaRPr lang="en-US" dirty="0"/>
+          </a:p>
+        </p:txBody>
+      </p:sp>
+      <p:sp>
+        <p:nvSpPr>
+          <p:cNvPr id="3" name="内容占位符 2">
+            <a:extLst>
+              <a:ext uri="{FF2B5EF4-FFF2-40B4-BE49-F238E27FC236}">
+                <a16:creationId xmlns:a16="http://schemas.microsoft.com/office/drawing/2014/main" xmlns="" id="{C02280F2-920F-6859-5BAA-056F0273CCB7}"/>
+              </a:ext>
+            </a:extLst>
+          </p:cNvPr>
+          <p:cNvSpPr>
+            <a:spLocks noGrp="1"/>
+          </p:cNvSpPr>
+          <p:nvPr>
+            <p:ph idx="1"/>
+          </p:nvPr>
+        </p:nvSpPr>
+        <p:spPr/>
+        <p:txBody>
+          <a:bodyPr>
+            <a:normAutofit/>
+          </a:bodyPr>
+          <a:lstStyle/>
+          <a:p>
+            <a:r>
+              <a:rPr lang="en-US" altLang="zh-CN" dirty="0" smtClean="0"/>
+              <a:t>Getting </a:t>
+            </a:r>
+            <a:r>
+              <a:rPr lang="en-US" altLang="zh-CN" dirty="0"/>
+              <a:t>a best estimation of state using multi iteration to approach real value</a:t>
+            </a:r>
+            <a:r>
+              <a:rPr lang="en-US" altLang="zh-CN" dirty="0" smtClean="0"/>
+              <a:t>.</a:t>
+            </a:r>
+          </a:p>
+          <a:p>
+            <a:endParaRPr lang="en-US" dirty="0"/>
+          </a:p>
+          <a:p>
+            <a:pPr marL="0" indent="0">
+              <a:buNone/>
+            </a:pPr>
+            <a:r>
+              <a:rPr lang="en-US" dirty="0" smtClean="0"/>
+              <a:t>How to do? All </a:t>
+            </a:r>
+            <a:r>
               <a:rPr lang="en-US" dirty="0"/>
-              <a:t>The </a:t>
-            </a:r>
-            <a:r>
-              <a:rPr lang="en-US" dirty="0" smtClean="0"/>
-              <a:t>Domain Usage </a:t>
-            </a:r>
-            <a:r>
-              <a:rPr lang="en-US" dirty="0"/>
-              <a:t>of Kalman Filter</a:t>
-            </a:r>
-          </a:p>
-        </p:txBody>
-      </p:sp>
-      <p:sp>
-        <p:nvSpPr>
-          <p:cNvPr id="3" name="内容占位符 2">
-            <a:extLst>
-              <a:ext uri="{FF2B5EF4-FFF2-40B4-BE49-F238E27FC236}">
-                <a16:creationId xmlns="" xmlns:a16="http://schemas.microsoft.com/office/drawing/2014/main" id="{4D61A00B-5B45-158E-F0F1-939ECF07428F}"/>
-              </a:ext>
-            </a:extLst>
-          </p:cNvPr>
-          <p:cNvSpPr>
-            <a:spLocks noGrp="1"/>
-          </p:cNvSpPr>
-          <p:nvPr>
-            <p:ph idx="1"/>
-          </p:nvPr>
-        </p:nvSpPr>
-        <p:spPr/>
-        <p:txBody>
-          <a:bodyPr/>
-          <a:lstStyle/>
-          <a:p>
-            <a:r>
-              <a:rPr lang="en-US" i="0" dirty="0">
+              <a:t>the processes could be split into two parts.</a:t>
+            </a:r>
+          </a:p>
+          <a:p>
+            <a:r>
+              <a:rPr lang="en-US" b="0" i="0" dirty="0">
                 <a:effectLst/>
               </a:rPr>
-              <a:t>Aerospace and Navigation</a:t>
-            </a:r>
-          </a:p>
-          <a:p>
-            <a:r>
-              <a:rPr lang="en-US" i="0" dirty="0">
-                <a:effectLst/>
-              </a:rPr>
-              <a:t>Robotics</a:t>
-            </a:r>
-          </a:p>
-          <a:p>
-            <a:r>
-              <a:rPr lang="en-US" i="0" dirty="0">
-                <a:effectLst/>
-              </a:rPr>
-              <a:t>Finance and Economics</a:t>
-            </a:r>
-            <a:r>
-              <a:rPr lang="en-US" i="0" dirty="0">
-                <a:solidFill>
-                  <a:srgbClr val="374151"/>
-                </a:solidFill>
-                <a:effectLst/>
-              </a:rPr>
-              <a:t>:</a:t>
-            </a:r>
-            <a:endParaRPr lang="en-US" dirty="0">
-              <a:solidFill>
-                <a:srgbClr val="374151"/>
-              </a:solidFill>
-            </a:endParaRPr>
-          </a:p>
-          <a:p>
-            <a:r>
-              <a:rPr lang="en-US" i="0" dirty="0">
-                <a:effectLst/>
-              </a:rPr>
-              <a:t>Signal Processing</a:t>
-            </a:r>
-            <a:endParaRPr lang="en-US" i="0" dirty="0">
-              <a:solidFill>
-                <a:srgbClr val="374151"/>
-              </a:solidFill>
-              <a:effectLst/>
-            </a:endParaRPr>
-          </a:p>
-          <a:p>
-            <a:r>
-              <a:rPr lang="en-US" i="0" dirty="0">
-                <a:effectLst/>
-              </a:rPr>
-              <a:t>Weather Forecasting</a:t>
-            </a:r>
-            <a:endParaRPr lang="en-US" dirty="0">
-              <a:solidFill>
-                <a:srgbClr val="374151"/>
-              </a:solidFill>
-            </a:endParaRPr>
-          </a:p>
-          <a:p>
-            <a:r>
-              <a:rPr lang="en-US" i="0" dirty="0">
-                <a:effectLst/>
-              </a:rPr>
-              <a:t>Control Systems</a:t>
-            </a:r>
-            <a:r>
-              <a:rPr lang="en-US" i="0" dirty="0">
-                <a:solidFill>
-                  <a:srgbClr val="374151"/>
-                </a:solidFill>
-                <a:effectLst/>
-              </a:rPr>
-              <a:t>:</a:t>
-            </a:r>
-          </a:p>
-          <a:p>
-            <a:r>
-              <a:rPr lang="en-US" i="0" dirty="0">
-                <a:effectLst/>
-              </a:rPr>
-              <a:t>Communication Systems</a:t>
-            </a:r>
+              <a:t>Prediction</a:t>
+            </a:r>
+          </a:p>
+          <a:p>
             <a:endParaRPr lang="en-US" dirty="0"/>
           </a:p>
-        </p:txBody>
-      </p:sp>
+          <a:p>
+            <a:r>
+              <a:rPr lang="en-US" dirty="0"/>
+              <a:t>Update</a:t>
+            </a:r>
+          </a:p>
+        </p:txBody>
+      </p:sp>
+      <p:pic>
+        <p:nvPicPr>
+          <p:cNvPr id="5" name="图片 4">
+            <a:extLst>
+              <a:ext uri="{FF2B5EF4-FFF2-40B4-BE49-F238E27FC236}">
+                <a16:creationId xmlns:a16="http://schemas.microsoft.com/office/drawing/2014/main" xmlns="" id="{937C80C1-6061-F42A-9C66-2CCDD6EE339F}"/>
+              </a:ext>
+            </a:extLst>
+          </p:cNvPr>
+          <p:cNvPicPr>
+            <a:picLocks noChangeAspect="1"/>
+          </p:cNvPicPr>
+          <p:nvPr/>
+        </p:nvPicPr>
+        <p:blipFill>
+          <a:blip r:embed="rId2"/>
+          <a:stretch>
+            <a:fillRect/>
+          </a:stretch>
+        </p:blipFill>
+        <p:spPr>
+          <a:xfrm>
+            <a:off x="3497660" y="3690782"/>
+            <a:ext cx="2769060" cy="1164264"/>
+          </a:xfrm>
+          <a:prstGeom prst="rect">
+            <a:avLst/>
+          </a:prstGeom>
+        </p:spPr>
+      </p:pic>
+      <p:pic>
+        <p:nvPicPr>
+          <p:cNvPr id="9" name="图片 8">
+            <a:extLst>
+              <a:ext uri="{FF2B5EF4-FFF2-40B4-BE49-F238E27FC236}">
+                <a16:creationId xmlns:a16="http://schemas.microsoft.com/office/drawing/2014/main" xmlns="" id="{AD15792A-F729-C892-5BE4-1D6A6334C154}"/>
+              </a:ext>
+            </a:extLst>
+          </p:cNvPr>
+          <p:cNvPicPr>
+            <a:picLocks noChangeAspect="1"/>
+          </p:cNvPicPr>
+          <p:nvPr/>
+        </p:nvPicPr>
+        <p:blipFill>
+          <a:blip r:embed="rId3"/>
+          <a:stretch>
+            <a:fillRect/>
+          </a:stretch>
+        </p:blipFill>
+        <p:spPr>
+          <a:xfrm>
+            <a:off x="3497660" y="4855046"/>
+            <a:ext cx="4228525" cy="1547395"/>
+          </a:xfrm>
+          <a:prstGeom prst="rect">
+            <a:avLst/>
+          </a:prstGeom>
+        </p:spPr>
+      </p:pic>
     </p:spTree>
     <p:extLst>
       <p:ext uri="{BB962C8B-B14F-4D97-AF65-F5344CB8AC3E}">
-        <p14:creationId xmlns:p14="http://schemas.microsoft.com/office/powerpoint/2010/main" val="2974581438"/>
+        <p14:creationId xmlns:p14="http://schemas.microsoft.com/office/powerpoint/2010/main" val="3574193636"/>
       </p:ext>
     </p:extLst>
   </p:cSld>
@@ -5135,7 +5387,186 @@
           <p:cNvPr id="2" name="标题 1">
             <a:extLst>
               <a:ext uri="{FF2B5EF4-FFF2-40B4-BE49-F238E27FC236}">
-                <a16:creationId xmlns="" xmlns:a16="http://schemas.microsoft.com/office/drawing/2014/main" id="{82AA09A9-AC22-5051-EE21-F2A27C4C131A}"/>
+                <a16:creationId xmlns:a16="http://schemas.microsoft.com/office/drawing/2014/main" xmlns="" id="{3FD0EBE6-ED64-004B-A7AE-A52C9E0CB054}"/>
+              </a:ext>
+            </a:extLst>
+          </p:cNvPr>
+          <p:cNvSpPr>
+            <a:spLocks noGrp="1"/>
+          </p:cNvSpPr>
+          <p:nvPr>
+            <p:ph type="title"/>
+          </p:nvPr>
+        </p:nvSpPr>
+        <p:spPr/>
+        <p:txBody>
+          <a:bodyPr/>
+          <a:lstStyle/>
+          <a:p>
+            <a:r>
+              <a:rPr lang="en-US" dirty="0"/>
+              <a:t>The </a:t>
+            </a:r>
+            <a:r>
+              <a:rPr lang="en-US" dirty="0" smtClean="0"/>
+              <a:t>Domain Usage </a:t>
+            </a:r>
+            <a:r>
+              <a:rPr lang="en-US" dirty="0"/>
+              <a:t>of Kalman Filter</a:t>
+            </a:r>
+          </a:p>
+        </p:txBody>
+      </p:sp>
+      <p:sp>
+        <p:nvSpPr>
+          <p:cNvPr id="3" name="内容占位符 2">
+            <a:extLst>
+              <a:ext uri="{FF2B5EF4-FFF2-40B4-BE49-F238E27FC236}">
+                <a16:creationId xmlns:a16="http://schemas.microsoft.com/office/drawing/2014/main" xmlns="" id="{4D61A00B-5B45-158E-F0F1-939ECF07428F}"/>
+              </a:ext>
+            </a:extLst>
+          </p:cNvPr>
+          <p:cNvSpPr>
+            <a:spLocks noGrp="1"/>
+          </p:cNvSpPr>
+          <p:nvPr>
+            <p:ph idx="1"/>
+          </p:nvPr>
+        </p:nvSpPr>
+        <p:spPr/>
+        <p:txBody>
+          <a:bodyPr/>
+          <a:lstStyle/>
+          <a:p>
+            <a:r>
+              <a:rPr lang="en-US" i="0" dirty="0">
+                <a:effectLst/>
+              </a:rPr>
+              <a:t>Aerospace and Navigation</a:t>
+            </a:r>
+          </a:p>
+          <a:p>
+            <a:r>
+              <a:rPr lang="en-US" i="0" dirty="0">
+                <a:effectLst/>
+              </a:rPr>
+              <a:t>Robotics</a:t>
+            </a:r>
+          </a:p>
+          <a:p>
+            <a:r>
+              <a:rPr lang="en-US" i="0" dirty="0">
+                <a:effectLst/>
+              </a:rPr>
+              <a:t>Finance and Economics</a:t>
+            </a:r>
+            <a:r>
+              <a:rPr lang="en-US" i="0" dirty="0">
+                <a:solidFill>
+                  <a:srgbClr val="374151"/>
+                </a:solidFill>
+                <a:effectLst/>
+              </a:rPr>
+              <a:t>:</a:t>
+            </a:r>
+            <a:endParaRPr lang="en-US" dirty="0">
+              <a:solidFill>
+                <a:srgbClr val="374151"/>
+              </a:solidFill>
+            </a:endParaRPr>
+          </a:p>
+          <a:p>
+            <a:r>
+              <a:rPr lang="en-US" i="0" dirty="0">
+                <a:effectLst/>
+              </a:rPr>
+              <a:t>Signal Processing</a:t>
+            </a:r>
+            <a:endParaRPr lang="en-US" i="0" dirty="0">
+              <a:solidFill>
+                <a:srgbClr val="374151"/>
+              </a:solidFill>
+              <a:effectLst/>
+            </a:endParaRPr>
+          </a:p>
+          <a:p>
+            <a:r>
+              <a:rPr lang="en-US" i="0" dirty="0">
+                <a:effectLst/>
+              </a:rPr>
+              <a:t>Weather Forecasting</a:t>
+            </a:r>
+            <a:endParaRPr lang="en-US" dirty="0">
+              <a:solidFill>
+                <a:srgbClr val="374151"/>
+              </a:solidFill>
+            </a:endParaRPr>
+          </a:p>
+          <a:p>
+            <a:r>
+              <a:rPr lang="en-US" i="0" dirty="0">
+                <a:effectLst/>
+              </a:rPr>
+              <a:t>Control Systems</a:t>
+            </a:r>
+            <a:r>
+              <a:rPr lang="en-US" i="0" dirty="0">
+                <a:solidFill>
+                  <a:srgbClr val="374151"/>
+                </a:solidFill>
+                <a:effectLst/>
+              </a:rPr>
+              <a:t>:</a:t>
+            </a:r>
+          </a:p>
+          <a:p>
+            <a:r>
+              <a:rPr lang="en-US" i="0" dirty="0">
+                <a:effectLst/>
+              </a:rPr>
+              <a:t>Communication Systems</a:t>
+            </a:r>
+            <a:endParaRPr lang="en-US" dirty="0"/>
+          </a:p>
+        </p:txBody>
+      </p:sp>
+    </p:spTree>
+    <p:extLst>
+      <p:ext uri="{BB962C8B-B14F-4D97-AF65-F5344CB8AC3E}">
+        <p14:creationId xmlns:p14="http://schemas.microsoft.com/office/powerpoint/2010/main" val="3537500614"/>
+      </p:ext>
+    </p:extLst>
+  </p:cSld>
+  <p:clrMapOvr>
+    <a:masterClrMapping/>
+  </p:clrMapOvr>
+</p:sld>
+</file>
+
+<file path=ppt/slides/slide6.xml><?xml version="1.0" encoding="utf-8"?>
+<p:sld xmlns:a="http://schemas.openxmlformats.org/drawingml/2006/main" xmlns:r="http://schemas.openxmlformats.org/officeDocument/2006/relationships" xmlns:p="http://schemas.openxmlformats.org/presentationml/2006/main">
+  <p:cSld>
+    <p:spTree>
+      <p:nvGrpSpPr>
+        <p:cNvPr id="1" name=""/>
+        <p:cNvGrpSpPr/>
+        <p:nvPr/>
+      </p:nvGrpSpPr>
+      <p:grpSpPr>
+        <a:xfrm>
+          <a:off x="0" y="0"/>
+          <a:ext cx="0" cy="0"/>
+          <a:chOff x="0" y="0"/>
+          <a:chExt cx="0" cy="0"/>
+        </a:xfrm>
+      </p:grpSpPr>
+      <p:sp>
+        <p:nvSpPr>
+          <p:cNvPr id="2" name="标题 1">
+            <a:extLst>
+              <a:ext uri="{FF2B5EF4-FFF2-40B4-BE49-F238E27FC236}">
+                <a16:creationId xmlns:a16="http://schemas.microsoft.com/office/drawing/2014/main" xmlns="" id="{82AA09A9-AC22-5051-EE21-F2A27C4C131A}"/>
               </a:ext>
             </a:extLst>
           </p:cNvPr>
@@ -5163,7 +5594,7 @@
           <p:cNvPr id="1026" name="Picture 2" descr="Measure a gold">
             <a:extLst>
               <a:ext uri="{FF2B5EF4-FFF2-40B4-BE49-F238E27FC236}">
-                <a16:creationId xmlns="" xmlns:a16="http://schemas.microsoft.com/office/drawing/2014/main" id="{059CFA18-4C83-5F3A-6C2B-D64C147142A1}"/>
+                <a16:creationId xmlns:a16="http://schemas.microsoft.com/office/drawing/2014/main" xmlns="" id="{059CFA18-4C83-5F3A-6C2B-D64C147142A1}"/>
               </a:ext>
             </a:extLst>
           </p:cNvPr>
@@ -5210,7 +5641,7 @@
           <p:cNvPr id="1028" name="Picture 4" descr="Gold | Bulwik Jewellery">
             <a:extLst>
               <a:ext uri="{FF2B5EF4-FFF2-40B4-BE49-F238E27FC236}">
-                <a16:creationId xmlns="" xmlns:a16="http://schemas.microsoft.com/office/drawing/2014/main" id="{DF6C7BA2-8B2E-AF0F-2EE8-8687E8F6372D}"/>
+                <a16:creationId xmlns:a16="http://schemas.microsoft.com/office/drawing/2014/main" xmlns="" id="{DF6C7BA2-8B2E-AF0F-2EE8-8687E8F6372D}"/>
               </a:ext>
             </a:extLst>
           </p:cNvPr>
@@ -5265,7 +5696,7 @@
 </p:sld>
 </file>
 
-<file path=ppt/slides/slide6.xml><?xml version="1.0" encoding="utf-8"?>
+<file path=ppt/slides/slide7.xml><?xml version="1.0" encoding="utf-8"?>
 <p:sld xmlns:a="http://schemas.openxmlformats.org/drawingml/2006/main" xmlns:r="http://schemas.openxmlformats.org/officeDocument/2006/relationships" xmlns:p="http://schemas.openxmlformats.org/presentationml/2006/main">
   <p:cSld>
     <p:spTree>
@@ -5287,7 +5718,7 @@
           <p:cNvPr id="2" name="标题 1">
             <a:extLst>
               <a:ext uri="{FF2B5EF4-FFF2-40B4-BE49-F238E27FC236}">
-                <a16:creationId xmlns="" xmlns:a16="http://schemas.microsoft.com/office/drawing/2014/main" id="{82AA09A9-AC22-5051-EE21-F2A27C4C131A}"/>
+                <a16:creationId xmlns:a16="http://schemas.microsoft.com/office/drawing/2014/main" xmlns="" id="{82AA09A9-AC22-5051-EE21-F2A27C4C131A}"/>
               </a:ext>
             </a:extLst>
           </p:cNvPr>
@@ -5315,7 +5746,7 @@
           <p:cNvPr id="1026" name="Picture 2" descr="Measure a gold">
             <a:extLst>
               <a:ext uri="{FF2B5EF4-FFF2-40B4-BE49-F238E27FC236}">
-                <a16:creationId xmlns="" xmlns:a16="http://schemas.microsoft.com/office/drawing/2014/main" id="{059CFA18-4C83-5F3A-6C2B-D64C147142A1}"/>
+                <a16:creationId xmlns:a16="http://schemas.microsoft.com/office/drawing/2014/main" xmlns="" id="{059CFA18-4C83-5F3A-6C2B-D64C147142A1}"/>
               </a:ext>
             </a:extLst>
           </p:cNvPr>
@@ -5362,7 +5793,7 @@
           <p:cNvPr id="1028" name="Picture 4" descr="Gold | Bulwik Jewellery">
             <a:extLst>
               <a:ext uri="{FF2B5EF4-FFF2-40B4-BE49-F238E27FC236}">
-                <a16:creationId xmlns="" xmlns:a16="http://schemas.microsoft.com/office/drawing/2014/main" id="{DF6C7BA2-8B2E-AF0F-2EE8-8687E8F6372D}"/>
+                <a16:creationId xmlns:a16="http://schemas.microsoft.com/office/drawing/2014/main" xmlns="" id="{DF6C7BA2-8B2E-AF0F-2EE8-8687E8F6372D}"/>
               </a:ext>
             </a:extLst>
           </p:cNvPr>
@@ -5409,7 +5840,7 @@
           <p:cNvPr id="4" name="图片 3">
             <a:extLst>
               <a:ext uri="{FF2B5EF4-FFF2-40B4-BE49-F238E27FC236}">
-                <a16:creationId xmlns="" xmlns:a16="http://schemas.microsoft.com/office/drawing/2014/main" id="{D3C87205-F7B7-9E30-DCD8-27B50F3911AF}"/>
+                <a16:creationId xmlns:a16="http://schemas.microsoft.com/office/drawing/2014/main" xmlns="" id="{D3C87205-F7B7-9E30-DCD8-27B50F3911AF}"/>
               </a:ext>
             </a:extLst>
           </p:cNvPr>
@@ -5446,7 +5877,7 @@
 </p:sld>
 </file>
 
-<file path=ppt/slides/slide7.xml><?xml version="1.0" encoding="utf-8"?>
+<file path=ppt/slides/slide8.xml><?xml version="1.0" encoding="utf-8"?>
 <p:sld xmlns:a="http://schemas.openxmlformats.org/drawingml/2006/main" xmlns:r="http://schemas.openxmlformats.org/officeDocument/2006/relationships" xmlns:p="http://schemas.openxmlformats.org/presentationml/2006/main">
   <p:cSld>
     <p:spTree>
@@ -5468,7 +5899,7 @@
           <p:cNvPr id="2" name="标题 1">
             <a:extLst>
               <a:ext uri="{FF2B5EF4-FFF2-40B4-BE49-F238E27FC236}">
-                <a16:creationId xmlns="" xmlns:a16="http://schemas.microsoft.com/office/drawing/2014/main" id="{EE82346B-A7C5-EF04-816A-22A43A463747}"/>
+                <a16:creationId xmlns:a16="http://schemas.microsoft.com/office/drawing/2014/main" xmlns="" id="{EE82346B-A7C5-EF04-816A-22A43A463747}"/>
               </a:ext>
             </a:extLst>
           </p:cNvPr>
@@ -5496,7 +5927,7 @@
           <p:cNvPr id="3" name="内容占位符 2">
             <a:extLst>
               <a:ext uri="{FF2B5EF4-FFF2-40B4-BE49-F238E27FC236}">
-                <a16:creationId xmlns="" xmlns:a16="http://schemas.microsoft.com/office/drawing/2014/main" id="{BC4C3EB5-D9D3-B906-1B49-5EEDA39163CC}"/>
+                <a16:creationId xmlns:a16="http://schemas.microsoft.com/office/drawing/2014/main" xmlns="" id="{BC4C3EB5-D9D3-B906-1B49-5EEDA39163CC}"/>
               </a:ext>
             </a:extLst>
           </p:cNvPr>
@@ -5521,7 +5952,7 @@
           <p:cNvPr id="5" name="图片 4">
             <a:extLst>
               <a:ext uri="{FF2B5EF4-FFF2-40B4-BE49-F238E27FC236}">
-                <a16:creationId xmlns="" xmlns:a16="http://schemas.microsoft.com/office/drawing/2014/main" id="{915C136C-4C50-50A7-EE1D-98C4ADD1BB03}"/>
+                <a16:creationId xmlns:a16="http://schemas.microsoft.com/office/drawing/2014/main" xmlns="" id="{915C136C-4C50-50A7-EE1D-98C4ADD1BB03}"/>
               </a:ext>
             </a:extLst>
           </p:cNvPr>
@@ -5559,7 +5990,7 @@
 </p:sld>
 </file>
 
-<file path=ppt/slides/slide8.xml><?xml version="1.0" encoding="utf-8"?>
+<file path=ppt/slides/slide9.xml><?xml version="1.0" encoding="utf-8"?>
 <p:sld xmlns:a="http://schemas.openxmlformats.org/drawingml/2006/main" xmlns:r="http://schemas.openxmlformats.org/officeDocument/2006/relationships" xmlns:p="http://schemas.openxmlformats.org/presentationml/2006/main">
   <p:cSld>
     <p:spTree>
@@ -5581,7 +6012,7 @@
           <p:cNvPr id="2" name="标题 1">
             <a:extLst>
               <a:ext uri="{FF2B5EF4-FFF2-40B4-BE49-F238E27FC236}">
-                <a16:creationId xmlns="" xmlns:a16="http://schemas.microsoft.com/office/drawing/2014/main" id="{C9127D9B-9414-77EC-0A68-29FD840F02E9}"/>
+                <a16:creationId xmlns:a16="http://schemas.microsoft.com/office/drawing/2014/main" xmlns="" id="{C9127D9B-9414-77EC-0A68-29FD840F02E9}"/>
               </a:ext>
             </a:extLst>
           </p:cNvPr>
@@ -5609,7 +6040,7 @@
           <p:cNvPr id="3" name="内容占位符 2">
             <a:extLst>
               <a:ext uri="{FF2B5EF4-FFF2-40B4-BE49-F238E27FC236}">
-                <a16:creationId xmlns="" xmlns:a16="http://schemas.microsoft.com/office/drawing/2014/main" id="{6682DEB9-1F3F-86E6-2C1D-4B28A6FA27E0}"/>
+                <a16:creationId xmlns:a16="http://schemas.microsoft.com/office/drawing/2014/main" xmlns="" id="{6682DEB9-1F3F-86E6-2C1D-4B28A6FA27E0}"/>
               </a:ext>
             </a:extLst>
           </p:cNvPr>
@@ -5634,7 +6065,7 @@
           <p:cNvPr id="5" name="图片 4">
             <a:extLst>
               <a:ext uri="{FF2B5EF4-FFF2-40B4-BE49-F238E27FC236}">
-                <a16:creationId xmlns="" xmlns:a16="http://schemas.microsoft.com/office/drawing/2014/main" id="{12BFB8BA-39AE-F058-2C8E-11AEA6ADB350}"/>
+                <a16:creationId xmlns:a16="http://schemas.microsoft.com/office/drawing/2014/main" xmlns="" id="{12BFB8BA-39AE-F058-2C8E-11AEA6ADB350}"/>
               </a:ext>
             </a:extLst>
           </p:cNvPr>
@@ -5663,130 +6094,6 @@
     <p:extLst>
       <p:ext uri="{BB962C8B-B14F-4D97-AF65-F5344CB8AC3E}">
         <p14:creationId xmlns:p14="http://schemas.microsoft.com/office/powerpoint/2010/main" val="2179886477"/>
-      </p:ext>
-    </p:extLst>
-  </p:cSld>
-  <p:clrMapOvr>
-    <a:masterClrMapping/>
-  </p:clrMapOvr>
-</p:sld>
-</file>
-
-<file path=ppt/slides/slide9.xml><?xml version="1.0" encoding="utf-8"?>
-<p:sld xmlns:a="http://schemas.openxmlformats.org/drawingml/2006/main" xmlns:r="http://schemas.openxmlformats.org/officeDocument/2006/relationships" xmlns:p="http://schemas.openxmlformats.org/presentationml/2006/main">
-  <p:cSld>
-    <p:spTree>
-      <p:nvGrpSpPr>
-        <p:cNvPr id="1" name=""/>
-        <p:cNvGrpSpPr/>
-        <p:nvPr/>
-      </p:nvGrpSpPr>
-      <p:grpSpPr>
-        <a:xfrm>
-          <a:off x="0" y="0"/>
-          <a:ext cx="0" cy="0"/>
-          <a:chOff x="0" y="0"/>
-          <a:chExt cx="0" cy="0"/>
-        </a:xfrm>
-      </p:grpSpPr>
-      <p:sp>
-        <p:nvSpPr>
-          <p:cNvPr id="2" name="标题 1">
-            <a:extLst>
-              <a:ext uri="{FF2B5EF4-FFF2-40B4-BE49-F238E27FC236}">
-                <a16:creationId xmlns="" xmlns:a16="http://schemas.microsoft.com/office/drawing/2014/main" id="{C9127D9B-9414-77EC-0A68-29FD840F02E9}"/>
-              </a:ext>
-            </a:extLst>
-          </p:cNvPr>
-          <p:cNvSpPr>
-            <a:spLocks noGrp="1"/>
-          </p:cNvSpPr>
-          <p:nvPr>
-            <p:ph type="title"/>
-          </p:nvPr>
-        </p:nvSpPr>
-        <p:spPr/>
-        <p:txBody>
-          <a:bodyPr/>
-          <a:lstStyle/>
-          <a:p>
-            <a:r>
-              <a:rPr lang="en-US" dirty="0"/>
-              <a:t>Example – Weight a Gold</a:t>
-            </a:r>
-          </a:p>
-        </p:txBody>
-      </p:sp>
-      <p:sp>
-        <p:nvSpPr>
-          <p:cNvPr id="3" name="内容占位符 2">
-            <a:extLst>
-              <a:ext uri="{FF2B5EF4-FFF2-40B4-BE49-F238E27FC236}">
-                <a16:creationId xmlns="" xmlns:a16="http://schemas.microsoft.com/office/drawing/2014/main" id="{6682DEB9-1F3F-86E6-2C1D-4B28A6FA27E0}"/>
-              </a:ext>
-            </a:extLst>
-          </p:cNvPr>
-          <p:cNvSpPr>
-            <a:spLocks noGrp="1"/>
-          </p:cNvSpPr>
-          <p:nvPr>
-            <p:ph idx="1"/>
-          </p:nvPr>
-        </p:nvSpPr>
-        <p:spPr/>
-        <p:txBody>
-          <a:bodyPr/>
-          <a:lstStyle/>
-          <a:p>
-            <a:endParaRPr lang="en-US"/>
-          </a:p>
-        </p:txBody>
-      </p:sp>
-      <p:pic>
-        <p:nvPicPr>
-          <p:cNvPr id="3074" name="Picture 2" descr="Measurements vs. True value vs. Estimates"/>
-          <p:cNvPicPr>
-            <a:picLocks noChangeAspect="1" noChangeArrowheads="1"/>
-          </p:cNvPicPr>
-          <p:nvPr/>
-        </p:nvPicPr>
-        <p:blipFill>
-          <a:blip r:embed="rId2">
-            <a:extLst>
-              <a:ext uri="{28A0092B-C50C-407E-A947-70E740481C1C}">
-                <a14:useLocalDpi xmlns:a14="http://schemas.microsoft.com/office/drawing/2010/main" val="0"/>
-              </a:ext>
-            </a:extLst>
-          </a:blip>
-          <a:srcRect/>
-          <a:stretch>
-            <a:fillRect/>
-          </a:stretch>
-        </p:blipFill>
-        <p:spPr bwMode="auto">
-          <a:xfrm>
-            <a:off x="642795" y="1758269"/>
-            <a:ext cx="8845390" cy="4762903"/>
-          </a:xfrm>
-          <a:prstGeom prst="rect">
-            <a:avLst/>
-          </a:prstGeom>
-          <a:noFill/>
-          <a:extLst>
-            <a:ext uri="{909E8E84-426E-40DD-AFC4-6F175D3DCCD1}">
-              <a14:hiddenFill xmlns:a14="http://schemas.microsoft.com/office/drawing/2010/main">
-                <a:solidFill>
-                  <a:srgbClr val="FFFFFF"/>
-                </a:solidFill>
-              </a14:hiddenFill>
-            </a:ext>
-          </a:extLst>
-        </p:spPr>
-      </p:pic>
-    </p:spTree>
-    <p:extLst>
-      <p:ext uri="{BB962C8B-B14F-4D97-AF65-F5344CB8AC3E}">
-        <p14:creationId xmlns:p14="http://schemas.microsoft.com/office/powerpoint/2010/main" val="2141178421"/>
       </p:ext>
     </p:extLst>
   </p:cSld>
@@ -6085,7 +6392,7 @@
   <a:extraClrSchemeLst/>
   <a:extLst>
     <a:ext uri="{05A4C25C-085E-4340-85A3-A5531E510DB2}">
-      <thm15:themeFamily xmlns="" xmlns:thm15="http://schemas.microsoft.com/office/thememl/2012/main" name="Office Theme" id="{62F939B6-93AF-4DB8-9C6B-D6C7DFDC589F}" vid="{4A3C46E8-61CC-4603-A589-7422A47A8E4A}"/>
+      <thm15:themeFamily xmlns:thm15="http://schemas.microsoft.com/office/thememl/2012/main" xmlns="" name="Office Theme" id="{62F939B6-93AF-4DB8-9C6B-D6C7DFDC589F}" vid="{4A3C46E8-61CC-4603-A589-7422A47A8E4A}"/>
     </a:ext>
   </a:extLst>
 </a:theme>

</xml_diff>